<commit_message>
Add FEMA 100-year flood data
</commit_message>
<xml_diff>
--- a/ICoM ABM Guide.pptx
+++ b/ICoM ABM Guide.pptx
@@ -8,6 +8,7 @@
     <p:sldId id="257" r:id="rId5"/>
     <p:sldId id="256" r:id="rId6"/>
     <p:sldId id="258" r:id="rId7"/>
+    <p:sldId id="259" r:id="rId8"/>
   </p:sldIdLst>
   <p:sldSz cx="12192000" cy="6858000"/>
   <p:notesSz cx="6858000" cy="9144000"/>
@@ -117,7 +118,7 @@
 <file path=ppt/revisionInfo.xml><?xml version="1.0" encoding="utf-8"?>
 <p1510:revInfo xmlns:a="http://schemas.openxmlformats.org/drawingml/2006/main" xmlns:r="http://schemas.openxmlformats.org/officeDocument/2006/relationships" xmlns:p1510="http://schemas.microsoft.com/office/powerpoint/2015/10/main">
   <p1510:revLst>
-    <p1510:client id="{05ABE6EC-5FB7-4B8B-A226-73F1B79CA086}" v="14" dt="2021-01-21T19:40:52.793"/>
+    <p1510:client id="{05ABE6EC-5FB7-4B8B-A226-73F1B79CA086}" v="38" dt="2021-02-04T18:39:57.634"/>
   </p1510:revLst>
 </p1510:revInfo>
 </file>
@@ -126,11 +127,26 @@
 <pc:chgInfo xmlns:a="http://schemas.openxmlformats.org/drawingml/2006/main" xmlns:r="http://schemas.openxmlformats.org/officeDocument/2006/relationships" xmlns:ac="http://schemas.microsoft.com/office/drawing/2013/main/command" xmlns:pc="http://schemas.microsoft.com/office/powerpoint/2013/main/command">
   <pc:docChgLst>
     <pc:chgData name="Yoon, James (Jim)" userId="8a7a915f-98f1-4b07-8503-3ec4b5ff3eac" providerId="ADAL" clId="{05ABE6EC-5FB7-4B8B-A226-73F1B79CA086}"/>
-    <pc:docChg chg="custSel modSld">
-      <pc:chgData name="Yoon, James (Jim)" userId="8a7a915f-98f1-4b07-8503-3ec4b5ff3eac" providerId="ADAL" clId="{05ABE6EC-5FB7-4B8B-A226-73F1B79CA086}" dt="2021-01-21T19:41:10.564" v="95" actId="20577"/>
+    <pc:docChg chg="undo custSel addSld delSld modSld">
+      <pc:chgData name="Yoon, James (Jim)" userId="8a7a915f-98f1-4b07-8503-3ec4b5ff3eac" providerId="ADAL" clId="{05ABE6EC-5FB7-4B8B-A226-73F1B79CA086}" dt="2021-02-04T18:42:36.950" v="1028" actId="20577"/>
       <pc:docMkLst>
         <pc:docMk/>
       </pc:docMkLst>
+      <pc:sldChg chg="modSp">
+        <pc:chgData name="Yoon, James (Jim)" userId="8a7a915f-98f1-4b07-8503-3ec4b5ff3eac" providerId="ADAL" clId="{05ABE6EC-5FB7-4B8B-A226-73F1B79CA086}" dt="2021-01-21T20:16:46.466" v="97" actId="1076"/>
+        <pc:sldMkLst>
+          <pc:docMk/>
+          <pc:sldMk cId="4000426864" sldId="257"/>
+        </pc:sldMkLst>
+        <pc:picChg chg="mod">
+          <ac:chgData name="Yoon, James (Jim)" userId="8a7a915f-98f1-4b07-8503-3ec4b5ff3eac" providerId="ADAL" clId="{05ABE6EC-5FB7-4B8B-A226-73F1B79CA086}" dt="2021-01-21T20:16:46.466" v="97" actId="1076"/>
+          <ac:picMkLst>
+            <pc:docMk/>
+            <pc:sldMk cId="4000426864" sldId="257"/>
+            <ac:picMk id="1026" creationId="{2C94E066-30A1-4995-8110-9F35A482EDAD}"/>
+          </ac:picMkLst>
+        </pc:picChg>
+      </pc:sldChg>
       <pc:sldChg chg="addSp modSp mod">
         <pc:chgData name="Yoon, James (Jim)" userId="8a7a915f-98f1-4b07-8503-3ec4b5ff3eac" providerId="ADAL" clId="{05ABE6EC-5FB7-4B8B-A226-73F1B79CA086}" dt="2021-01-21T19:41:10.564" v="95" actId="20577"/>
         <pc:sldMkLst>
@@ -194,6 +210,84 @@
           </ac:picMkLst>
         </pc:picChg>
       </pc:sldChg>
+      <pc:sldChg chg="addSp delSp modSp add mod">
+        <pc:chgData name="Yoon, James (Jim)" userId="8a7a915f-98f1-4b07-8503-3ec4b5ff3eac" providerId="ADAL" clId="{05ABE6EC-5FB7-4B8B-A226-73F1B79CA086}" dt="2021-02-04T18:42:36.950" v="1028" actId="20577"/>
+        <pc:sldMkLst>
+          <pc:docMk/>
+          <pc:sldMk cId="792130605" sldId="259"/>
+        </pc:sldMkLst>
+        <pc:spChg chg="del">
+          <ac:chgData name="Yoon, James (Jim)" userId="8a7a915f-98f1-4b07-8503-3ec4b5ff3eac" providerId="ADAL" clId="{05ABE6EC-5FB7-4B8B-A226-73F1B79CA086}" dt="2021-02-04T17:34:05.079" v="163" actId="478"/>
+          <ac:spMkLst>
+            <pc:docMk/>
+            <pc:sldMk cId="792130605" sldId="259"/>
+            <ac:spMk id="2" creationId="{7D6D1E95-4BE6-4918-A0FA-20E36DF451E9}"/>
+          </ac:spMkLst>
+        </pc:spChg>
+        <pc:spChg chg="add mod">
+          <ac:chgData name="Yoon, James (Jim)" userId="8a7a915f-98f1-4b07-8503-3ec4b5ff3eac" providerId="ADAL" clId="{05ABE6EC-5FB7-4B8B-A226-73F1B79CA086}" dt="2021-02-04T18:40:11.774" v="1000" actId="255"/>
+          <ac:spMkLst>
+            <pc:docMk/>
+            <pc:sldMk cId="792130605" sldId="259"/>
+            <ac:spMk id="3" creationId="{30F0C87A-CB8B-4A90-8C20-9772B6E61BC9}"/>
+          </ac:spMkLst>
+        </pc:spChg>
+        <pc:spChg chg="mod">
+          <ac:chgData name="Yoon, James (Jim)" userId="8a7a915f-98f1-4b07-8503-3ec4b5ff3eac" providerId="ADAL" clId="{05ABE6EC-5FB7-4B8B-A226-73F1B79CA086}" dt="2021-02-04T18:42:36.950" v="1028" actId="20577"/>
+          <ac:spMkLst>
+            <pc:docMk/>
+            <pc:sldMk cId="792130605" sldId="259"/>
+            <ac:spMk id="5" creationId="{3E519C2A-1ECD-4685-BEC0-34C070D06C9C}"/>
+          </ac:spMkLst>
+        </pc:spChg>
+        <pc:spChg chg="del">
+          <ac:chgData name="Yoon, James (Jim)" userId="8a7a915f-98f1-4b07-8503-3ec4b5ff3eac" providerId="ADAL" clId="{05ABE6EC-5FB7-4B8B-A226-73F1B79CA086}" dt="2021-02-04T17:34:05.079" v="163" actId="478"/>
+          <ac:spMkLst>
+            <pc:docMk/>
+            <pc:sldMk cId="792130605" sldId="259"/>
+            <ac:spMk id="6" creationId="{910A212A-7004-4D8C-9110-E677B8E10F20}"/>
+          </ac:spMkLst>
+        </pc:spChg>
+        <pc:spChg chg="del">
+          <ac:chgData name="Yoon, James (Jim)" userId="8a7a915f-98f1-4b07-8503-3ec4b5ff3eac" providerId="ADAL" clId="{05ABE6EC-5FB7-4B8B-A226-73F1B79CA086}" dt="2021-02-04T17:34:05.079" v="163" actId="478"/>
+          <ac:spMkLst>
+            <pc:docMk/>
+            <pc:sldMk cId="792130605" sldId="259"/>
+            <ac:spMk id="7" creationId="{27EA52B4-8AE3-4530-8E8B-26E242AA1C7B}"/>
+          </ac:spMkLst>
+        </pc:spChg>
+        <pc:spChg chg="del">
+          <ac:chgData name="Yoon, James (Jim)" userId="8a7a915f-98f1-4b07-8503-3ec4b5ff3eac" providerId="ADAL" clId="{05ABE6EC-5FB7-4B8B-A226-73F1B79CA086}" dt="2021-02-04T17:34:05.079" v="163" actId="478"/>
+          <ac:spMkLst>
+            <pc:docMk/>
+            <pc:sldMk cId="792130605" sldId="259"/>
+            <ac:spMk id="8" creationId="{851919B7-C7BC-4A35-BC63-143B0EF4FF96}"/>
+          </ac:spMkLst>
+        </pc:spChg>
+        <pc:spChg chg="mod">
+          <ac:chgData name="Yoon, James (Jim)" userId="8a7a915f-98f1-4b07-8503-3ec4b5ff3eac" providerId="ADAL" clId="{05ABE6EC-5FB7-4B8B-A226-73F1B79CA086}" dt="2021-02-04T18:06:05.926" v="933" actId="20577"/>
+          <ac:spMkLst>
+            <pc:docMk/>
+            <pc:sldMk cId="792130605" sldId="259"/>
+            <ac:spMk id="9" creationId="{56F25AF1-1195-475E-BB00-45536AF81C68}"/>
+          </ac:spMkLst>
+        </pc:spChg>
+        <pc:picChg chg="del">
+          <ac:chgData name="Yoon, James (Jim)" userId="8a7a915f-98f1-4b07-8503-3ec4b5ff3eac" providerId="ADAL" clId="{05ABE6EC-5FB7-4B8B-A226-73F1B79CA086}" dt="2021-02-04T17:34:03.444" v="162" actId="478"/>
+          <ac:picMkLst>
+            <pc:docMk/>
+            <pc:sldMk cId="792130605" sldId="259"/>
+            <ac:picMk id="4" creationId="{8B2D4DB1-C599-4B6F-A22A-BAC26C439866}"/>
+          </ac:picMkLst>
+        </pc:picChg>
+      </pc:sldChg>
+      <pc:sldChg chg="new del">
+        <pc:chgData name="Yoon, James (Jim)" userId="8a7a915f-98f1-4b07-8503-3ec4b5ff3eac" providerId="ADAL" clId="{05ABE6EC-5FB7-4B8B-A226-73F1B79CA086}" dt="2021-02-04T17:32:34.988" v="99" actId="680"/>
+        <pc:sldMkLst>
+          <pc:docMk/>
+          <pc:sldMk cId="3513259940" sldId="259"/>
+        </pc:sldMkLst>
+      </pc:sldChg>
     </pc:docChg>
   </pc:docChgLst>
 </pc:chgInfo>
@@ -346,7 +440,7 @@
           <a:p>
             <a:fld id="{7AC65AA3-70EE-4AAE-82B6-823552EBCD17}" type="datetimeFigureOut">
               <a:rPr lang="en-US" smtClean="0"/>
-              <a:t>1/20/2021</a:t>
+              <a:t>2/4/2021</a:t>
             </a:fld>
             <a:endParaRPr lang="en-US"/>
           </a:p>
@@ -544,7 +638,7 @@
           <a:p>
             <a:fld id="{7AC65AA3-70EE-4AAE-82B6-823552EBCD17}" type="datetimeFigureOut">
               <a:rPr lang="en-US" smtClean="0"/>
-              <a:t>1/20/2021</a:t>
+              <a:t>2/4/2021</a:t>
             </a:fld>
             <a:endParaRPr lang="en-US"/>
           </a:p>
@@ -752,7 +846,7 @@
           <a:p>
             <a:fld id="{7AC65AA3-70EE-4AAE-82B6-823552EBCD17}" type="datetimeFigureOut">
               <a:rPr lang="en-US" smtClean="0"/>
-              <a:t>1/20/2021</a:t>
+              <a:t>2/4/2021</a:t>
             </a:fld>
             <a:endParaRPr lang="en-US"/>
           </a:p>
@@ -950,7 +1044,7 @@
           <a:p>
             <a:fld id="{7AC65AA3-70EE-4AAE-82B6-823552EBCD17}" type="datetimeFigureOut">
               <a:rPr lang="en-US" smtClean="0"/>
-              <a:t>1/20/2021</a:t>
+              <a:t>2/4/2021</a:t>
             </a:fld>
             <a:endParaRPr lang="en-US"/>
           </a:p>
@@ -1225,7 +1319,7 @@
           <a:p>
             <a:fld id="{7AC65AA3-70EE-4AAE-82B6-823552EBCD17}" type="datetimeFigureOut">
               <a:rPr lang="en-US" smtClean="0"/>
-              <a:t>1/20/2021</a:t>
+              <a:t>2/4/2021</a:t>
             </a:fld>
             <a:endParaRPr lang="en-US"/>
           </a:p>
@@ -1490,7 +1584,7 @@
           <a:p>
             <a:fld id="{7AC65AA3-70EE-4AAE-82B6-823552EBCD17}" type="datetimeFigureOut">
               <a:rPr lang="en-US" smtClean="0"/>
-              <a:t>1/20/2021</a:t>
+              <a:t>2/4/2021</a:t>
             </a:fld>
             <a:endParaRPr lang="en-US"/>
           </a:p>
@@ -1902,7 +1996,7 @@
           <a:p>
             <a:fld id="{7AC65AA3-70EE-4AAE-82B6-823552EBCD17}" type="datetimeFigureOut">
               <a:rPr lang="en-US" smtClean="0"/>
-              <a:t>1/20/2021</a:t>
+              <a:t>2/4/2021</a:t>
             </a:fld>
             <a:endParaRPr lang="en-US"/>
           </a:p>
@@ -2043,7 +2137,7 @@
           <a:p>
             <a:fld id="{7AC65AA3-70EE-4AAE-82B6-823552EBCD17}" type="datetimeFigureOut">
               <a:rPr lang="en-US" smtClean="0"/>
-              <a:t>1/20/2021</a:t>
+              <a:t>2/4/2021</a:t>
             </a:fld>
             <a:endParaRPr lang="en-US"/>
           </a:p>
@@ -2156,7 +2250,7 @@
           <a:p>
             <a:fld id="{7AC65AA3-70EE-4AAE-82B6-823552EBCD17}" type="datetimeFigureOut">
               <a:rPr lang="en-US" smtClean="0"/>
-              <a:t>1/20/2021</a:t>
+              <a:t>2/4/2021</a:t>
             </a:fld>
             <a:endParaRPr lang="en-US"/>
           </a:p>
@@ -2467,7 +2561,7 @@
           <a:p>
             <a:fld id="{7AC65AA3-70EE-4AAE-82B6-823552EBCD17}" type="datetimeFigureOut">
               <a:rPr lang="en-US" smtClean="0"/>
-              <a:t>1/20/2021</a:t>
+              <a:t>2/4/2021</a:t>
             </a:fld>
             <a:endParaRPr lang="en-US"/>
           </a:p>
@@ -2755,7 +2849,7 @@
           <a:p>
             <a:fld id="{7AC65AA3-70EE-4AAE-82B6-823552EBCD17}" type="datetimeFigureOut">
               <a:rPr lang="en-US" smtClean="0"/>
-              <a:t>1/20/2021</a:t>
+              <a:t>2/4/2021</a:t>
             </a:fld>
             <a:endParaRPr lang="en-US"/>
           </a:p>
@@ -2996,7 +3090,7 @@
           <a:p>
             <a:fld id="{7AC65AA3-70EE-4AAE-82B6-823552EBCD17}" type="datetimeFigureOut">
               <a:rPr lang="en-US" smtClean="0"/>
-              <a:t>1/20/2021</a:t>
+              <a:t>2/4/2021</a:t>
             </a:fld>
             <a:endParaRPr lang="en-US"/>
           </a:p>
@@ -3442,7 +3536,7 @@
         </p:blipFill>
         <p:spPr bwMode="auto">
           <a:xfrm>
-            <a:off x="1396364" y="1838326"/>
+            <a:off x="746659" y="2038853"/>
             <a:ext cx="5052061" cy="4444628"/>
           </a:xfrm>
           <a:prstGeom prst="rect">
@@ -4871,6 +4965,517 @@
     <p:extLst>
       <p:ext uri="{BB962C8B-B14F-4D97-AF65-F5344CB8AC3E}">
         <p14:creationId xmlns:p14="http://schemas.microsoft.com/office/powerpoint/2010/main" val="2364680872"/>
+      </p:ext>
+    </p:extLst>
+  </p:cSld>
+  <p:clrMapOvr>
+    <a:masterClrMapping/>
+  </p:clrMapOvr>
+</p:sld>
+</file>
+
+<file path=ppt/slides/slide4.xml><?xml version="1.0" encoding="utf-8"?>
+<p:sld xmlns:a="http://schemas.openxmlformats.org/drawingml/2006/main" xmlns:r="http://schemas.openxmlformats.org/officeDocument/2006/relationships" xmlns:p="http://schemas.openxmlformats.org/presentationml/2006/main">
+  <p:cSld>
+    <p:spTree>
+      <p:nvGrpSpPr>
+        <p:cNvPr id="1" name=""/>
+        <p:cNvGrpSpPr/>
+        <p:nvPr/>
+      </p:nvGrpSpPr>
+      <p:grpSpPr>
+        <a:xfrm>
+          <a:off x="0" y="0"/>
+          <a:ext cx="0" cy="0"/>
+          <a:chOff x="0" y="0"/>
+          <a:chExt cx="0" cy="0"/>
+        </a:xfrm>
+      </p:grpSpPr>
+      <p:sp>
+        <p:nvSpPr>
+          <p:cNvPr id="5" name="TextBox 4">
+            <a:extLst>
+              <a:ext uri="{FF2B5EF4-FFF2-40B4-BE49-F238E27FC236}">
+                <a16:creationId xmlns:a16="http://schemas.microsoft.com/office/drawing/2014/main" id="{3E519C2A-1ECD-4685-BEC0-34C070D06C9C}"/>
+              </a:ext>
+            </a:extLst>
+          </p:cNvPr>
+          <p:cNvSpPr txBox="1"/>
+          <p:nvPr/>
+        </p:nvSpPr>
+        <p:spPr>
+          <a:xfrm>
+            <a:off x="258178" y="369332"/>
+            <a:ext cx="10714621" cy="2862322"/>
+          </a:xfrm>
+          <a:prstGeom prst="rect">
+            <a:avLst/>
+          </a:prstGeom>
+          <a:noFill/>
+        </p:spPr>
+        <p:txBody>
+          <a:bodyPr wrap="square" rtlCol="0">
+            <a:spAutoFit/>
+          </a:bodyPr>
+          <a:lstStyle/>
+          <a:p>
+            <a:pPr marL="342900" indent="-342900">
+              <a:buFont typeface="+mj-lt"/>
+              <a:buAutoNum type="arabicPeriod"/>
+            </a:pPr>
+            <a:r>
+              <a:rPr lang="en-US" dirty="0"/>
+              <a:t>Owners decide to sell property (</a:t>
+            </a:r>
+            <a:r>
+              <a:rPr lang="en-US" dirty="0" err="1"/>
+              <a:t>hh</a:t>
+            </a:r>
+            <a:r>
+              <a:rPr lang="en-US" dirty="0"/>
+              <a:t>-sellers) </a:t>
+            </a:r>
+            <a:r>
+              <a:rPr lang="en-US" baseline="30000" dirty="0"/>
+              <a:t>(a)</a:t>
+            </a:r>
+          </a:p>
+          <a:p>
+            <a:pPr marL="342900" indent="-342900">
+              <a:buFont typeface="+mj-lt"/>
+              <a:buAutoNum type="arabicPeriod"/>
+            </a:pPr>
+            <a:r>
+              <a:rPr lang="en-US" dirty="0"/>
+              <a:t>Coefficient of hedonic function, i.e., price as function of home attributes (realtor)</a:t>
+            </a:r>
+          </a:p>
+          <a:p>
+            <a:pPr marL="342900" indent="-342900">
+              <a:buFont typeface="+mj-lt"/>
+              <a:buAutoNum type="arabicPeriod"/>
+            </a:pPr>
+            <a:r>
+              <a:rPr lang="en-US" dirty="0"/>
+              <a:t>Sellers set ask price based on hedonic function (</a:t>
+            </a:r>
+            <a:r>
+              <a:rPr lang="en-US" dirty="0" err="1"/>
+              <a:t>hh</a:t>
+            </a:r>
+            <a:r>
+              <a:rPr lang="en-US" dirty="0"/>
+              <a:t>-sellers)</a:t>
+            </a:r>
+            <a:r>
+              <a:rPr lang="en-US" baseline="30000" dirty="0"/>
+              <a:t> (b) (c) (d) (e)</a:t>
+            </a:r>
+          </a:p>
+          <a:p>
+            <a:pPr marL="342900" indent="-342900">
+              <a:buFont typeface="+mj-lt"/>
+              <a:buAutoNum type="arabicPeriod"/>
+            </a:pPr>
+            <a:r>
+              <a:rPr lang="en-US" dirty="0"/>
+              <a:t>Buyer samples N spatial goods among affordable ones (</a:t>
+            </a:r>
+            <a:r>
+              <a:rPr lang="en-US" dirty="0" err="1"/>
+              <a:t>hh</a:t>
+            </a:r>
+            <a:r>
+              <a:rPr lang="en-US" dirty="0"/>
+              <a:t>-buyers) </a:t>
+            </a:r>
+            <a:r>
+              <a:rPr lang="en-US" baseline="30000" dirty="0"/>
+              <a:t>(f) (g)</a:t>
+            </a:r>
+          </a:p>
+          <a:p>
+            <a:pPr marL="342900" indent="-342900">
+              <a:buFont typeface="+mj-lt"/>
+              <a:buAutoNum type="arabicPeriod"/>
+            </a:pPr>
+            <a:r>
+              <a:rPr lang="en-US" dirty="0"/>
+              <a:t>Buyer identifies spatial good that provides maximum utility based on preferences and income (</a:t>
+            </a:r>
+            <a:r>
+              <a:rPr lang="en-US" dirty="0" err="1"/>
+              <a:t>hh</a:t>
+            </a:r>
+            <a:r>
+              <a:rPr lang="en-US" dirty="0"/>
+              <a:t>-buyers)</a:t>
+            </a:r>
+            <a:r>
+              <a:rPr lang="en-US" baseline="30000" dirty="0"/>
+              <a:t> (h)</a:t>
+            </a:r>
+          </a:p>
+          <a:p>
+            <a:pPr marL="342900" indent="-342900">
+              <a:buFont typeface="+mj-lt"/>
+              <a:buAutoNum type="arabicPeriod"/>
+            </a:pPr>
+            <a:r>
+              <a:rPr lang="en-US" dirty="0"/>
+              <a:t>Buyer selects the cheapest to bid on (</a:t>
+            </a:r>
+            <a:r>
+              <a:rPr lang="en-US" dirty="0" err="1"/>
+              <a:t>hh</a:t>
+            </a:r>
+            <a:r>
+              <a:rPr lang="en-US" dirty="0"/>
+              <a:t>-buyers)</a:t>
+            </a:r>
+          </a:p>
+          <a:p>
+            <a:pPr marL="342900" indent="-342900">
+              <a:buFont typeface="+mj-lt"/>
+              <a:buAutoNum type="arabicPeriod"/>
+            </a:pPr>
+            <a:r>
+              <a:rPr lang="en-US" dirty="0"/>
+              <a:t>Buyer submits bid price to the seller of selected property (</a:t>
+            </a:r>
+            <a:r>
+              <a:rPr lang="en-US" dirty="0" err="1"/>
+              <a:t>hh</a:t>
+            </a:r>
+            <a:r>
+              <a:rPr lang="en-US" dirty="0"/>
+              <a:t>-buyers)</a:t>
+            </a:r>
+          </a:p>
+          <a:p>
+            <a:pPr marL="342900" indent="-342900">
+              <a:buFont typeface="+mj-lt"/>
+              <a:buAutoNum type="arabicPeriod"/>
+            </a:pPr>
+            <a:r>
+              <a:rPr lang="en-US" dirty="0"/>
+              <a:t>Sellers evaluate the offers and select the highest (</a:t>
+            </a:r>
+            <a:r>
+              <a:rPr lang="en-US" dirty="0" err="1"/>
+              <a:t>hh</a:t>
+            </a:r>
+            <a:r>
+              <a:rPr lang="en-US" dirty="0"/>
+              <a:t>-sellers)</a:t>
+            </a:r>
+            <a:r>
+              <a:rPr lang="en-US" baseline="30000" dirty="0"/>
+              <a:t> (i)</a:t>
+            </a:r>
+          </a:p>
+          <a:p>
+            <a:pPr marL="342900" indent="-342900">
+              <a:buFont typeface="+mj-lt"/>
+              <a:buAutoNum type="arabicPeriod"/>
+            </a:pPr>
+            <a:r>
+              <a:rPr lang="en-US" dirty="0"/>
+              <a:t>Market iterates until all </a:t>
+            </a:r>
+            <a:r>
+              <a:rPr lang="en-US" dirty="0" err="1"/>
+              <a:t>hh</a:t>
+            </a:r>
+            <a:r>
+              <a:rPr lang="en-US" dirty="0"/>
+              <a:t>-buyers register a trade (market)</a:t>
+            </a:r>
+          </a:p>
+          <a:p>
+            <a:pPr marL="342900" indent="-342900">
+              <a:buFont typeface="+mj-lt"/>
+              <a:buAutoNum type="arabicPeriod"/>
+            </a:pPr>
+            <a:endParaRPr lang="en-US" dirty="0"/>
+          </a:p>
+        </p:txBody>
+      </p:sp>
+      <p:sp>
+        <p:nvSpPr>
+          <p:cNvPr id="9" name="TextBox 8">
+            <a:extLst>
+              <a:ext uri="{FF2B5EF4-FFF2-40B4-BE49-F238E27FC236}">
+                <a16:creationId xmlns:a16="http://schemas.microsoft.com/office/drawing/2014/main" id="{56F25AF1-1195-475E-BB00-45536AF81C68}"/>
+              </a:ext>
+            </a:extLst>
+          </p:cNvPr>
+          <p:cNvSpPr txBox="1"/>
+          <p:nvPr/>
+        </p:nvSpPr>
+        <p:spPr>
+          <a:xfrm>
+            <a:off x="346411" y="0"/>
+            <a:ext cx="4584525" cy="369332"/>
+          </a:xfrm>
+          <a:prstGeom prst="rect">
+            <a:avLst/>
+          </a:prstGeom>
+          <a:noFill/>
+        </p:spPr>
+        <p:txBody>
+          <a:bodyPr wrap="none" rtlCol="0">
+            <a:spAutoFit/>
+          </a:bodyPr>
+          <a:lstStyle/>
+          <a:p>
+            <a:r>
+              <a:rPr lang="en-US" b="1" dirty="0"/>
+              <a:t>Market Mechanism Concept (based on RHEA):</a:t>
+            </a:r>
+          </a:p>
+        </p:txBody>
+      </p:sp>
+      <p:sp>
+        <p:nvSpPr>
+          <p:cNvPr id="3" name="Rectangle 2">
+            <a:extLst>
+              <a:ext uri="{FF2B5EF4-FFF2-40B4-BE49-F238E27FC236}">
+                <a16:creationId xmlns:a16="http://schemas.microsoft.com/office/drawing/2014/main" id="{30F0C87A-CB8B-4A90-8C20-9772B6E61BC9}"/>
+              </a:ext>
+            </a:extLst>
+          </p:cNvPr>
+          <p:cNvSpPr/>
+          <p:nvPr/>
+        </p:nvSpPr>
+        <p:spPr>
+          <a:xfrm>
+            <a:off x="258178" y="3061070"/>
+            <a:ext cx="11028503" cy="3416320"/>
+          </a:xfrm>
+          <a:prstGeom prst="rect">
+            <a:avLst/>
+          </a:prstGeom>
+        </p:spPr>
+        <p:txBody>
+          <a:bodyPr wrap="square">
+            <a:spAutoFit/>
+          </a:bodyPr>
+          <a:lstStyle/>
+          <a:p>
+            <a:pPr marL="228600" indent="-228600">
+              <a:buFont typeface="+mj-lt"/>
+              <a:buAutoNum type="alphaLcParenR"/>
+            </a:pPr>
+            <a:r>
+              <a:rPr lang="en-US" sz="900" dirty="0">
+                <a:solidFill>
+                  <a:srgbClr val="000000"/>
+                </a:solidFill>
+                <a:latin typeface="Arial" panose="020B0604020202020204" pitchFamily="34" charset="0"/>
+                <a:cs typeface="Arial" panose="020B0604020202020204" pitchFamily="34" charset="0"/>
+              </a:rPr>
+              <a:t>The actual annual number of houses going for sale is a random number generated from the normal distribution based on these two. In the future versions of the model this number could be made endogenous. Secondly, households that reside within a flood zone may choose to put their house on sale and look for a home in a safer location, which according to our survey data is more likely to happen when they have experienced a flood. As the simulation goes on, settled households may decide to relocate.</a:t>
+            </a:r>
+          </a:p>
+          <a:p>
+            <a:pPr marL="228600" indent="-228600">
+              <a:buFont typeface="+mj-lt"/>
+              <a:buAutoNum type="alphaLcParenR"/>
+            </a:pPr>
+            <a:r>
+              <a:rPr lang="en-US" sz="900" dirty="0">
+                <a:solidFill>
+                  <a:srgbClr val="000000"/>
+                </a:solidFill>
+                <a:latin typeface="Arial" panose="020B0604020202020204" pitchFamily="34" charset="0"/>
+                <a:cs typeface="Arial" panose="020B0604020202020204" pitchFamily="34" charset="0"/>
+              </a:rPr>
+              <a:t>At the beginning of a trading period active sellers announce their </a:t>
+            </a:r>
+            <a:r>
+              <a:rPr lang="en-US" sz="900" b="1" dirty="0">
+                <a:solidFill>
+                  <a:srgbClr val="000000"/>
+                </a:solidFill>
+                <a:latin typeface="Arial" panose="020B0604020202020204" pitchFamily="34" charset="0"/>
+                <a:cs typeface="Arial" panose="020B0604020202020204" pitchFamily="34" charset="0"/>
+              </a:rPr>
+              <a:t>ask prices</a:t>
+            </a:r>
+            <a:r>
+              <a:rPr lang="en-US" sz="900" dirty="0">
+                <a:solidFill>
+                  <a:srgbClr val="000000"/>
+                </a:solidFill>
+                <a:latin typeface="Arial" panose="020B0604020202020204" pitchFamily="34" charset="0"/>
+                <a:cs typeface="Arial" panose="020B0604020202020204" pitchFamily="34" charset="0"/>
+              </a:rPr>
+              <a:t>. This is done by combining hedonic regression on housing transactions with spatial interpolation (kriging) of the residuals of the regression. Following de Koning et al. (2016), hedonic regression is run with only a few of the main housing attributes: square footage, acreage, age, number of bedrooms and flood zone location. </a:t>
+            </a:r>
+            <a:r>
+              <a:rPr lang="en-US" sz="900" dirty="0">
+                <a:latin typeface="Arial" panose="020B0604020202020204" pitchFamily="34" charset="0"/>
+                <a:cs typeface="Arial" panose="020B0604020202020204" pitchFamily="34" charset="0"/>
+              </a:rPr>
+              <a:t>The residuals of the regression represent most of the location-specific attributes associated with the market value of a property, which is then interpolated over space using kriging. </a:t>
+            </a:r>
+          </a:p>
+          <a:p>
+            <a:pPr marL="228600" indent="-228600">
+              <a:buFont typeface="+mj-lt"/>
+              <a:buAutoNum type="alphaLcParenR"/>
+            </a:pPr>
+            <a:r>
+              <a:rPr lang="en-US" sz="900" dirty="0">
+                <a:latin typeface="Arial" panose="020B0604020202020204" pitchFamily="34" charset="0"/>
+                <a:cs typeface="Arial" panose="020B0604020202020204" pitchFamily="34" charset="0"/>
+              </a:rPr>
+              <a:t>On top of hedonic analysis and kriging, the algorithm that forms sellers’ ask price takes into account the demand for a segment of a market in the previous time step. For each property, the realtor checks the demand for a group of properties with the same characteristics. The observed demand for these properties relative to the expected demand (at time t-1) determines if the price should be lowered or raised (at time t).</a:t>
+            </a:r>
+          </a:p>
+          <a:p>
+            <a:pPr marL="228600" indent="-228600">
+              <a:buFont typeface="+mj-lt"/>
+              <a:buAutoNum type="alphaLcParenR"/>
+            </a:pPr>
+            <a:r>
+              <a:rPr lang="en-US" sz="900" dirty="0">
+                <a:latin typeface="Arial" panose="020B0604020202020204" pitchFamily="34" charset="0"/>
+                <a:cs typeface="Arial" panose="020B0604020202020204" pitchFamily="34" charset="0"/>
+              </a:rPr>
+              <a:t>All households in town (homeowners and buyers) update their experience with flooding – a binary true/false variable – after the floods. Housing prices reduce in anticipation of a drop in demand for properties in the flood zones. To capture this in the model, the flood affected sellers reduce their price by 13.8%, and sellers in the 100 year flood zone reduce their price by an additional 15.7% (empirically observed in the survey among sellers).</a:t>
+            </a:r>
+          </a:p>
+          <a:p>
+            <a:pPr marL="228600" indent="-228600">
+              <a:buFont typeface="+mj-lt"/>
+              <a:buAutoNum type="alphaLcParenR"/>
+            </a:pPr>
+            <a:r>
+              <a:rPr lang="en-US" sz="900" dirty="0">
+                <a:latin typeface="Arial" panose="020B0604020202020204" pitchFamily="34" charset="0"/>
+                <a:cs typeface="Arial" panose="020B0604020202020204" pitchFamily="34" charset="0"/>
+              </a:rPr>
+              <a:t>Homeowners that do have a mortgage will pay off their mortgage linearly in 30 years. This is another important aspect of the model, because it determines whether homeowners are capable of selling their house. If the expected price of their property on the market has dropped below their mortgage debt, for example as a result of a major flooding event, they will abolish their trade attempt. These traders are identified as ‘stuck’ in their homes.</a:t>
+            </a:r>
+          </a:p>
+          <a:p>
+            <a:pPr marL="228600" indent="-228600">
+              <a:buFont typeface="+mj-lt"/>
+              <a:buAutoNum type="alphaLcParenR"/>
+            </a:pPr>
+            <a:r>
+              <a:rPr lang="en-US" sz="900" dirty="0">
+                <a:latin typeface="Arial" panose="020B0604020202020204" pitchFamily="34" charset="0"/>
+                <a:cs typeface="Arial" panose="020B0604020202020204" pitchFamily="34" charset="0"/>
+              </a:rPr>
+              <a:t>Each time step a number of new buyers enter the market, approximately equivalent to the number of new properties on sale to avoid creating an excess of demand or supply artificially. Buyers randomly choose five properties affordable for their housing budget which varies across households. Insurance influences buyers’ decisions first in this phase. In the model with 100% insurance uptake, buyers limit their budget for properties in the flood zone to reserve fund for insurance costs</a:t>
+            </a:r>
+          </a:p>
+          <a:p>
+            <a:pPr marL="228600" indent="-228600">
+              <a:buFont typeface="+mj-lt"/>
+              <a:buAutoNum type="alphaLcParenR"/>
+            </a:pPr>
+            <a:r>
+              <a:rPr lang="en-US" sz="900" dirty="0">
+                <a:latin typeface="Arial" panose="020B0604020202020204" pitchFamily="34" charset="0"/>
+                <a:cs typeface="Arial" panose="020B0604020202020204" pitchFamily="34" charset="0"/>
+              </a:rPr>
+              <a:t>Buyers have subjective perceptions of risk, which are dynamic over time. Their risk perception variables determine whether buyers avoid buying properties in the 1:100 and 1:500 year reoccurring flood zones. This affects the demand for risk-prone properties.</a:t>
+            </a:r>
+          </a:p>
+          <a:p>
+            <a:pPr marL="228600" indent="-228600">
+              <a:buFont typeface="+mj-lt"/>
+              <a:buAutoNum type="alphaLcParenR"/>
+            </a:pPr>
+            <a:r>
+              <a:rPr lang="en-US" sz="900" dirty="0">
+                <a:latin typeface="Arial" panose="020B0604020202020204" pitchFamily="34" charset="0"/>
+                <a:cs typeface="Arial" panose="020B0604020202020204" pitchFamily="34" charset="0"/>
+              </a:rPr>
+              <a:t>Their utility for owning a property depends on a bundle of property attributes, neighborhood quality and a potential exposure to flood hazard. The base multi-attribute utility function (U0L, Eq.4.1) for a house in a safe area is parameterized using weights (Ai) that reflect relative importance of each characteristic (</a:t>
+            </a:r>
+            <a:r>
+              <a:rPr lang="en-US" sz="900" dirty="0" err="1">
+                <a:latin typeface="Arial" panose="020B0604020202020204" pitchFamily="34" charset="0"/>
+                <a:cs typeface="Arial" panose="020B0604020202020204" pitchFamily="34" charset="0"/>
+              </a:rPr>
+              <a:t>Xi,norm</a:t>
+            </a:r>
+            <a:r>
+              <a:rPr lang="en-US" sz="900" dirty="0">
+                <a:latin typeface="Arial" panose="020B0604020202020204" pitchFamily="34" charset="0"/>
+                <a:cs typeface="Arial" panose="020B0604020202020204" pitchFamily="34" charset="0"/>
+              </a:rPr>
+              <a:t>): 𝑈</a:t>
+            </a:r>
+            <a:r>
+              <a:rPr lang="en-US" sz="900" baseline="-25000" dirty="0">
+                <a:latin typeface="Arial" panose="020B0604020202020204" pitchFamily="34" charset="0"/>
+                <a:cs typeface="Arial" panose="020B0604020202020204" pitchFamily="34" charset="0"/>
+              </a:rPr>
+              <a:t>0𝐿</a:t>
+            </a:r>
+            <a:r>
+              <a:rPr lang="en-US" sz="900" dirty="0">
+                <a:latin typeface="Arial" panose="020B0604020202020204" pitchFamily="34" charset="0"/>
+                <a:cs typeface="Arial" panose="020B0604020202020204" pitchFamily="34" charset="0"/>
+              </a:rPr>
+              <a:t>=𝐴</a:t>
+            </a:r>
+            <a:r>
+              <a:rPr lang="en-US" sz="900" baseline="-25000" dirty="0">
+                <a:latin typeface="Arial" panose="020B0604020202020204" pitchFamily="34" charset="0"/>
+                <a:cs typeface="Arial" panose="020B0604020202020204" pitchFamily="34" charset="0"/>
+              </a:rPr>
+              <a:t>𝑖</a:t>
+            </a:r>
+            <a:r>
+              <a:rPr lang="en-US" sz="900" dirty="0">
+                <a:latin typeface="Arial" panose="020B0604020202020204" pitchFamily="34" charset="0"/>
+                <a:cs typeface="Arial" panose="020B0604020202020204" pitchFamily="34" charset="0"/>
+              </a:rPr>
+              <a:t>∗𝑋</a:t>
+            </a:r>
+            <a:r>
+              <a:rPr lang="en-US" sz="900" baseline="-25000" dirty="0">
+                <a:latin typeface="Arial" panose="020B0604020202020204" pitchFamily="34" charset="0"/>
+                <a:cs typeface="Arial" panose="020B0604020202020204" pitchFamily="34" charset="0"/>
+              </a:rPr>
+              <a:t>𝑖,𝑛𝑜𝑟𝑚</a:t>
+            </a:r>
+          </a:p>
+          <a:p>
+            <a:pPr marL="228600" indent="-228600">
+              <a:buFont typeface="+mj-lt"/>
+              <a:buAutoNum type="alphaLcParenR"/>
+            </a:pPr>
+            <a:r>
+              <a:rPr lang="en-US" sz="900" dirty="0">
+                <a:latin typeface="Arial" panose="020B0604020202020204" pitchFamily="34" charset="0"/>
+                <a:cs typeface="Arial" panose="020B0604020202020204" pitchFamily="34" charset="0"/>
+              </a:rPr>
+              <a:t>The transaction price is defined through a price negotiation procedure, which is based on bid and ask prices and relative market power of traders</a:t>
+            </a:r>
+          </a:p>
+          <a:p>
+            <a:pPr marL="228600" indent="-228600">
+              <a:buAutoNum type="alphaLcParenR"/>
+            </a:pPr>
+            <a:endParaRPr lang="en-US" sz="900" dirty="0">
+              <a:latin typeface="Arial" panose="020B0604020202020204" pitchFamily="34" charset="0"/>
+              <a:cs typeface="Arial" panose="020B0604020202020204" pitchFamily="34" charset="0"/>
+            </a:endParaRPr>
+          </a:p>
+        </p:txBody>
+      </p:sp>
+    </p:spTree>
+    <p:extLst>
+      <p:ext uri="{BB962C8B-B14F-4D97-AF65-F5344CB8AC3E}">
+        <p14:creationId xmlns:p14="http://schemas.microsoft.com/office/powerpoint/2010/main" val="792130605"/>
       </p:ext>
     </p:extLst>
   </p:cSld>

</xml_diff>

<commit_message>
Add early 90s household data for initialization; start simple Utility-based hh agent decisions
</commit_message>
<xml_diff>
--- a/ICoM ABM Guide.pptx
+++ b/ICoM ABM Guide.pptx
@@ -118,7 +118,7 @@
 <file path=ppt/revisionInfo.xml><?xml version="1.0" encoding="utf-8"?>
 <p1510:revInfo xmlns:a="http://schemas.openxmlformats.org/drawingml/2006/main" xmlns:r="http://schemas.openxmlformats.org/officeDocument/2006/relationships" xmlns:p1510="http://schemas.microsoft.com/office/powerpoint/2015/10/main">
   <p1510:revLst>
-    <p1510:client id="{05ABE6EC-5FB7-4B8B-A226-73F1B79CA086}" v="38" dt="2021-02-04T18:39:57.634"/>
+    <p1510:client id="{05ABE6EC-5FB7-4B8B-A226-73F1B79CA086}" v="39" dt="2021-02-13T00:18:41.660"/>
   </p1510:revLst>
 </p1510:revInfo>
 </file>
@@ -128,7 +128,7 @@
   <pc:docChgLst>
     <pc:chgData name="Yoon, James (Jim)" userId="8a7a915f-98f1-4b07-8503-3ec4b5ff3eac" providerId="ADAL" clId="{05ABE6EC-5FB7-4B8B-A226-73F1B79CA086}"/>
     <pc:docChg chg="undo custSel addSld delSld modSld">
-      <pc:chgData name="Yoon, James (Jim)" userId="8a7a915f-98f1-4b07-8503-3ec4b5ff3eac" providerId="ADAL" clId="{05ABE6EC-5FB7-4B8B-A226-73F1B79CA086}" dt="2021-02-04T18:42:36.950" v="1028" actId="20577"/>
+      <pc:chgData name="Yoon, James (Jim)" userId="8a7a915f-98f1-4b07-8503-3ec4b5ff3eac" providerId="ADAL" clId="{05ABE6EC-5FB7-4B8B-A226-73F1B79CA086}" dt="2021-02-13T00:18:45.890" v="1164" actId="20577"/>
       <pc:docMkLst>
         <pc:docMk/>
       </pc:docMkLst>
@@ -148,7 +148,7 @@
         </pc:picChg>
       </pc:sldChg>
       <pc:sldChg chg="addSp modSp mod">
-        <pc:chgData name="Yoon, James (Jim)" userId="8a7a915f-98f1-4b07-8503-3ec4b5ff3eac" providerId="ADAL" clId="{05ABE6EC-5FB7-4B8B-A226-73F1B79CA086}" dt="2021-01-21T19:41:10.564" v="95" actId="20577"/>
+        <pc:chgData name="Yoon, James (Jim)" userId="8a7a915f-98f1-4b07-8503-3ec4b5ff3eac" providerId="ADAL" clId="{05ABE6EC-5FB7-4B8B-A226-73F1B79CA086}" dt="2021-02-13T00:18:45.890" v="1164" actId="20577"/>
         <pc:sldMkLst>
           <pc:docMk/>
           <pc:sldMk cId="2364680872" sldId="258"/>
@@ -162,7 +162,7 @@
           </ac:spMkLst>
         </pc:spChg>
         <pc:spChg chg="mod">
-          <ac:chgData name="Yoon, James (Jim)" userId="8a7a915f-98f1-4b07-8503-3ec4b5ff3eac" providerId="ADAL" clId="{05ABE6EC-5FB7-4B8B-A226-73F1B79CA086}" dt="2021-01-21T19:29:26.294" v="37" actId="20577"/>
+          <ac:chgData name="Yoon, James (Jim)" userId="8a7a915f-98f1-4b07-8503-3ec4b5ff3eac" providerId="ADAL" clId="{05ABE6EC-5FB7-4B8B-A226-73F1B79CA086}" dt="2021-02-13T00:18:45.890" v="1164" actId="20577"/>
           <ac:spMkLst>
             <pc:docMk/>
             <pc:sldMk cId="2364680872" sldId="258"/>
@@ -440,7 +440,7 @@
           <a:p>
             <a:fld id="{7AC65AA3-70EE-4AAE-82B6-823552EBCD17}" type="datetimeFigureOut">
               <a:rPr lang="en-US" smtClean="0"/>
-              <a:t>2/4/2021</a:t>
+              <a:t>2/12/2021</a:t>
             </a:fld>
             <a:endParaRPr lang="en-US"/>
           </a:p>
@@ -638,7 +638,7 @@
           <a:p>
             <a:fld id="{7AC65AA3-70EE-4AAE-82B6-823552EBCD17}" type="datetimeFigureOut">
               <a:rPr lang="en-US" smtClean="0"/>
-              <a:t>2/4/2021</a:t>
+              <a:t>2/12/2021</a:t>
             </a:fld>
             <a:endParaRPr lang="en-US"/>
           </a:p>
@@ -846,7 +846,7 @@
           <a:p>
             <a:fld id="{7AC65AA3-70EE-4AAE-82B6-823552EBCD17}" type="datetimeFigureOut">
               <a:rPr lang="en-US" smtClean="0"/>
-              <a:t>2/4/2021</a:t>
+              <a:t>2/12/2021</a:t>
             </a:fld>
             <a:endParaRPr lang="en-US"/>
           </a:p>
@@ -1044,7 +1044,7 @@
           <a:p>
             <a:fld id="{7AC65AA3-70EE-4AAE-82B6-823552EBCD17}" type="datetimeFigureOut">
               <a:rPr lang="en-US" smtClean="0"/>
-              <a:t>2/4/2021</a:t>
+              <a:t>2/12/2021</a:t>
             </a:fld>
             <a:endParaRPr lang="en-US"/>
           </a:p>
@@ -1319,7 +1319,7 @@
           <a:p>
             <a:fld id="{7AC65AA3-70EE-4AAE-82B6-823552EBCD17}" type="datetimeFigureOut">
               <a:rPr lang="en-US" smtClean="0"/>
-              <a:t>2/4/2021</a:t>
+              <a:t>2/12/2021</a:t>
             </a:fld>
             <a:endParaRPr lang="en-US"/>
           </a:p>
@@ -1584,7 +1584,7 @@
           <a:p>
             <a:fld id="{7AC65AA3-70EE-4AAE-82B6-823552EBCD17}" type="datetimeFigureOut">
               <a:rPr lang="en-US" smtClean="0"/>
-              <a:t>2/4/2021</a:t>
+              <a:t>2/12/2021</a:t>
             </a:fld>
             <a:endParaRPr lang="en-US"/>
           </a:p>
@@ -1996,7 +1996,7 @@
           <a:p>
             <a:fld id="{7AC65AA3-70EE-4AAE-82B6-823552EBCD17}" type="datetimeFigureOut">
               <a:rPr lang="en-US" smtClean="0"/>
-              <a:t>2/4/2021</a:t>
+              <a:t>2/12/2021</a:t>
             </a:fld>
             <a:endParaRPr lang="en-US"/>
           </a:p>
@@ -2137,7 +2137,7 @@
           <a:p>
             <a:fld id="{7AC65AA3-70EE-4AAE-82B6-823552EBCD17}" type="datetimeFigureOut">
               <a:rPr lang="en-US" smtClean="0"/>
-              <a:t>2/4/2021</a:t>
+              <a:t>2/12/2021</a:t>
             </a:fld>
             <a:endParaRPr lang="en-US"/>
           </a:p>
@@ -2250,7 +2250,7 @@
           <a:p>
             <a:fld id="{7AC65AA3-70EE-4AAE-82B6-823552EBCD17}" type="datetimeFigureOut">
               <a:rPr lang="en-US" smtClean="0"/>
-              <a:t>2/4/2021</a:t>
+              <a:t>2/12/2021</a:t>
             </a:fld>
             <a:endParaRPr lang="en-US"/>
           </a:p>
@@ -2561,7 +2561,7 @@
           <a:p>
             <a:fld id="{7AC65AA3-70EE-4AAE-82B6-823552EBCD17}" type="datetimeFigureOut">
               <a:rPr lang="en-US" smtClean="0"/>
-              <a:t>2/4/2021</a:t>
+              <a:t>2/12/2021</a:t>
             </a:fld>
             <a:endParaRPr lang="en-US"/>
           </a:p>
@@ -2849,7 +2849,7 @@
           <a:p>
             <a:fld id="{7AC65AA3-70EE-4AAE-82B6-823552EBCD17}" type="datetimeFigureOut">
               <a:rPr lang="en-US" smtClean="0"/>
-              <a:t>2/4/2021</a:t>
+              <a:t>2/12/2021</a:t>
             </a:fld>
             <a:endParaRPr lang="en-US"/>
           </a:p>
@@ -3090,7 +3090,7 @@
           <a:p>
             <a:fld id="{7AC65AA3-70EE-4AAE-82B6-823552EBCD17}" type="datetimeFigureOut">
               <a:rPr lang="en-US" smtClean="0"/>
-              <a:t>2/4/2021</a:t>
+              <a:t>2/12/2021</a:t>
             </a:fld>
             <a:endParaRPr lang="en-US"/>
           </a:p>
@@ -4202,7 +4202,7 @@
         <p:spPr>
           <a:xfrm>
             <a:off x="258179" y="369332"/>
-            <a:ext cx="7618495" cy="6740307"/>
+            <a:ext cx="7618495" cy="4832092"/>
           </a:xfrm>
           <a:prstGeom prst="rect">
             <a:avLst/>
@@ -4220,7 +4220,7 @@
               <a:buAutoNum type="arabicPeriod"/>
             </a:pPr>
             <a:r>
-              <a:rPr lang="en-US" dirty="0" err="1">
+              <a:rPr lang="en-US" sz="1400" dirty="0" err="1">
                 <a:solidFill>
                   <a:schemeClr val="accent1"/>
                 </a:solidFill>
@@ -4228,7 +4228,7 @@
               <a:t>s.add_engine</a:t>
             </a:r>
             <a:r>
-              <a:rPr lang="en-US" dirty="0">
+              <a:rPr lang="en-US" sz="1400" dirty="0">
                 <a:solidFill>
                   <a:schemeClr val="accent1"/>
                 </a:solidFill>
@@ -4236,34 +4236,37 @@
               <a:t>(</a:t>
             </a:r>
             <a:r>
-              <a:rPr lang="en-US" dirty="0" err="1">
-                <a:solidFill>
-                  <a:schemeClr val="accent1"/>
-                </a:solidFill>
-              </a:rPr>
-              <a:t>NewAgentCreation</a:t>
-            </a:r>
-            <a:r>
-              <a:rPr lang="en-US" dirty="0">
-                <a:solidFill>
-                  <a:schemeClr val="accent1"/>
-                </a:solidFill>
-              </a:rPr>
-              <a:t>()) </a:t>
-            </a:r>
-            <a:r>
-              <a:rPr lang="en-US" dirty="0"/>
-              <a:t>- Creates new household agents based on population growth assumptions and adds them to the unassigned queue, </a:t>
-            </a:r>
-            <a:r>
-              <a:rPr lang="en-US" dirty="0" err="1">
-                <a:solidFill>
-                  <a:schemeClr val="accent1"/>
-                </a:solidFill>
-              </a:rPr>
-              <a:t>s.network.unassigned_hhs</a:t>
-            </a:r>
-            <a:endParaRPr lang="en-US" dirty="0">
+              <a:rPr lang="en-US" sz="1400" dirty="0" err="1">
+                <a:solidFill>
+                  <a:schemeClr val="accent1"/>
+                </a:solidFill>
+              </a:rPr>
+              <a:t>RealEstateAssessment</a:t>
+            </a:r>
+            <a:r>
+              <a:rPr lang="en-US" sz="1400" dirty="0">
+                <a:solidFill>
+                  <a:schemeClr val="accent1"/>
+                </a:solidFill>
+              </a:rPr>
+              <a:t>()) – </a:t>
+            </a:r>
+            <a:r>
+              <a:rPr lang="en-US" sz="1400" dirty="0"/>
+              <a:t>Real estate agent performs hedonic analysis on </a:t>
+            </a:r>
+            <a:r>
+              <a:rPr lang="en-US" sz="1400"/>
+              <a:t>the market (TO IMPLEMENT)</a:t>
+            </a:r>
+            <a:endParaRPr lang="en-US" sz="1400" dirty="0"/>
+          </a:p>
+          <a:p>
+            <a:pPr marL="342900" indent="-342900">
+              <a:buFont typeface="+mj-lt"/>
+              <a:buAutoNum type="arabicPeriod"/>
+            </a:pPr>
+            <a:endParaRPr lang="en-US" sz="1400" dirty="0">
               <a:solidFill>
                 <a:schemeClr val="accent1"/>
               </a:solidFill>
@@ -4274,15 +4277,70 @@
               <a:buFont typeface="+mj-lt"/>
               <a:buAutoNum type="arabicPeriod"/>
             </a:pPr>
-            <a:endParaRPr lang="en-US" dirty="0"/>
+            <a:r>
+              <a:rPr lang="en-US" sz="1400" dirty="0" err="1">
+                <a:solidFill>
+                  <a:schemeClr val="accent1"/>
+                </a:solidFill>
+              </a:rPr>
+              <a:t>s.add_engine</a:t>
+            </a:r>
+            <a:r>
+              <a:rPr lang="en-US" sz="1400" dirty="0">
+                <a:solidFill>
+                  <a:schemeClr val="accent1"/>
+                </a:solidFill>
+              </a:rPr>
+              <a:t>(</a:t>
+            </a:r>
+            <a:r>
+              <a:rPr lang="en-US" sz="1400" dirty="0" err="1">
+                <a:solidFill>
+                  <a:schemeClr val="accent1"/>
+                </a:solidFill>
+              </a:rPr>
+              <a:t>NewAgentCreation</a:t>
+            </a:r>
+            <a:r>
+              <a:rPr lang="en-US" sz="1400" dirty="0">
+                <a:solidFill>
+                  <a:schemeClr val="accent1"/>
+                </a:solidFill>
+              </a:rPr>
+              <a:t>()) </a:t>
+            </a:r>
+            <a:r>
+              <a:rPr lang="en-US" sz="1400" dirty="0"/>
+              <a:t>- Creates new household agents based on population growth assumptions and adds them to the unassigned queue, </a:t>
+            </a:r>
+            <a:r>
+              <a:rPr lang="en-US" sz="1400" dirty="0" err="1">
+                <a:solidFill>
+                  <a:schemeClr val="accent1"/>
+                </a:solidFill>
+              </a:rPr>
+              <a:t>s.network.unassigned_hhs</a:t>
+            </a:r>
+            <a:endParaRPr lang="en-US" sz="1400" dirty="0">
+              <a:solidFill>
+                <a:schemeClr val="accent1"/>
+              </a:solidFill>
+            </a:endParaRPr>
           </a:p>
           <a:p>
             <a:pPr marL="342900" indent="-342900">
               <a:buFont typeface="+mj-lt"/>
               <a:buAutoNum type="arabicPeriod"/>
             </a:pPr>
-            <a:r>
-              <a:rPr lang="en-US" dirty="0" err="1">
+            <a:endParaRPr lang="en-US" sz="1400" dirty="0"/>
+          </a:p>
+          <a:p>
+            <a:pPr marL="342900" indent="-342900">
+              <a:buFont typeface="+mj-lt"/>
+              <a:buAutoNum type="arabicPeriod"/>
+            </a:pPr>
+            <a:r>
+              <a:rPr lang="en-US" sz="1400" dirty="0" err="1">
                 <a:solidFill>
                   <a:schemeClr val="accent1"/>
                 </a:solidFill>
@@ -4290,7 +4348,7 @@
               <a:t>s.add_engine</a:t>
             </a:r>
             <a:r>
-              <a:rPr lang="en-US" dirty="0">
+              <a:rPr lang="en-US" sz="1400" dirty="0">
                 <a:solidFill>
                   <a:schemeClr val="accent1"/>
                 </a:solidFill>
@@ -4298,7 +4356,7 @@
               <a:t>(</a:t>
             </a:r>
             <a:r>
-              <a:rPr lang="en-US" dirty="0" err="1">
+              <a:rPr lang="en-US" sz="1400" dirty="0" err="1">
                 <a:solidFill>
                   <a:schemeClr val="accent1"/>
                 </a:solidFill>
@@ -4306,7 +4364,7 @@
               <a:t>ExistingAgentReloSampler</a:t>
             </a:r>
             <a:r>
-              <a:rPr lang="en-US" dirty="0">
+              <a:rPr lang="en-US" sz="1400" dirty="0">
                 <a:solidFill>
                   <a:schemeClr val="accent1"/>
                 </a:solidFill>
@@ -4314,18 +4372,18 @@
               <a:t>())</a:t>
             </a:r>
             <a:r>
-              <a:rPr lang="en-US" dirty="0"/>
-              <a:t> – Identifies existing household agents that want to re-location and adds them to the relocating queue, </a:t>
-            </a:r>
-            <a:r>
-              <a:rPr lang="en-US" dirty="0" err="1">
+              <a:rPr lang="en-US" sz="1400" dirty="0"/>
+              <a:t> – Identifies existing household agents that want to re-locate and adds them to the relocating queue, </a:t>
+            </a:r>
+            <a:r>
+              <a:rPr lang="en-US" sz="1400" dirty="0" err="1">
                 <a:solidFill>
                   <a:schemeClr val="accent1"/>
                 </a:solidFill>
               </a:rPr>
               <a:t>s.network.relocating_hhs</a:t>
             </a:r>
-            <a:endParaRPr lang="en-US" dirty="0">
+            <a:endParaRPr lang="en-US" sz="1400" dirty="0">
               <a:solidFill>
                 <a:schemeClr val="accent1"/>
               </a:solidFill>
@@ -4336,7 +4394,7 @@
               <a:buFont typeface="+mj-lt"/>
               <a:buAutoNum type="arabicPeriod"/>
             </a:pPr>
-            <a:endParaRPr lang="en-US" dirty="0">
+            <a:endParaRPr lang="en-US" sz="1400" dirty="0">
               <a:solidFill>
                 <a:schemeClr val="accent1"/>
               </a:solidFill>
@@ -4348,7 +4406,7 @@
               <a:buAutoNum type="arabicPeriod"/>
             </a:pPr>
             <a:r>
-              <a:rPr lang="en-US" dirty="0" err="1">
+              <a:rPr lang="en-US" sz="1400" dirty="0" err="1">
                 <a:solidFill>
                   <a:schemeClr val="accent1"/>
                 </a:solidFill>
@@ -4356,7 +4414,7 @@
               <a:t>s.add_engine</a:t>
             </a:r>
             <a:r>
-              <a:rPr lang="en-US" dirty="0">
+              <a:rPr lang="en-US" sz="1400" dirty="0">
                 <a:solidFill>
                   <a:schemeClr val="accent1"/>
                 </a:solidFill>
@@ -4364,7 +4422,7 @@
               <a:t>(</a:t>
             </a:r>
             <a:r>
-              <a:rPr lang="en-US" dirty="0" err="1">
+              <a:rPr lang="en-US" sz="1400" dirty="0" err="1">
                 <a:solidFill>
                   <a:schemeClr val="accent1"/>
                 </a:solidFill>
@@ -4372,7 +4430,7 @@
               <a:t>HousingInventory</a:t>
             </a:r>
             <a:r>
-              <a:rPr lang="en-US" dirty="0">
+              <a:rPr lang="en-US" sz="1400" dirty="0">
                 <a:solidFill>
                   <a:schemeClr val="accent1"/>
                 </a:solidFill>
@@ -4380,18 +4438,18 @@
               <a:t>()) </a:t>
             </a:r>
             <a:r>
-              <a:rPr lang="en-US" dirty="0"/>
+              <a:rPr lang="en-US" sz="1400" dirty="0"/>
               <a:t>– Determines the housing inventory available for each block group, </a:t>
             </a:r>
             <a:r>
-              <a:rPr lang="en-US" dirty="0" err="1">
+              <a:rPr lang="en-US" sz="1400" dirty="0" err="1">
                 <a:solidFill>
                   <a:schemeClr val="accent1"/>
                 </a:solidFill>
               </a:rPr>
               <a:t>s.network.available_units_list</a:t>
             </a:r>
-            <a:endParaRPr lang="en-US" dirty="0">
+            <a:endParaRPr lang="en-US" sz="1400" dirty="0">
               <a:solidFill>
                 <a:schemeClr val="accent1"/>
               </a:solidFill>
@@ -4402,7 +4460,7 @@
               <a:buFont typeface="+mj-lt"/>
               <a:buAutoNum type="arabicPeriod"/>
             </a:pPr>
-            <a:endParaRPr lang="en-US" dirty="0">
+            <a:endParaRPr lang="en-US" sz="1400" dirty="0">
               <a:solidFill>
                 <a:schemeClr val="accent1"/>
               </a:solidFill>
@@ -4414,7 +4472,7 @@
               <a:buAutoNum type="arabicPeriod"/>
             </a:pPr>
             <a:r>
-              <a:rPr lang="en-US" dirty="0" err="1">
+              <a:rPr lang="en-US" sz="1400" dirty="0" err="1">
                 <a:solidFill>
                   <a:schemeClr val="accent1"/>
                 </a:solidFill>
@@ -4422,7 +4480,7 @@
               <a:t>s.add_engine</a:t>
             </a:r>
             <a:r>
-              <a:rPr lang="en-US" dirty="0">
+              <a:rPr lang="en-US" sz="1400" dirty="0">
                 <a:solidFill>
                   <a:schemeClr val="accent1"/>
                 </a:solidFill>
@@ -4430,7 +4488,7 @@
               <a:t>(</a:t>
             </a:r>
             <a:r>
-              <a:rPr lang="en-US" dirty="0" err="1">
+              <a:rPr lang="en-US" sz="1400" dirty="0" err="1">
                 <a:solidFill>
                   <a:schemeClr val="accent1"/>
                 </a:solidFill>
@@ -4438,7 +4496,7 @@
               <a:t>NewAgentLocation</a:t>
             </a:r>
             <a:r>
-              <a:rPr lang="en-US" dirty="0">
+              <a:rPr lang="en-US" sz="1400" dirty="0">
                 <a:solidFill>
                   <a:schemeClr val="accent1"/>
                 </a:solidFill>
@@ -4446,11 +4504,11 @@
               <a:t>()) – </a:t>
             </a:r>
             <a:r>
-              <a:rPr lang="en-US" dirty="0"/>
+              <a:rPr lang="en-US" sz="1400" dirty="0"/>
               <a:t>For each agent in </a:t>
             </a:r>
             <a:r>
-              <a:rPr lang="en-US" dirty="0" err="1">
+              <a:rPr lang="en-US" sz="1400" dirty="0" err="1">
                 <a:solidFill>
                   <a:schemeClr val="accent1"/>
                 </a:solidFill>
@@ -4458,7 +4516,7 @@
               <a:t>s.network.unassigned_hhs</a:t>
             </a:r>
             <a:r>
-              <a:rPr lang="en-US" dirty="0">
+              <a:rPr lang="en-US" sz="1400" dirty="0">
                 <a:solidFill>
                   <a:schemeClr val="accent1"/>
                 </a:solidFill>
@@ -4466,18 +4524,18 @@
               <a:t> </a:t>
             </a:r>
             <a:r>
-              <a:rPr lang="en-US" dirty="0"/>
+              <a:rPr lang="en-US" sz="1400" dirty="0"/>
               <a:t>sample 10 available properties and calculate utility, </a:t>
             </a:r>
             <a:r>
-              <a:rPr lang="en-US" dirty="0" err="1">
+              <a:rPr lang="en-US" sz="1400" dirty="0" err="1">
                 <a:solidFill>
                   <a:schemeClr val="accent1"/>
                 </a:solidFill>
               </a:rPr>
               <a:t>example_hh_agent.hh_utilities</a:t>
             </a:r>
-            <a:endParaRPr lang="en-US" dirty="0">
+            <a:endParaRPr lang="en-US" sz="1400" dirty="0">
               <a:solidFill>
                 <a:schemeClr val="accent1"/>
               </a:solidFill>
@@ -4488,7 +4546,7 @@
               <a:buFont typeface="+mj-lt"/>
               <a:buAutoNum type="arabicPeriod"/>
             </a:pPr>
-            <a:endParaRPr lang="en-US" dirty="0"/>
+            <a:endParaRPr lang="en-US" sz="1400" dirty="0"/>
           </a:p>
           <a:p>
             <a:pPr marL="342900" indent="-342900">
@@ -4496,7 +4554,7 @@
               <a:buAutoNum type="arabicPeriod"/>
             </a:pPr>
             <a:r>
-              <a:rPr lang="en-US" dirty="0" err="1">
+              <a:rPr lang="en-US" sz="1400" dirty="0" err="1">
                 <a:solidFill>
                   <a:schemeClr val="accent1"/>
                 </a:solidFill>
@@ -4504,7 +4562,7 @@
               <a:t>s.add_engine</a:t>
             </a:r>
             <a:r>
-              <a:rPr lang="en-US" dirty="0">
+              <a:rPr lang="en-US" sz="1400" dirty="0">
                 <a:solidFill>
                   <a:schemeClr val="accent1"/>
                 </a:solidFill>
@@ -4512,7 +4570,7 @@
               <a:t>(</a:t>
             </a:r>
             <a:r>
-              <a:rPr lang="en-US" dirty="0" err="1">
+              <a:rPr lang="en-US" sz="1400" dirty="0" err="1">
                 <a:solidFill>
                   <a:schemeClr val="accent1"/>
                 </a:solidFill>
@@ -4520,7 +4578,7 @@
               <a:t>ExistingAgentLocation</a:t>
             </a:r>
             <a:r>
-              <a:rPr lang="en-US" dirty="0">
+              <a:rPr lang="en-US" sz="1400" dirty="0">
                 <a:solidFill>
                   <a:schemeClr val="accent1"/>
                 </a:solidFill>
@@ -4528,11 +4586,11 @@
               <a:t>()) </a:t>
             </a:r>
             <a:r>
-              <a:rPr lang="en-US" dirty="0"/>
+              <a:rPr lang="en-US" sz="1400" dirty="0"/>
               <a:t>– For each agent in </a:t>
             </a:r>
             <a:r>
-              <a:rPr lang="en-US" dirty="0" err="1">
+              <a:rPr lang="en-US" sz="1400" dirty="0" err="1">
                 <a:solidFill>
                   <a:schemeClr val="accent1"/>
                 </a:solidFill>
@@ -4540,7 +4598,7 @@
               <a:t>s.network.relocating_hhs</a:t>
             </a:r>
             <a:r>
-              <a:rPr lang="en-US" dirty="0">
+              <a:rPr lang="en-US" sz="1400" dirty="0">
                 <a:solidFill>
                   <a:schemeClr val="accent1"/>
                 </a:solidFill>
@@ -4548,18 +4606,18 @@
               <a:t> </a:t>
             </a:r>
             <a:r>
-              <a:rPr lang="en-US" dirty="0"/>
+              <a:rPr lang="en-US" sz="1400" dirty="0"/>
               <a:t>sample 10 available properties and calculate utility, </a:t>
             </a:r>
             <a:r>
-              <a:rPr lang="en-US" dirty="0" err="1">
+              <a:rPr lang="en-US" sz="1400" dirty="0" err="1">
                 <a:solidFill>
                   <a:schemeClr val="accent1"/>
                 </a:solidFill>
               </a:rPr>
               <a:t>example_hh_agent.hh_utilities</a:t>
             </a:r>
-            <a:endParaRPr lang="en-US" dirty="0">
+            <a:endParaRPr lang="en-US" sz="1400" dirty="0">
               <a:solidFill>
                 <a:schemeClr val="accent1"/>
               </a:solidFill>
@@ -4570,7 +4628,7 @@
               <a:buFont typeface="+mj-lt"/>
               <a:buAutoNum type="arabicPeriod"/>
             </a:pPr>
-            <a:endParaRPr lang="en-US" dirty="0">
+            <a:endParaRPr lang="en-US" sz="1400" dirty="0">
               <a:solidFill>
                 <a:schemeClr val="accent1"/>
               </a:solidFill>
@@ -4582,7 +4640,7 @@
               <a:buAutoNum type="arabicPeriod"/>
             </a:pPr>
             <a:r>
-              <a:rPr lang="en-US" dirty="0" err="1">
+              <a:rPr lang="en-US" sz="1400" dirty="0" err="1">
                 <a:solidFill>
                   <a:schemeClr val="accent1"/>
                 </a:solidFill>
@@ -4590,7 +4648,7 @@
               <a:t>s.add_engine</a:t>
             </a:r>
             <a:r>
-              <a:rPr lang="en-US" dirty="0">
+              <a:rPr lang="en-US" sz="1400" dirty="0">
                 <a:solidFill>
                   <a:schemeClr val="accent1"/>
                 </a:solidFill>
@@ -4598,7 +4656,7 @@
               <a:t>(</a:t>
             </a:r>
             <a:r>
-              <a:rPr lang="en-US" dirty="0" err="1">
+              <a:rPr lang="en-US" sz="1400" dirty="0" err="1">
                 <a:solidFill>
                   <a:schemeClr val="accent1"/>
                 </a:solidFill>
@@ -4606,7 +4664,7 @@
               <a:t>HousingMarket</a:t>
             </a:r>
             <a:r>
-              <a:rPr lang="en-US" dirty="0">
+              <a:rPr lang="en-US" sz="1400" dirty="0">
                 <a:solidFill>
                   <a:schemeClr val="accent1"/>
                 </a:solidFill>
@@ -4614,11 +4672,11 @@
               <a:t>()) – </a:t>
             </a:r>
             <a:r>
-              <a:rPr lang="en-US" dirty="0"/>
+              <a:rPr lang="en-US" sz="1400" dirty="0"/>
               <a:t>Matches agents in </a:t>
             </a:r>
             <a:r>
-              <a:rPr lang="en-US" dirty="0" err="1">
+              <a:rPr lang="en-US" sz="1400" dirty="0" err="1">
                 <a:solidFill>
                   <a:schemeClr val="accent1"/>
                 </a:solidFill>
@@ -4626,7 +4684,7 @@
               <a:t>s.network.unassigned_hhs</a:t>
             </a:r>
             <a:r>
-              <a:rPr lang="en-US" dirty="0">
+              <a:rPr lang="en-US" sz="1400" dirty="0">
                 <a:solidFill>
                   <a:schemeClr val="accent1"/>
                 </a:solidFill>
@@ -4634,11 +4692,11 @@
               <a:t> </a:t>
             </a:r>
             <a:r>
-              <a:rPr lang="en-US" dirty="0"/>
+              <a:rPr lang="en-US" sz="1400" dirty="0"/>
               <a:t>and </a:t>
             </a:r>
             <a:r>
-              <a:rPr lang="en-US" dirty="0" err="1">
+              <a:rPr lang="en-US" sz="1400" dirty="0" err="1">
                 <a:solidFill>
                   <a:schemeClr val="accent1"/>
                 </a:solidFill>
@@ -4646,7 +4704,7 @@
               <a:t>s.network.relocating_hhs</a:t>
             </a:r>
             <a:r>
-              <a:rPr lang="en-US" dirty="0">
+              <a:rPr lang="en-US" sz="1400" dirty="0">
                 <a:solidFill>
                   <a:schemeClr val="accent1"/>
                 </a:solidFill>
@@ -4654,7 +4712,7 @@
               <a:t> </a:t>
             </a:r>
             <a:r>
-              <a:rPr lang="en-US" dirty="0"/>
+              <a:rPr lang="en-US" sz="1400" dirty="0"/>
               <a:t>with top properties.</a:t>
             </a:r>
           </a:p>
@@ -4663,14 +4721,14 @@
               <a:buFont typeface="+mj-lt"/>
               <a:buAutoNum type="arabicPeriod"/>
             </a:pPr>
-            <a:endParaRPr lang="en-US" dirty="0"/>
+            <a:endParaRPr lang="en-US" sz="1400" dirty="0"/>
           </a:p>
           <a:p>
             <a:pPr marL="342900" indent="-342900">
               <a:buFont typeface="+mj-lt"/>
               <a:buAutoNum type="arabicPeriod"/>
             </a:pPr>
-            <a:endParaRPr lang="en-US" dirty="0"/>
+            <a:endParaRPr lang="en-US" sz="1400" dirty="0"/>
           </a:p>
         </p:txBody>
       </p:sp>

</xml_diff>

<commit_message>
Add additional block group properties / population statistics; Additional post-processing visual examples
</commit_message>
<xml_diff>
--- a/ICoM ABM Guide.pptx
+++ b/ICoM ABM Guide.pptx
@@ -9,6 +9,7 @@
     <p:sldId id="256" r:id="rId6"/>
     <p:sldId id="258" r:id="rId7"/>
     <p:sldId id="259" r:id="rId8"/>
+    <p:sldId id="260" r:id="rId9"/>
   </p:sldIdLst>
   <p:sldSz cx="12192000" cy="6858000"/>
   <p:notesSz cx="6858000" cy="9144000"/>
@@ -118,7 +119,7 @@
 <file path=ppt/revisionInfo.xml><?xml version="1.0" encoding="utf-8"?>
 <p1510:revInfo xmlns:a="http://schemas.openxmlformats.org/drawingml/2006/main" xmlns:r="http://schemas.openxmlformats.org/officeDocument/2006/relationships" xmlns:p1510="http://schemas.microsoft.com/office/powerpoint/2015/10/main">
   <p1510:revLst>
-    <p1510:client id="{05ABE6EC-5FB7-4B8B-A226-73F1B79CA086}" v="39" dt="2021-02-13T00:18:41.660"/>
+    <p1510:client id="{05ABE6EC-5FB7-4B8B-A226-73F1B79CA086}" v="527" dt="2021-02-25T20:45:28.640"/>
   </p1510:revLst>
 </p1510:revInfo>
 </file>
@@ -128,7 +129,7 @@
   <pc:docChgLst>
     <pc:chgData name="Yoon, James (Jim)" userId="8a7a915f-98f1-4b07-8503-3ec4b5ff3eac" providerId="ADAL" clId="{05ABE6EC-5FB7-4B8B-A226-73F1B79CA086}"/>
     <pc:docChg chg="undo custSel addSld delSld modSld">
-      <pc:chgData name="Yoon, James (Jim)" userId="8a7a915f-98f1-4b07-8503-3ec4b5ff3eac" providerId="ADAL" clId="{05ABE6EC-5FB7-4B8B-A226-73F1B79CA086}" dt="2021-02-13T00:18:45.890" v="1164" actId="20577"/>
+      <pc:chgData name="Yoon, James (Jim)" userId="8a7a915f-98f1-4b07-8503-3ec4b5ff3eac" providerId="ADAL" clId="{05ABE6EC-5FB7-4B8B-A226-73F1B79CA086}" dt="2021-02-25T20:45:28.640" v="2004" actId="20577"/>
       <pc:docMkLst>
         <pc:docMk/>
       </pc:docMkLst>
@@ -211,7 +212,7 @@
         </pc:picChg>
       </pc:sldChg>
       <pc:sldChg chg="addSp delSp modSp add mod">
-        <pc:chgData name="Yoon, James (Jim)" userId="8a7a915f-98f1-4b07-8503-3ec4b5ff3eac" providerId="ADAL" clId="{05ABE6EC-5FB7-4B8B-A226-73F1B79CA086}" dt="2021-02-04T18:42:36.950" v="1028" actId="20577"/>
+        <pc:chgData name="Yoon, James (Jim)" userId="8a7a915f-98f1-4b07-8503-3ec4b5ff3eac" providerId="ADAL" clId="{05ABE6EC-5FB7-4B8B-A226-73F1B79CA086}" dt="2021-02-25T19:19:15.089" v="1336" actId="113"/>
         <pc:sldMkLst>
           <pc:docMk/>
           <pc:sldMk cId="792130605" sldId="259"/>
@@ -233,7 +234,7 @@
           </ac:spMkLst>
         </pc:spChg>
         <pc:spChg chg="mod">
-          <ac:chgData name="Yoon, James (Jim)" userId="8a7a915f-98f1-4b07-8503-3ec4b5ff3eac" providerId="ADAL" clId="{05ABE6EC-5FB7-4B8B-A226-73F1B79CA086}" dt="2021-02-04T18:42:36.950" v="1028" actId="20577"/>
+          <ac:chgData name="Yoon, James (Jim)" userId="8a7a915f-98f1-4b07-8503-3ec4b5ff3eac" providerId="ADAL" clId="{05ABE6EC-5FB7-4B8B-A226-73F1B79CA086}" dt="2021-02-25T19:19:15.089" v="1336" actId="113"/>
           <ac:spMkLst>
             <pc:docMk/>
             <pc:sldMk cId="792130605" sldId="259"/>
@@ -288,6 +289,109 @@
           <pc:sldMk cId="3513259940" sldId="259"/>
         </pc:sldMkLst>
       </pc:sldChg>
+      <pc:sldChg chg="addSp delSp modSp add mod">
+        <pc:chgData name="Yoon, James (Jim)" userId="8a7a915f-98f1-4b07-8503-3ec4b5ff3eac" providerId="ADAL" clId="{05ABE6EC-5FB7-4B8B-A226-73F1B79CA086}" dt="2021-02-25T20:45:28.640" v="2004" actId="20577"/>
+        <pc:sldMkLst>
+          <pc:docMk/>
+          <pc:sldMk cId="3787694969" sldId="260"/>
+        </pc:sldMkLst>
+        <pc:spChg chg="add mod">
+          <ac:chgData name="Yoon, James (Jim)" userId="8a7a915f-98f1-4b07-8503-3ec4b5ff3eac" providerId="ADAL" clId="{05ABE6EC-5FB7-4B8B-A226-73F1B79CA086}" dt="2021-02-25T19:41:52.938" v="2000" actId="20577"/>
+          <ac:spMkLst>
+            <pc:docMk/>
+            <pc:sldMk cId="3787694969" sldId="260"/>
+            <ac:spMk id="2" creationId="{83996858-15F0-4CD5-B4CE-BE3E1B42898B}"/>
+          </ac:spMkLst>
+        </pc:spChg>
+        <pc:spChg chg="del">
+          <ac:chgData name="Yoon, James (Jim)" userId="8a7a915f-98f1-4b07-8503-3ec4b5ff3eac" providerId="ADAL" clId="{05ABE6EC-5FB7-4B8B-A226-73F1B79CA086}" dt="2021-02-25T19:17:04.034" v="1166" actId="478"/>
+          <ac:spMkLst>
+            <pc:docMk/>
+            <pc:sldMk cId="3787694969" sldId="260"/>
+            <ac:spMk id="3" creationId="{30F0C87A-CB8B-4A90-8C20-9772B6E61BC9}"/>
+          </ac:spMkLst>
+        </pc:spChg>
+        <pc:spChg chg="add mod">
+          <ac:chgData name="Yoon, James (Jim)" userId="8a7a915f-98f1-4b07-8503-3ec4b5ff3eac" providerId="ADAL" clId="{05ABE6EC-5FB7-4B8B-A226-73F1B79CA086}" dt="2021-02-25T19:33:35.591" v="1873"/>
+          <ac:spMkLst>
+            <pc:docMk/>
+            <pc:sldMk cId="3787694969" sldId="260"/>
+            <ac:spMk id="4" creationId="{C85224DF-87E2-476A-825F-9B43518BAA2F}"/>
+          </ac:spMkLst>
+        </pc:spChg>
+        <pc:spChg chg="del">
+          <ac:chgData name="Yoon, James (Jim)" userId="8a7a915f-98f1-4b07-8503-3ec4b5ff3eac" providerId="ADAL" clId="{05ABE6EC-5FB7-4B8B-A226-73F1B79CA086}" dt="2021-02-25T19:17:04.034" v="1166" actId="478"/>
+          <ac:spMkLst>
+            <pc:docMk/>
+            <pc:sldMk cId="3787694969" sldId="260"/>
+            <ac:spMk id="5" creationId="{3E519C2A-1ECD-4685-BEC0-34C070D06C9C}"/>
+          </ac:spMkLst>
+        </pc:spChg>
+        <pc:spChg chg="add del mod">
+          <ac:chgData name="Yoon, James (Jim)" userId="8a7a915f-98f1-4b07-8503-3ec4b5ff3eac" providerId="ADAL" clId="{05ABE6EC-5FB7-4B8B-A226-73F1B79CA086}" dt="2021-02-25T19:22:50.855" v="1380" actId="478"/>
+          <ac:spMkLst>
+            <pc:docMk/>
+            <pc:sldMk cId="3787694969" sldId="260"/>
+            <ac:spMk id="6" creationId="{A4800485-CD57-4403-A5FD-901AE84DBB1C}"/>
+          </ac:spMkLst>
+        </pc:spChg>
+        <pc:spChg chg="add mod">
+          <ac:chgData name="Yoon, James (Jim)" userId="8a7a915f-98f1-4b07-8503-3ec4b5ff3eac" providerId="ADAL" clId="{05ABE6EC-5FB7-4B8B-A226-73F1B79CA086}" dt="2021-02-25T20:45:28.640" v="2004" actId="20577"/>
+          <ac:spMkLst>
+            <pc:docMk/>
+            <pc:sldMk cId="3787694969" sldId="260"/>
+            <ac:spMk id="7" creationId="{1190D5C9-B32B-4934-9A6B-5B460EFFE5DC}"/>
+          </ac:spMkLst>
+        </pc:spChg>
+        <pc:spChg chg="add mod">
+          <ac:chgData name="Yoon, James (Jim)" userId="8a7a915f-98f1-4b07-8503-3ec4b5ff3eac" providerId="ADAL" clId="{05ABE6EC-5FB7-4B8B-A226-73F1B79CA086}" dt="2021-02-25T19:41:50.526" v="1997" actId="20577"/>
+          <ac:spMkLst>
+            <pc:docMk/>
+            <pc:sldMk cId="3787694969" sldId="260"/>
+            <ac:spMk id="8" creationId="{72812B12-14FF-460D-808A-A9C1DF793EE0}"/>
+          </ac:spMkLst>
+        </pc:spChg>
+        <pc:spChg chg="mod">
+          <ac:chgData name="Yoon, James (Jim)" userId="8a7a915f-98f1-4b07-8503-3ec4b5ff3eac" providerId="ADAL" clId="{05ABE6EC-5FB7-4B8B-A226-73F1B79CA086}" dt="2021-02-25T19:19:21.470" v="1337" actId="20577"/>
+          <ac:spMkLst>
+            <pc:docMk/>
+            <pc:sldMk cId="3787694969" sldId="260"/>
+            <ac:spMk id="9" creationId="{56F25AF1-1195-475E-BB00-45536AF81C68}"/>
+          </ac:spMkLst>
+        </pc:spChg>
+        <pc:spChg chg="add mod">
+          <ac:chgData name="Yoon, James (Jim)" userId="8a7a915f-98f1-4b07-8503-3ec4b5ff3eac" providerId="ADAL" clId="{05ABE6EC-5FB7-4B8B-A226-73F1B79CA086}" dt="2021-02-25T19:41:44.276" v="1994" actId="1076"/>
+          <ac:spMkLst>
+            <pc:docMk/>
+            <pc:sldMk cId="3787694969" sldId="260"/>
+            <ac:spMk id="10" creationId="{7A439AB9-2C1C-4794-96B8-CF06FC0A3699}"/>
+          </ac:spMkLst>
+        </pc:spChg>
+        <pc:spChg chg="add del mod">
+          <ac:chgData name="Yoon, James (Jim)" userId="8a7a915f-98f1-4b07-8503-3ec4b5ff3eac" providerId="ADAL" clId="{05ABE6EC-5FB7-4B8B-A226-73F1B79CA086}" dt="2021-02-25T19:33:14.744" v="1868"/>
+          <ac:spMkLst>
+            <pc:docMk/>
+            <pc:sldMk cId="3787694969" sldId="260"/>
+            <ac:spMk id="11" creationId="{FC379450-F23E-4B8C-823C-6619F117C5FB}"/>
+          </ac:spMkLst>
+        </pc:spChg>
+        <pc:spChg chg="add mod">
+          <ac:chgData name="Yoon, James (Jim)" userId="8a7a915f-98f1-4b07-8503-3ec4b5ff3eac" providerId="ADAL" clId="{05ABE6EC-5FB7-4B8B-A226-73F1B79CA086}" dt="2021-02-25T19:41:56.166" v="2003" actId="20577"/>
+          <ac:spMkLst>
+            <pc:docMk/>
+            <pc:sldMk cId="3787694969" sldId="260"/>
+            <ac:spMk id="12" creationId="{B246BA4F-1881-431D-92B9-DF1B861FAB09}"/>
+          </ac:spMkLst>
+        </pc:spChg>
+        <pc:spChg chg="add mod">
+          <ac:chgData name="Yoon, James (Jim)" userId="8a7a915f-98f1-4b07-8503-3ec4b5ff3eac" providerId="ADAL" clId="{05ABE6EC-5FB7-4B8B-A226-73F1B79CA086}" dt="2021-02-25T19:38:44.930" v="1992" actId="1076"/>
+          <ac:spMkLst>
+            <pc:docMk/>
+            <pc:sldMk cId="3787694969" sldId="260"/>
+            <ac:spMk id="13" creationId="{ED1990C1-BD63-4ABC-AEF1-476F53765403}"/>
+          </ac:spMkLst>
+        </pc:spChg>
+      </pc:sldChg>
     </pc:docChg>
   </pc:docChgLst>
 </pc:chgInfo>
@@ -440,7 +544,7 @@
           <a:p>
             <a:fld id="{7AC65AA3-70EE-4AAE-82B6-823552EBCD17}" type="datetimeFigureOut">
               <a:rPr lang="en-US" smtClean="0"/>
-              <a:t>2/12/2021</a:t>
+              <a:t>2/25/2021</a:t>
             </a:fld>
             <a:endParaRPr lang="en-US"/>
           </a:p>
@@ -638,7 +742,7 @@
           <a:p>
             <a:fld id="{7AC65AA3-70EE-4AAE-82B6-823552EBCD17}" type="datetimeFigureOut">
               <a:rPr lang="en-US" smtClean="0"/>
-              <a:t>2/12/2021</a:t>
+              <a:t>2/25/2021</a:t>
             </a:fld>
             <a:endParaRPr lang="en-US"/>
           </a:p>
@@ -846,7 +950,7 @@
           <a:p>
             <a:fld id="{7AC65AA3-70EE-4AAE-82B6-823552EBCD17}" type="datetimeFigureOut">
               <a:rPr lang="en-US" smtClean="0"/>
-              <a:t>2/12/2021</a:t>
+              <a:t>2/25/2021</a:t>
             </a:fld>
             <a:endParaRPr lang="en-US"/>
           </a:p>
@@ -1044,7 +1148,7 @@
           <a:p>
             <a:fld id="{7AC65AA3-70EE-4AAE-82B6-823552EBCD17}" type="datetimeFigureOut">
               <a:rPr lang="en-US" smtClean="0"/>
-              <a:t>2/12/2021</a:t>
+              <a:t>2/25/2021</a:t>
             </a:fld>
             <a:endParaRPr lang="en-US"/>
           </a:p>
@@ -1319,7 +1423,7 @@
           <a:p>
             <a:fld id="{7AC65AA3-70EE-4AAE-82B6-823552EBCD17}" type="datetimeFigureOut">
               <a:rPr lang="en-US" smtClean="0"/>
-              <a:t>2/12/2021</a:t>
+              <a:t>2/25/2021</a:t>
             </a:fld>
             <a:endParaRPr lang="en-US"/>
           </a:p>
@@ -1584,7 +1688,7 @@
           <a:p>
             <a:fld id="{7AC65AA3-70EE-4AAE-82B6-823552EBCD17}" type="datetimeFigureOut">
               <a:rPr lang="en-US" smtClean="0"/>
-              <a:t>2/12/2021</a:t>
+              <a:t>2/25/2021</a:t>
             </a:fld>
             <a:endParaRPr lang="en-US"/>
           </a:p>
@@ -1996,7 +2100,7 @@
           <a:p>
             <a:fld id="{7AC65AA3-70EE-4AAE-82B6-823552EBCD17}" type="datetimeFigureOut">
               <a:rPr lang="en-US" smtClean="0"/>
-              <a:t>2/12/2021</a:t>
+              <a:t>2/25/2021</a:t>
             </a:fld>
             <a:endParaRPr lang="en-US"/>
           </a:p>
@@ -2137,7 +2241,7 @@
           <a:p>
             <a:fld id="{7AC65AA3-70EE-4AAE-82B6-823552EBCD17}" type="datetimeFigureOut">
               <a:rPr lang="en-US" smtClean="0"/>
-              <a:t>2/12/2021</a:t>
+              <a:t>2/25/2021</a:t>
             </a:fld>
             <a:endParaRPr lang="en-US"/>
           </a:p>
@@ -2250,7 +2354,7 @@
           <a:p>
             <a:fld id="{7AC65AA3-70EE-4AAE-82B6-823552EBCD17}" type="datetimeFigureOut">
               <a:rPr lang="en-US" smtClean="0"/>
-              <a:t>2/12/2021</a:t>
+              <a:t>2/25/2021</a:t>
             </a:fld>
             <a:endParaRPr lang="en-US"/>
           </a:p>
@@ -2561,7 +2665,7 @@
           <a:p>
             <a:fld id="{7AC65AA3-70EE-4AAE-82B6-823552EBCD17}" type="datetimeFigureOut">
               <a:rPr lang="en-US" smtClean="0"/>
-              <a:t>2/12/2021</a:t>
+              <a:t>2/25/2021</a:t>
             </a:fld>
             <a:endParaRPr lang="en-US"/>
           </a:p>
@@ -2849,7 +2953,7 @@
           <a:p>
             <a:fld id="{7AC65AA3-70EE-4AAE-82B6-823552EBCD17}" type="datetimeFigureOut">
               <a:rPr lang="en-US" smtClean="0"/>
-              <a:t>2/12/2021</a:t>
+              <a:t>2/25/2021</a:t>
             </a:fld>
             <a:endParaRPr lang="en-US"/>
           </a:p>
@@ -3090,7 +3194,7 @@
           <a:p>
             <a:fld id="{7AC65AA3-70EE-4AAE-82B6-823552EBCD17}" type="datetimeFigureOut">
               <a:rPr lang="en-US" smtClean="0"/>
-              <a:t>2/12/2021</a:t>
+              <a:t>2/25/2021</a:t>
             </a:fld>
             <a:endParaRPr lang="en-US"/>
           </a:p>
@@ -5064,7 +5168,7 @@
         <p:spPr>
           <a:xfrm>
             <a:off x="258178" y="369332"/>
-            <a:ext cx="10714621" cy="2862322"/>
+            <a:ext cx="10714621" cy="2585323"/>
           </a:xfrm>
           <a:prstGeom prst="rect">
             <a:avLst/>
@@ -5136,19 +5240,19 @@
               <a:buAutoNum type="arabicPeriod"/>
             </a:pPr>
             <a:r>
-              <a:rPr lang="en-US" dirty="0"/>
+              <a:rPr lang="en-US" b="1" dirty="0"/>
               <a:t>Buyer samples N spatial goods among affordable ones (</a:t>
             </a:r>
             <a:r>
-              <a:rPr lang="en-US" dirty="0" err="1"/>
+              <a:rPr lang="en-US" b="1" dirty="0" err="1"/>
               <a:t>hh</a:t>
             </a:r>
             <a:r>
-              <a:rPr lang="en-US" dirty="0"/>
+              <a:rPr lang="en-US" b="1" dirty="0"/>
               <a:t>-buyers) </a:t>
             </a:r>
             <a:r>
-              <a:rPr lang="en-US" baseline="30000" dirty="0"/>
+              <a:rPr lang="en-US" b="1" baseline="30000" dirty="0"/>
               <a:t>(f) (g)</a:t>
             </a:r>
           </a:p>
@@ -5158,19 +5262,19 @@
               <a:buAutoNum type="arabicPeriod"/>
             </a:pPr>
             <a:r>
-              <a:rPr lang="en-US" dirty="0"/>
-              <a:t>Buyer identifies spatial good that provides maximum utility based on preferences and income (</a:t>
-            </a:r>
-            <a:r>
-              <a:rPr lang="en-US" dirty="0" err="1"/>
+              <a:rPr lang="en-US" b="1" dirty="0"/>
+              <a:t>Buyer ranks the list of N goods according to utility (</a:t>
+            </a:r>
+            <a:r>
+              <a:rPr lang="en-US" b="1" dirty="0" err="1"/>
               <a:t>hh</a:t>
             </a:r>
             <a:r>
-              <a:rPr lang="en-US" dirty="0"/>
+              <a:rPr lang="en-US" b="1" dirty="0"/>
               <a:t>-buyers)</a:t>
             </a:r>
             <a:r>
-              <a:rPr lang="en-US" baseline="30000" dirty="0"/>
+              <a:rPr lang="en-US" b="1" baseline="30000" dirty="0"/>
               <a:t> (h)</a:t>
             </a:r>
           </a:p>
@@ -5180,33 +5284,15 @@
               <a:buAutoNum type="arabicPeriod"/>
             </a:pPr>
             <a:r>
-              <a:rPr lang="en-US" dirty="0"/>
-              <a:t>Buyer selects the cheapest to bid on (</a:t>
-            </a:r>
-            <a:r>
-              <a:rPr lang="en-US" dirty="0" err="1"/>
+              <a:rPr lang="en-US" b="1" dirty="0"/>
+              <a:t>Buyer calculates WTP for N goods (</a:t>
+            </a:r>
+            <a:r>
+              <a:rPr lang="en-US" b="1" dirty="0" err="1"/>
               <a:t>hh</a:t>
             </a:r>
             <a:r>
-              <a:rPr lang="en-US" dirty="0"/>
-              <a:t>-buyers)</a:t>
-            </a:r>
-          </a:p>
-          <a:p>
-            <a:pPr marL="342900" indent="-342900">
-              <a:buFont typeface="+mj-lt"/>
-              <a:buAutoNum type="arabicPeriod"/>
-            </a:pPr>
-            <a:r>
-              <a:rPr lang="en-US" dirty="0"/>
-              <a:t>Buyer submits bid price to the seller of selected property (</a:t>
-            </a:r>
-            <a:r>
-              <a:rPr lang="en-US" dirty="0" err="1"/>
-              <a:t>hh</a:t>
-            </a:r>
-            <a:r>
-              <a:rPr lang="en-US" dirty="0"/>
+              <a:rPr lang="en-US" b="1" dirty="0"/>
               <a:t>-buyers)</a:t>
             </a:r>
           </a:p>
@@ -5534,6 +5620,1387 @@
     <p:extLst>
       <p:ext uri="{BB962C8B-B14F-4D97-AF65-F5344CB8AC3E}">
         <p14:creationId xmlns:p14="http://schemas.microsoft.com/office/powerpoint/2010/main" val="792130605"/>
+      </p:ext>
+    </p:extLst>
+  </p:cSld>
+  <p:clrMapOvr>
+    <a:masterClrMapping/>
+  </p:clrMapOvr>
+</p:sld>
+</file>
+
+<file path=ppt/slides/slide5.xml><?xml version="1.0" encoding="utf-8"?>
+<p:sld xmlns:a="http://schemas.openxmlformats.org/drawingml/2006/main" xmlns:r="http://schemas.openxmlformats.org/officeDocument/2006/relationships" xmlns:p="http://schemas.openxmlformats.org/presentationml/2006/main">
+  <p:cSld>
+    <p:spTree>
+      <p:nvGrpSpPr>
+        <p:cNvPr id="1" name=""/>
+        <p:cNvGrpSpPr/>
+        <p:nvPr/>
+      </p:nvGrpSpPr>
+      <p:grpSpPr>
+        <a:xfrm>
+          <a:off x="0" y="0"/>
+          <a:ext cx="0" cy="0"/>
+          <a:chOff x="0" y="0"/>
+          <a:chExt cx="0" cy="0"/>
+        </a:xfrm>
+      </p:grpSpPr>
+      <p:sp>
+        <p:nvSpPr>
+          <p:cNvPr id="9" name="TextBox 8">
+            <a:extLst>
+              <a:ext uri="{FF2B5EF4-FFF2-40B4-BE49-F238E27FC236}">
+                <a16:creationId xmlns:a16="http://schemas.microsoft.com/office/drawing/2014/main" id="{56F25AF1-1195-475E-BB00-45536AF81C68}"/>
+              </a:ext>
+            </a:extLst>
+          </p:cNvPr>
+          <p:cNvSpPr txBox="1"/>
+          <p:nvPr/>
+        </p:nvSpPr>
+        <p:spPr>
+          <a:xfrm>
+            <a:off x="346411" y="0"/>
+            <a:ext cx="4879862" cy="369332"/>
+          </a:xfrm>
+          <a:prstGeom prst="rect">
+            <a:avLst/>
+          </a:prstGeom>
+          <a:noFill/>
+        </p:spPr>
+        <p:txBody>
+          <a:bodyPr wrap="none" rtlCol="0">
+            <a:spAutoFit/>
+          </a:bodyPr>
+          <a:lstStyle/>
+          <a:p>
+            <a:r>
+              <a:rPr lang="en-US" b="1" dirty="0"/>
+              <a:t>Simple Household Cobb-Douglas Utility Function:</a:t>
+            </a:r>
+          </a:p>
+        </p:txBody>
+      </p:sp>
+      <mc:AlternateContent xmlns:mc="http://schemas.openxmlformats.org/markup-compatibility/2006">
+        <mc:Choice xmlns:a14="http://schemas.microsoft.com/office/drawing/2010/main" Requires="a14">
+          <p:sp>
+            <p:nvSpPr>
+              <p:cNvPr id="2" name="TextBox 1">
+                <a:extLst>
+                  <a:ext uri="{FF2B5EF4-FFF2-40B4-BE49-F238E27FC236}">
+                    <a16:creationId xmlns:a16="http://schemas.microsoft.com/office/drawing/2014/main" id="{83996858-15F0-4CD5-B4CE-BE3E1B42898B}"/>
+                  </a:ext>
+                </a:extLst>
+              </p:cNvPr>
+              <p:cNvSpPr txBox="1"/>
+              <p:nvPr/>
+            </p:nvSpPr>
+            <p:spPr>
+              <a:xfrm>
+                <a:off x="346411" y="2615828"/>
+                <a:ext cx="8037094" cy="566950"/>
+              </a:xfrm>
+              <a:prstGeom prst="rect">
+                <a:avLst/>
+              </a:prstGeom>
+              <a:noFill/>
+            </p:spPr>
+            <p:txBody>
+              <a:bodyPr wrap="square" lIns="0" tIns="0" rIns="0" bIns="0" rtlCol="0">
+                <a:spAutoFit/>
+              </a:bodyPr>
+              <a:lstStyle/>
+              <a:p>
+                <a:pPr/>
+                <a14:m>
+                  <m:oMathPara xmlns:m="http://schemas.openxmlformats.org/officeDocument/2006/math">
+                    <m:oMathParaPr>
+                      <m:jc m:val="left"/>
+                    </m:oMathParaPr>
+                    <m:oMath xmlns:m="http://schemas.openxmlformats.org/officeDocument/2006/math">
+                      <m:sSub>
+                        <m:sSubPr>
+                          <m:ctrlPr>
+                            <a:rPr lang="en-US" sz="3200" b="0" i="1" smtClean="0">
+                              <a:latin typeface="Cambria Math" panose="02040503050406030204" pitchFamily="18" charset="0"/>
+                            </a:rPr>
+                          </m:ctrlPr>
+                        </m:sSubPr>
+                        <m:e>
+                          <m:r>
+                            <a:rPr lang="en-US" sz="3200" b="0" i="1" smtClean="0">
+                              <a:latin typeface="Cambria Math" panose="02040503050406030204" pitchFamily="18" charset="0"/>
+                            </a:rPr>
+                            <m:t>2. </m:t>
+                          </m:r>
+                          <m:r>
+                            <a:rPr lang="en-US" sz="3200" b="0" i="1" smtClean="0">
+                              <a:latin typeface="Cambria Math" panose="02040503050406030204" pitchFamily="18" charset="0"/>
+                            </a:rPr>
+                            <m:t>𝑈𝑡𝑖𝑙𝑖𝑡𝑦</m:t>
+                          </m:r>
+                        </m:e>
+                        <m:sub>
+                          <m:r>
+                            <a:rPr lang="en-US" sz="3200" b="0" i="1" smtClean="0">
+                              <a:latin typeface="Cambria Math" panose="02040503050406030204" pitchFamily="18" charset="0"/>
+                            </a:rPr>
+                            <m:t>𝑎𝑔𝑒𝑛𝑡</m:t>
+                          </m:r>
+                          <m:r>
+                            <a:rPr lang="en-US" sz="3200" b="0" i="1" smtClean="0">
+                              <a:latin typeface="Cambria Math" panose="02040503050406030204" pitchFamily="18" charset="0"/>
+                            </a:rPr>
+                            <m:t>, </m:t>
+                          </m:r>
+                          <m:r>
+                            <a:rPr lang="en-US" sz="3200" b="0" i="1" smtClean="0">
+                              <a:latin typeface="Cambria Math" panose="02040503050406030204" pitchFamily="18" charset="0"/>
+                            </a:rPr>
+                            <m:t>𝑏𝑔</m:t>
+                          </m:r>
+                        </m:sub>
+                      </m:sSub>
+                      <m:r>
+                        <a:rPr lang="en-US" sz="3200" b="0" i="1" smtClean="0">
+                          <a:latin typeface="Cambria Math" panose="02040503050406030204" pitchFamily="18" charset="0"/>
+                        </a:rPr>
+                        <m:t>= </m:t>
+                      </m:r>
+                      <m:sSup>
+                        <m:sSupPr>
+                          <m:ctrlPr>
+                            <a:rPr lang="en-US" sz="3200" b="0" i="1" smtClean="0">
+                              <a:latin typeface="Cambria Math" panose="02040503050406030204" pitchFamily="18" charset="0"/>
+                            </a:rPr>
+                          </m:ctrlPr>
+                        </m:sSupPr>
+                        <m:e>
+                          <m:r>
+                            <a:rPr lang="en-US" sz="3200" b="0" i="1" smtClean="0">
+                              <a:latin typeface="Cambria Math" panose="02040503050406030204" pitchFamily="18" charset="0"/>
+                            </a:rPr>
+                            <m:t>𝐼</m:t>
+                          </m:r>
+                        </m:e>
+                        <m:sup>
+                          <m:r>
+                            <a:rPr lang="en-US" sz="3200" b="0" i="1" smtClean="0">
+                              <a:latin typeface="Cambria Math" panose="02040503050406030204" pitchFamily="18" charset="0"/>
+                              <a:ea typeface="Cambria Math" panose="02040503050406030204" pitchFamily="18" charset="0"/>
+                            </a:rPr>
+                            <m:t>𝛼</m:t>
+                          </m:r>
+                        </m:sup>
+                      </m:sSup>
+                      <m:r>
+                        <a:rPr lang="en-US" sz="3200" i="1">
+                          <a:latin typeface="Cambria Math" panose="02040503050406030204" pitchFamily="18" charset="0"/>
+                          <a:ea typeface="Cambria Math" panose="02040503050406030204" pitchFamily="18" charset="0"/>
+                        </a:rPr>
+                        <m:t>×</m:t>
+                      </m:r>
+                      <m:sSup>
+                        <m:sSupPr>
+                          <m:ctrlPr>
+                            <a:rPr lang="en-US" sz="3200" i="1" smtClean="0">
+                              <a:latin typeface="Cambria Math" panose="02040503050406030204" pitchFamily="18" charset="0"/>
+                              <a:ea typeface="Cambria Math" panose="02040503050406030204" pitchFamily="18" charset="0"/>
+                            </a:rPr>
+                          </m:ctrlPr>
+                        </m:sSupPr>
+                        <m:e>
+                          <m:r>
+                            <a:rPr lang="en-US" sz="3200" b="0" i="1" smtClean="0">
+                              <a:latin typeface="Cambria Math" panose="02040503050406030204" pitchFamily="18" charset="0"/>
+                              <a:ea typeface="Cambria Math" panose="02040503050406030204" pitchFamily="18" charset="0"/>
+                            </a:rPr>
+                            <m:t>𝐷</m:t>
+                          </m:r>
+                        </m:e>
+                        <m:sup>
+                          <m:r>
+                            <a:rPr lang="en-US" sz="3200" i="1" smtClean="0">
+                              <a:latin typeface="Cambria Math" panose="02040503050406030204" pitchFamily="18" charset="0"/>
+                              <a:ea typeface="Cambria Math" panose="02040503050406030204" pitchFamily="18" charset="0"/>
+                            </a:rPr>
+                            <m:t>𝛽</m:t>
+                          </m:r>
+                        </m:sup>
+                      </m:sSup>
+                      <m:r>
+                        <a:rPr lang="en-US" sz="3200" i="1" smtClean="0">
+                          <a:latin typeface="Cambria Math" panose="02040503050406030204" pitchFamily="18" charset="0"/>
+                          <a:ea typeface="Cambria Math" panose="02040503050406030204" pitchFamily="18" charset="0"/>
+                        </a:rPr>
+                        <m:t>×</m:t>
+                      </m:r>
+                      <m:sSup>
+                        <m:sSupPr>
+                          <m:ctrlPr>
+                            <a:rPr lang="en-US" sz="3200" i="1" smtClean="0">
+                              <a:latin typeface="Cambria Math" panose="02040503050406030204" pitchFamily="18" charset="0"/>
+                              <a:ea typeface="Cambria Math" panose="02040503050406030204" pitchFamily="18" charset="0"/>
+                            </a:rPr>
+                          </m:ctrlPr>
+                        </m:sSupPr>
+                        <m:e>
+                          <m:r>
+                            <a:rPr lang="en-US" sz="3200" b="0" i="1" smtClean="0">
+                              <a:latin typeface="Cambria Math" panose="02040503050406030204" pitchFamily="18" charset="0"/>
+                              <a:ea typeface="Cambria Math" panose="02040503050406030204" pitchFamily="18" charset="0"/>
+                            </a:rPr>
+                            <m:t>𝐹</m:t>
+                          </m:r>
+                        </m:e>
+                        <m:sup>
+                          <m:r>
+                            <a:rPr lang="en-US" sz="3200" i="1" smtClean="0">
+                              <a:latin typeface="Cambria Math" panose="02040503050406030204" pitchFamily="18" charset="0"/>
+                              <a:ea typeface="Cambria Math" panose="02040503050406030204" pitchFamily="18" charset="0"/>
+                            </a:rPr>
+                            <m:t>𝛾</m:t>
+                          </m:r>
+                        </m:sup>
+                      </m:sSup>
+                    </m:oMath>
+                  </m:oMathPara>
+                </a14:m>
+                <a:endParaRPr lang="en-US" sz="3200" dirty="0"/>
+              </a:p>
+            </p:txBody>
+          </p:sp>
+        </mc:Choice>
+        <mc:Fallback>
+          <p:sp>
+            <p:nvSpPr>
+              <p:cNvPr id="2" name="TextBox 1">
+                <a:extLst>
+                  <a:ext uri="{FF2B5EF4-FFF2-40B4-BE49-F238E27FC236}">
+                    <a16:creationId xmlns:a16="http://schemas.microsoft.com/office/drawing/2014/main" id="{83996858-15F0-4CD5-B4CE-BE3E1B42898B}"/>
+                  </a:ext>
+                </a:extLst>
+              </p:cNvPr>
+              <p:cNvSpPr txBox="1">
+                <a:spLocks noRot="1" noChangeAspect="1" noMove="1" noResize="1" noEditPoints="1" noAdjustHandles="1" noChangeArrowheads="1" noChangeShapeType="1" noTextEdit="1"/>
+              </p:cNvSpPr>
+              <p:nvPr/>
+            </p:nvSpPr>
+            <p:spPr>
+              <a:xfrm>
+                <a:off x="346411" y="2615828"/>
+                <a:ext cx="8037094" cy="566950"/>
+              </a:xfrm>
+              <a:prstGeom prst="rect">
+                <a:avLst/>
+              </a:prstGeom>
+              <a:blipFill>
+                <a:blip r:embed="rId2"/>
+                <a:stretch>
+                  <a:fillRect/>
+                </a:stretch>
+              </a:blipFill>
+            </p:spPr>
+            <p:txBody>
+              <a:bodyPr/>
+              <a:lstStyle/>
+              <a:p>
+                <a:r>
+                  <a:rPr lang="en-US">
+                    <a:noFill/>
+                  </a:rPr>
+                  <a:t> </a:t>
+                </a:r>
+              </a:p>
+            </p:txBody>
+          </p:sp>
+        </mc:Fallback>
+      </mc:AlternateContent>
+      <mc:AlternateContent xmlns:mc="http://schemas.openxmlformats.org/markup-compatibility/2006">
+        <mc:Choice xmlns:a14="http://schemas.microsoft.com/office/drawing/2010/main" Requires="a14">
+          <p:sp>
+            <p:nvSpPr>
+              <p:cNvPr id="7" name="TextBox 6">
+                <a:extLst>
+                  <a:ext uri="{FF2B5EF4-FFF2-40B4-BE49-F238E27FC236}">
+                    <a16:creationId xmlns:a16="http://schemas.microsoft.com/office/drawing/2014/main" id="{1190D5C9-B32B-4934-9A6B-5B460EFFE5DC}"/>
+                  </a:ext>
+                </a:extLst>
+              </p:cNvPr>
+              <p:cNvSpPr txBox="1"/>
+              <p:nvPr/>
+            </p:nvSpPr>
+            <p:spPr>
+              <a:xfrm>
+                <a:off x="346410" y="3324366"/>
+                <a:ext cx="8470231" cy="1107996"/>
+              </a:xfrm>
+              <a:prstGeom prst="rect">
+                <a:avLst/>
+              </a:prstGeom>
+              <a:noFill/>
+            </p:spPr>
+            <p:txBody>
+              <a:bodyPr wrap="square" lIns="0" tIns="0" rIns="0" bIns="0" rtlCol="0">
+                <a:spAutoFit/>
+              </a:bodyPr>
+              <a:lstStyle/>
+              <a:p>
+                <a:pPr/>
+                <a14:m>
+                  <m:oMathPara xmlns:m="http://schemas.openxmlformats.org/officeDocument/2006/math">
+                    <m:oMathParaPr>
+                      <m:jc m:val="left"/>
+                    </m:oMathParaPr>
+                    <m:oMath xmlns:m="http://schemas.openxmlformats.org/officeDocument/2006/math">
+                      <m:r>
+                        <a:rPr lang="en-US" b="0" i="1" smtClean="0">
+                          <a:latin typeface="Cambria Math" panose="02040503050406030204" pitchFamily="18" charset="0"/>
+                          <a:ea typeface="Cambria Math" panose="02040503050406030204" pitchFamily="18" charset="0"/>
+                        </a:rPr>
+                        <m:t>𝐼</m:t>
+                      </m:r>
+                      <m:r>
+                        <a:rPr lang="en-US" b="0" i="1" smtClean="0">
+                          <a:latin typeface="Cambria Math" panose="02040503050406030204" pitchFamily="18" charset="0"/>
+                          <a:ea typeface="Cambria Math" panose="02040503050406030204" pitchFamily="18" charset="0"/>
+                        </a:rPr>
+                        <m:t> −</m:t>
+                      </m:r>
+                      <m:r>
+                        <a:rPr lang="en-US" b="0" i="1" smtClean="0">
+                          <a:latin typeface="Cambria Math" panose="02040503050406030204" pitchFamily="18" charset="0"/>
+                          <a:ea typeface="Cambria Math" panose="02040503050406030204" pitchFamily="18" charset="0"/>
+                        </a:rPr>
+                        <m:t>𝑀𝑒𝑑𝑖𝑎𝑛</m:t>
+                      </m:r>
+                      <m:r>
+                        <a:rPr lang="en-US" b="0" i="1" smtClean="0">
+                          <a:latin typeface="Cambria Math" panose="02040503050406030204" pitchFamily="18" charset="0"/>
+                          <a:ea typeface="Cambria Math" panose="02040503050406030204" pitchFamily="18" charset="0"/>
+                        </a:rPr>
+                        <m:t> </m:t>
+                      </m:r>
+                      <m:r>
+                        <a:rPr lang="en-US" b="0" i="1" smtClean="0">
+                          <a:latin typeface="Cambria Math" panose="02040503050406030204" pitchFamily="18" charset="0"/>
+                          <a:ea typeface="Cambria Math" panose="02040503050406030204" pitchFamily="18" charset="0"/>
+                        </a:rPr>
+                        <m:t>𝐻𝑜𝑢𝑠𝑒h𝑜𝑙𝑑</m:t>
+                      </m:r>
+                      <m:r>
+                        <a:rPr lang="en-US" b="0" i="1" smtClean="0">
+                          <a:latin typeface="Cambria Math" panose="02040503050406030204" pitchFamily="18" charset="0"/>
+                          <a:ea typeface="Cambria Math" panose="02040503050406030204" pitchFamily="18" charset="0"/>
+                        </a:rPr>
+                        <m:t> </m:t>
+                      </m:r>
+                      <m:r>
+                        <a:rPr lang="en-US" b="0" i="1" smtClean="0">
+                          <a:latin typeface="Cambria Math" panose="02040503050406030204" pitchFamily="18" charset="0"/>
+                          <a:ea typeface="Cambria Math" panose="02040503050406030204" pitchFamily="18" charset="0"/>
+                        </a:rPr>
+                        <m:t>𝐼𝑛𝑐𝑜𝑚𝑒</m:t>
+                      </m:r>
+                    </m:oMath>
+                  </m:oMathPara>
+                </a14:m>
+                <a:endParaRPr lang="en-US" b="0" dirty="0">
+                  <a:latin typeface="Cambria Math" panose="02040503050406030204" pitchFamily="18" charset="0"/>
+                  <a:ea typeface="Cambria Math" panose="02040503050406030204" pitchFamily="18" charset="0"/>
+                </a:endParaRPr>
+              </a:p>
+              <a:p>
+                <a:pPr/>
+                <a:r>
+                  <a:rPr lang="en-US" i="1" dirty="0">
+                    <a:latin typeface="Cambria Math" panose="02040503050406030204" pitchFamily="18" charset="0"/>
+                    <a:ea typeface="Cambria Math" panose="02040503050406030204" pitchFamily="18" charset="0"/>
+                  </a:rPr>
+                  <a:t>D</a:t>
+                </a:r>
+                <a14:m>
+                  <m:oMath xmlns:m="http://schemas.openxmlformats.org/officeDocument/2006/math">
+                    <m:r>
+                      <a:rPr lang="en-US" i="1">
+                        <a:latin typeface="Cambria Math" panose="02040503050406030204" pitchFamily="18" charset="0"/>
+                        <a:ea typeface="Cambria Math" panose="02040503050406030204" pitchFamily="18" charset="0"/>
+                      </a:rPr>
+                      <m:t> −</m:t>
+                    </m:r>
+                    <m:r>
+                      <a:rPr lang="en-US" i="1">
+                        <a:latin typeface="Cambria Math" panose="02040503050406030204" pitchFamily="18" charset="0"/>
+                        <a:ea typeface="Cambria Math" panose="02040503050406030204" pitchFamily="18" charset="0"/>
+                      </a:rPr>
+                      <m:t> </m:t>
+                    </m:r>
+                    <m:r>
+                      <a:rPr lang="en-US" i="1">
+                        <a:latin typeface="Cambria Math" panose="02040503050406030204" pitchFamily="18" charset="0"/>
+                        <a:ea typeface="Cambria Math" panose="02040503050406030204" pitchFamily="18" charset="0"/>
+                      </a:rPr>
+                      <m:t>𝐷𝑖𝑠𝑡𝑎𝑛𝑐𝑒</m:t>
+                    </m:r>
+                    <m:r>
+                      <a:rPr lang="en-US" i="1">
+                        <a:latin typeface="Cambria Math" panose="02040503050406030204" pitchFamily="18" charset="0"/>
+                        <a:ea typeface="Cambria Math" panose="02040503050406030204" pitchFamily="18" charset="0"/>
+                      </a:rPr>
+                      <m:t> </m:t>
+                    </m:r>
+                    <m:r>
+                      <a:rPr lang="en-US" i="1">
+                        <a:latin typeface="Cambria Math" panose="02040503050406030204" pitchFamily="18" charset="0"/>
+                        <a:ea typeface="Cambria Math" panose="02040503050406030204" pitchFamily="18" charset="0"/>
+                      </a:rPr>
+                      <m:t>𝑡𝑜</m:t>
+                    </m:r>
+                    <m:r>
+                      <a:rPr lang="en-US" i="1">
+                        <a:latin typeface="Cambria Math" panose="02040503050406030204" pitchFamily="18" charset="0"/>
+                        <a:ea typeface="Cambria Math" panose="02040503050406030204" pitchFamily="18" charset="0"/>
+                      </a:rPr>
+                      <m:t> </m:t>
+                    </m:r>
+                    <m:r>
+                      <a:rPr lang="en-US" i="1">
+                        <a:latin typeface="Cambria Math" panose="02040503050406030204" pitchFamily="18" charset="0"/>
+                        <a:ea typeface="Cambria Math" panose="02040503050406030204" pitchFamily="18" charset="0"/>
+                      </a:rPr>
+                      <m:t>𝐶𝐵𝐷</m:t>
+                    </m:r>
+                  </m:oMath>
+                </a14:m>
+                <a:endParaRPr lang="en-US" i="1" dirty="0">
+                  <a:latin typeface="Cambria Math" panose="02040503050406030204" pitchFamily="18" charset="0"/>
+                  <a:ea typeface="Cambria Math" panose="02040503050406030204" pitchFamily="18" charset="0"/>
+                </a:endParaRPr>
+              </a:p>
+              <a:p>
+                <a:pPr/>
+                <a:r>
+                  <a:rPr lang="en-US" i="1" dirty="0">
+                    <a:latin typeface="Cambria Math" panose="02040503050406030204" pitchFamily="18" charset="0"/>
+                    <a:ea typeface="Cambria Math" panose="02040503050406030204" pitchFamily="18" charset="0"/>
+                  </a:rPr>
+                  <a:t>F</a:t>
+                </a:r>
+                <a14:m>
+                  <m:oMath xmlns:m="http://schemas.openxmlformats.org/officeDocument/2006/math">
+                    <m:r>
+                      <a:rPr lang="en-US" i="1">
+                        <a:latin typeface="Cambria Math" panose="02040503050406030204" pitchFamily="18" charset="0"/>
+                        <a:ea typeface="Cambria Math" panose="02040503050406030204" pitchFamily="18" charset="0"/>
+                      </a:rPr>
+                      <m:t> −</m:t>
+                    </m:r>
+                    <m:r>
+                      <a:rPr lang="en-US" i="1">
+                        <a:latin typeface="Cambria Math" panose="02040503050406030204" pitchFamily="18" charset="0"/>
+                        <a:ea typeface="Cambria Math" panose="02040503050406030204" pitchFamily="18" charset="0"/>
+                      </a:rPr>
+                      <m:t>% </m:t>
+                    </m:r>
+                    <m:r>
+                      <a:rPr lang="en-US" i="1">
+                        <a:latin typeface="Cambria Math" panose="02040503050406030204" pitchFamily="18" charset="0"/>
+                        <a:ea typeface="Cambria Math" panose="02040503050406030204" pitchFamily="18" charset="0"/>
+                      </a:rPr>
+                      <m:t>𝐴𝑟𝑒𝑎</m:t>
+                    </m:r>
+                    <m:r>
+                      <a:rPr lang="en-US" i="1">
+                        <a:latin typeface="Cambria Math" panose="02040503050406030204" pitchFamily="18" charset="0"/>
+                        <a:ea typeface="Cambria Math" panose="02040503050406030204" pitchFamily="18" charset="0"/>
+                      </a:rPr>
+                      <m:t> </m:t>
+                    </m:r>
+                    <m:r>
+                      <a:rPr lang="en-US" i="1">
+                        <a:latin typeface="Cambria Math" panose="02040503050406030204" pitchFamily="18" charset="0"/>
+                        <a:ea typeface="Cambria Math" panose="02040503050406030204" pitchFamily="18" charset="0"/>
+                      </a:rPr>
+                      <m:t>𝑜𝑓</m:t>
+                    </m:r>
+                    <m:r>
+                      <a:rPr lang="en-US" i="1">
+                        <a:latin typeface="Cambria Math" panose="02040503050406030204" pitchFamily="18" charset="0"/>
+                        <a:ea typeface="Cambria Math" panose="02040503050406030204" pitchFamily="18" charset="0"/>
+                      </a:rPr>
+                      <m:t> </m:t>
+                    </m:r>
+                    <m:r>
+                      <a:rPr lang="en-US" i="1">
+                        <a:latin typeface="Cambria Math" panose="02040503050406030204" pitchFamily="18" charset="0"/>
+                        <a:ea typeface="Cambria Math" panose="02040503050406030204" pitchFamily="18" charset="0"/>
+                      </a:rPr>
+                      <m:t>𝐵𝑙𝑜𝑐𝑘</m:t>
+                    </m:r>
+                    <m:r>
+                      <a:rPr lang="en-US" i="1">
+                        <a:latin typeface="Cambria Math" panose="02040503050406030204" pitchFamily="18" charset="0"/>
+                        <a:ea typeface="Cambria Math" panose="02040503050406030204" pitchFamily="18" charset="0"/>
+                      </a:rPr>
+                      <m:t> </m:t>
+                    </m:r>
+                    <m:r>
+                      <a:rPr lang="en-US" i="1">
+                        <a:latin typeface="Cambria Math" panose="02040503050406030204" pitchFamily="18" charset="0"/>
+                        <a:ea typeface="Cambria Math" panose="02040503050406030204" pitchFamily="18" charset="0"/>
+                      </a:rPr>
+                      <m:t>𝐺𝑟𝑜𝑢𝑝</m:t>
+                    </m:r>
+                    <m:r>
+                      <a:rPr lang="en-US" i="1">
+                        <a:latin typeface="Cambria Math" panose="02040503050406030204" pitchFamily="18" charset="0"/>
+                        <a:ea typeface="Cambria Math" panose="02040503050406030204" pitchFamily="18" charset="0"/>
+                      </a:rPr>
+                      <m:t> </m:t>
+                    </m:r>
+                    <m:r>
+                      <a:rPr lang="en-US" i="1">
+                        <a:latin typeface="Cambria Math" panose="02040503050406030204" pitchFamily="18" charset="0"/>
+                        <a:ea typeface="Cambria Math" panose="02040503050406030204" pitchFamily="18" charset="0"/>
+                      </a:rPr>
+                      <m:t>𝑖𝑛</m:t>
+                    </m:r>
+                    <m:r>
+                      <a:rPr lang="en-US" i="1">
+                        <a:latin typeface="Cambria Math" panose="02040503050406030204" pitchFamily="18" charset="0"/>
+                        <a:ea typeface="Cambria Math" panose="02040503050406030204" pitchFamily="18" charset="0"/>
+                      </a:rPr>
+                      <m:t> </m:t>
+                    </m:r>
+                    <m:r>
+                      <a:rPr lang="en-US" i="1">
+                        <a:latin typeface="Cambria Math" panose="02040503050406030204" pitchFamily="18" charset="0"/>
+                        <a:ea typeface="Cambria Math" panose="02040503050406030204" pitchFamily="18" charset="0"/>
+                      </a:rPr>
+                      <m:t>𝐹𝐸𝑀𝐴</m:t>
+                    </m:r>
+                    <m:r>
+                      <a:rPr lang="en-US" i="1">
+                        <a:latin typeface="Cambria Math" panose="02040503050406030204" pitchFamily="18" charset="0"/>
+                        <a:ea typeface="Cambria Math" panose="02040503050406030204" pitchFamily="18" charset="0"/>
+                      </a:rPr>
+                      <m:t> 100 </m:t>
+                    </m:r>
+                    <m:r>
+                      <a:rPr lang="en-US" i="1">
+                        <a:latin typeface="Cambria Math" panose="02040503050406030204" pitchFamily="18" charset="0"/>
+                        <a:ea typeface="Cambria Math" panose="02040503050406030204" pitchFamily="18" charset="0"/>
+                      </a:rPr>
+                      <m:t>𝑦𝑟</m:t>
+                    </m:r>
+                    <m:r>
+                      <a:rPr lang="en-US" i="1">
+                        <a:latin typeface="Cambria Math" panose="02040503050406030204" pitchFamily="18" charset="0"/>
+                        <a:ea typeface="Cambria Math" panose="02040503050406030204" pitchFamily="18" charset="0"/>
+                      </a:rPr>
+                      <m:t> </m:t>
+                    </m:r>
+                    <m:r>
+                      <a:rPr lang="en-US" i="1">
+                        <a:latin typeface="Cambria Math" panose="02040503050406030204" pitchFamily="18" charset="0"/>
+                        <a:ea typeface="Cambria Math" panose="02040503050406030204" pitchFamily="18" charset="0"/>
+                      </a:rPr>
+                      <m:t>𝑓𝑙𝑜𝑜𝑑</m:t>
+                    </m:r>
+                    <m:r>
+                      <a:rPr lang="en-US" i="1">
+                        <a:latin typeface="Cambria Math" panose="02040503050406030204" pitchFamily="18" charset="0"/>
+                        <a:ea typeface="Cambria Math" panose="02040503050406030204" pitchFamily="18" charset="0"/>
+                      </a:rPr>
+                      <m:t> </m:t>
+                    </m:r>
+                    <m:r>
+                      <a:rPr lang="en-US" i="1">
+                        <a:latin typeface="Cambria Math" panose="02040503050406030204" pitchFamily="18" charset="0"/>
+                        <a:ea typeface="Cambria Math" panose="02040503050406030204" pitchFamily="18" charset="0"/>
+                      </a:rPr>
+                      <m:t>𝑝𝑙𝑎𝑖𝑛</m:t>
+                    </m:r>
+                  </m:oMath>
+                </a14:m>
+                <a:endParaRPr lang="en-US" i="1" dirty="0">
+                  <a:latin typeface="Cambria Math" panose="02040503050406030204" pitchFamily="18" charset="0"/>
+                  <a:ea typeface="Cambria Math" panose="02040503050406030204" pitchFamily="18" charset="0"/>
+                </a:endParaRPr>
+              </a:p>
+              <a:p>
+                <a:pPr/>
+                <a:r>
+                  <a:rPr lang="en-US" i="1" dirty="0">
+                    <a:latin typeface="Cambria Math" panose="02040503050406030204" pitchFamily="18" charset="0"/>
+                    <a:ea typeface="Cambria Math" panose="02040503050406030204" pitchFamily="18" charset="0"/>
+                  </a:rPr>
+                  <a:t>𝛼, </a:t>
+                </a:r>
+                <a14:m>
+                  <m:oMath xmlns:m="http://schemas.openxmlformats.org/officeDocument/2006/math">
+                    <m:r>
+                      <a:rPr lang="en-US" i="1">
+                        <a:latin typeface="Cambria Math" panose="02040503050406030204" pitchFamily="18" charset="0"/>
+                        <a:ea typeface="Cambria Math" panose="02040503050406030204" pitchFamily="18" charset="0"/>
+                      </a:rPr>
+                      <m:t>𝛽</m:t>
+                    </m:r>
+                    <m:r>
+                      <a:rPr lang="en-US" i="1">
+                        <a:latin typeface="Cambria Math" panose="02040503050406030204" pitchFamily="18" charset="0"/>
+                        <a:ea typeface="Cambria Math" panose="02040503050406030204" pitchFamily="18" charset="0"/>
+                      </a:rPr>
+                      <m:t>, </m:t>
+                    </m:r>
+                    <m:r>
+                      <a:rPr lang="en-US" i="1">
+                        <a:latin typeface="Cambria Math" panose="02040503050406030204" pitchFamily="18" charset="0"/>
+                        <a:ea typeface="Cambria Math" panose="02040503050406030204" pitchFamily="18" charset="0"/>
+                      </a:rPr>
+                      <m:t>𝛾</m:t>
+                    </m:r>
+                  </m:oMath>
+                </a14:m>
+                <a:r>
+                  <a:rPr lang="en-US" i="1" dirty="0">
+                    <a:latin typeface="Cambria Math" panose="02040503050406030204" pitchFamily="18" charset="0"/>
+                    <a:ea typeface="Cambria Math" panose="02040503050406030204" pitchFamily="18" charset="0"/>
+                  </a:rPr>
+                  <a:t> – Cobb-Douglas Coefficients (sum to 1)</a:t>
+                </a:r>
+              </a:p>
+            </p:txBody>
+          </p:sp>
+        </mc:Choice>
+        <mc:Fallback>
+          <p:sp>
+            <p:nvSpPr>
+              <p:cNvPr id="7" name="TextBox 6">
+                <a:extLst>
+                  <a:ext uri="{FF2B5EF4-FFF2-40B4-BE49-F238E27FC236}">
+                    <a16:creationId xmlns:a16="http://schemas.microsoft.com/office/drawing/2014/main" id="{1190D5C9-B32B-4934-9A6B-5B460EFFE5DC}"/>
+                  </a:ext>
+                </a:extLst>
+              </p:cNvPr>
+              <p:cNvSpPr txBox="1">
+                <a:spLocks noRot="1" noChangeAspect="1" noMove="1" noResize="1" noEditPoints="1" noAdjustHandles="1" noChangeArrowheads="1" noChangeShapeType="1" noTextEdit="1"/>
+              </p:cNvSpPr>
+              <p:nvPr/>
+            </p:nvSpPr>
+            <p:spPr>
+              <a:xfrm>
+                <a:off x="346410" y="3324366"/>
+                <a:ext cx="8470231" cy="1107996"/>
+              </a:xfrm>
+              <a:prstGeom prst="rect">
+                <a:avLst/>
+              </a:prstGeom>
+              <a:blipFill>
+                <a:blip r:embed="rId3"/>
+                <a:stretch>
+                  <a:fillRect l="-1728" b="-11538"/>
+                </a:stretch>
+              </a:blipFill>
+            </p:spPr>
+            <p:txBody>
+              <a:bodyPr/>
+              <a:lstStyle/>
+              <a:p>
+                <a:r>
+                  <a:rPr lang="en-US">
+                    <a:noFill/>
+                  </a:rPr>
+                  <a:t> </a:t>
+                </a:r>
+              </a:p>
+            </p:txBody>
+          </p:sp>
+        </mc:Fallback>
+      </mc:AlternateContent>
+      <mc:AlternateContent xmlns:mc="http://schemas.openxmlformats.org/markup-compatibility/2006">
+        <mc:Choice xmlns:a14="http://schemas.microsoft.com/office/drawing/2010/main" Requires="a14">
+          <p:sp>
+            <p:nvSpPr>
+              <p:cNvPr id="8" name="TextBox 7">
+                <a:extLst>
+                  <a:ext uri="{FF2B5EF4-FFF2-40B4-BE49-F238E27FC236}">
+                    <a16:creationId xmlns:a16="http://schemas.microsoft.com/office/drawing/2014/main" id="{72812B12-14FF-460D-808A-A9C1DF793EE0}"/>
+                  </a:ext>
+                </a:extLst>
+              </p:cNvPr>
+              <p:cNvSpPr txBox="1"/>
+              <p:nvPr/>
+            </p:nvSpPr>
+            <p:spPr>
+              <a:xfrm>
+                <a:off x="346411" y="811869"/>
+                <a:ext cx="8037094" cy="492443"/>
+              </a:xfrm>
+              <a:prstGeom prst="rect">
+                <a:avLst/>
+              </a:prstGeom>
+              <a:noFill/>
+            </p:spPr>
+            <p:txBody>
+              <a:bodyPr wrap="square" lIns="0" tIns="0" rIns="0" bIns="0" rtlCol="0">
+                <a:spAutoFit/>
+              </a:bodyPr>
+              <a:lstStyle/>
+              <a:p>
+                <a:pPr/>
+                <a14:m>
+                  <m:oMathPara xmlns:m="http://schemas.openxmlformats.org/officeDocument/2006/math">
+                    <m:oMathParaPr>
+                      <m:jc m:val="left"/>
+                    </m:oMathParaPr>
+                    <m:oMath xmlns:m="http://schemas.openxmlformats.org/officeDocument/2006/math">
+                      <m:r>
+                        <a:rPr lang="en-US" sz="3200" b="0" i="1" smtClean="0">
+                          <a:latin typeface="Cambria Math" panose="02040503050406030204" pitchFamily="18" charset="0"/>
+                        </a:rPr>
+                        <m:t>1. </m:t>
+                      </m:r>
+                      <m:r>
+                        <a:rPr lang="en-US" sz="3200" b="0" i="1" smtClean="0">
+                          <a:latin typeface="Cambria Math" panose="02040503050406030204" pitchFamily="18" charset="0"/>
+                        </a:rPr>
+                        <m:t>𝐻𝐵</m:t>
+                      </m:r>
+                      <m:r>
+                        <a:rPr lang="en-US" sz="3200" b="0" i="1" smtClean="0">
+                          <a:latin typeface="Cambria Math" panose="02040503050406030204" pitchFamily="18" charset="0"/>
+                        </a:rPr>
+                        <m:t>=</m:t>
+                      </m:r>
+                      <m:r>
+                        <a:rPr lang="en-US" sz="3200" b="0" i="1" smtClean="0">
+                          <a:latin typeface="Cambria Math" panose="02040503050406030204" pitchFamily="18" charset="0"/>
+                        </a:rPr>
+                        <m:t>𝑎</m:t>
+                      </m:r>
+                      <m:r>
+                        <a:rPr lang="en-US" sz="3200" b="0" i="1" smtClean="0">
+                          <a:latin typeface="Cambria Math" panose="02040503050406030204" pitchFamily="18" charset="0"/>
+                        </a:rPr>
+                        <m:t> ∗</m:t>
+                      </m:r>
+                      <m:r>
+                        <a:rPr lang="en-US" sz="3200" b="0" i="1" smtClean="0">
+                          <a:latin typeface="Cambria Math" panose="02040503050406030204" pitchFamily="18" charset="0"/>
+                        </a:rPr>
+                        <m:t>𝐴𝐼</m:t>
+                      </m:r>
+                    </m:oMath>
+                  </m:oMathPara>
+                </a14:m>
+                <a:endParaRPr lang="en-US" sz="3200" dirty="0"/>
+              </a:p>
+            </p:txBody>
+          </p:sp>
+        </mc:Choice>
+        <mc:Fallback>
+          <p:sp>
+            <p:nvSpPr>
+              <p:cNvPr id="8" name="TextBox 7">
+                <a:extLst>
+                  <a:ext uri="{FF2B5EF4-FFF2-40B4-BE49-F238E27FC236}">
+                    <a16:creationId xmlns:a16="http://schemas.microsoft.com/office/drawing/2014/main" id="{72812B12-14FF-460D-808A-A9C1DF793EE0}"/>
+                  </a:ext>
+                </a:extLst>
+              </p:cNvPr>
+              <p:cNvSpPr txBox="1">
+                <a:spLocks noRot="1" noChangeAspect="1" noMove="1" noResize="1" noEditPoints="1" noAdjustHandles="1" noChangeArrowheads="1" noChangeShapeType="1" noTextEdit="1"/>
+              </p:cNvSpPr>
+              <p:nvPr/>
+            </p:nvSpPr>
+            <p:spPr>
+              <a:xfrm>
+                <a:off x="346411" y="811869"/>
+                <a:ext cx="8037094" cy="492443"/>
+              </a:xfrm>
+              <a:prstGeom prst="rect">
+                <a:avLst/>
+              </a:prstGeom>
+              <a:blipFill>
+                <a:blip r:embed="rId4"/>
+                <a:stretch>
+                  <a:fillRect/>
+                </a:stretch>
+              </a:blipFill>
+            </p:spPr>
+            <p:txBody>
+              <a:bodyPr/>
+              <a:lstStyle/>
+              <a:p>
+                <a:r>
+                  <a:rPr lang="en-US">
+                    <a:noFill/>
+                  </a:rPr>
+                  <a:t> </a:t>
+                </a:r>
+              </a:p>
+            </p:txBody>
+          </p:sp>
+        </mc:Fallback>
+      </mc:AlternateContent>
+      <mc:AlternateContent xmlns:mc="http://schemas.openxmlformats.org/markup-compatibility/2006">
+        <mc:Choice xmlns:a14="http://schemas.microsoft.com/office/drawing/2010/main" Requires="a14">
+          <p:sp>
+            <p:nvSpPr>
+              <p:cNvPr id="10" name="TextBox 9">
+                <a:extLst>
+                  <a:ext uri="{FF2B5EF4-FFF2-40B4-BE49-F238E27FC236}">
+                    <a16:creationId xmlns:a16="http://schemas.microsoft.com/office/drawing/2014/main" id="{7A439AB9-2C1C-4794-96B8-CF06FC0A3699}"/>
+                  </a:ext>
+                </a:extLst>
+              </p:cNvPr>
+              <p:cNvSpPr txBox="1"/>
+              <p:nvPr/>
+            </p:nvSpPr>
+            <p:spPr>
+              <a:xfrm>
+                <a:off x="346411" y="1502236"/>
+                <a:ext cx="4987589" cy="830997"/>
+              </a:xfrm>
+              <a:prstGeom prst="rect">
+                <a:avLst/>
+              </a:prstGeom>
+              <a:noFill/>
+            </p:spPr>
+            <p:txBody>
+              <a:bodyPr wrap="square" lIns="0" tIns="0" rIns="0" bIns="0" rtlCol="0">
+                <a:spAutoFit/>
+              </a:bodyPr>
+              <a:lstStyle/>
+              <a:p>
+                <a:pPr/>
+                <a14:m>
+                  <m:oMathPara xmlns:m="http://schemas.openxmlformats.org/officeDocument/2006/math">
+                    <m:oMathParaPr>
+                      <m:jc m:val="left"/>
+                    </m:oMathParaPr>
+                    <m:oMath xmlns:m="http://schemas.openxmlformats.org/officeDocument/2006/math">
+                      <m:r>
+                        <a:rPr lang="en-US" b="0" i="1" smtClean="0">
+                          <a:latin typeface="Cambria Math" panose="02040503050406030204" pitchFamily="18" charset="0"/>
+                          <a:ea typeface="Cambria Math" panose="02040503050406030204" pitchFamily="18" charset="0"/>
+                        </a:rPr>
+                        <m:t>𝐻𝐵</m:t>
+                      </m:r>
+                      <m:r>
+                        <a:rPr lang="en-US" b="0" i="1" smtClean="0">
+                          <a:latin typeface="Cambria Math" panose="02040503050406030204" pitchFamily="18" charset="0"/>
+                          <a:ea typeface="Cambria Math" panose="02040503050406030204" pitchFamily="18" charset="0"/>
+                        </a:rPr>
+                        <m:t> −</m:t>
+                      </m:r>
+                      <m:r>
+                        <a:rPr lang="en-US" b="0" i="1" smtClean="0">
+                          <a:latin typeface="Cambria Math" panose="02040503050406030204" pitchFamily="18" charset="0"/>
+                          <a:ea typeface="Cambria Math" panose="02040503050406030204" pitchFamily="18" charset="0"/>
+                        </a:rPr>
+                        <m:t>𝐻𝑜𝑢𝑠𝑖𝑛𝑔</m:t>
+                      </m:r>
+                      <m:r>
+                        <a:rPr lang="en-US" b="0" i="1" smtClean="0">
+                          <a:latin typeface="Cambria Math" panose="02040503050406030204" pitchFamily="18" charset="0"/>
+                          <a:ea typeface="Cambria Math" panose="02040503050406030204" pitchFamily="18" charset="0"/>
+                        </a:rPr>
+                        <m:t> </m:t>
+                      </m:r>
+                      <m:r>
+                        <a:rPr lang="en-US" b="0" i="1" smtClean="0">
+                          <a:latin typeface="Cambria Math" panose="02040503050406030204" pitchFamily="18" charset="0"/>
+                          <a:ea typeface="Cambria Math" panose="02040503050406030204" pitchFamily="18" charset="0"/>
+                        </a:rPr>
+                        <m:t>𝐵𝑢𝑑𝑔𝑒𝑡</m:t>
+                      </m:r>
+                    </m:oMath>
+                  </m:oMathPara>
+                </a14:m>
+                <a:endParaRPr lang="en-US" b="0" dirty="0">
+                  <a:latin typeface="Cambria Math" panose="02040503050406030204" pitchFamily="18" charset="0"/>
+                  <a:ea typeface="Cambria Math" panose="02040503050406030204" pitchFamily="18" charset="0"/>
+                </a:endParaRPr>
+              </a:p>
+              <a:p>
+                <a:pPr/>
+                <a:r>
+                  <a:rPr lang="en-US" i="1" dirty="0">
+                    <a:latin typeface="Cambria Math" panose="02040503050406030204" pitchFamily="18" charset="0"/>
+                    <a:ea typeface="Cambria Math" panose="02040503050406030204" pitchFamily="18" charset="0"/>
+                  </a:rPr>
+                  <a:t>a – Percentage of income to spend on housing</a:t>
+                </a:r>
+              </a:p>
+              <a:p>
+                <a:pPr/>
+                <a:r>
+                  <a:rPr lang="en-US" i="1" dirty="0">
+                    <a:latin typeface="Cambria Math" panose="02040503050406030204" pitchFamily="18" charset="0"/>
+                    <a:ea typeface="Cambria Math" panose="02040503050406030204" pitchFamily="18" charset="0"/>
+                  </a:rPr>
+                  <a:t>AI – Agent Household Income</a:t>
+                </a:r>
+              </a:p>
+            </p:txBody>
+          </p:sp>
+        </mc:Choice>
+        <mc:Fallback>
+          <p:sp>
+            <p:nvSpPr>
+              <p:cNvPr id="10" name="TextBox 9">
+                <a:extLst>
+                  <a:ext uri="{FF2B5EF4-FFF2-40B4-BE49-F238E27FC236}">
+                    <a16:creationId xmlns:a16="http://schemas.microsoft.com/office/drawing/2014/main" id="{7A439AB9-2C1C-4794-96B8-CF06FC0A3699}"/>
+                  </a:ext>
+                </a:extLst>
+              </p:cNvPr>
+              <p:cNvSpPr txBox="1">
+                <a:spLocks noRot="1" noChangeAspect="1" noMove="1" noResize="1" noEditPoints="1" noAdjustHandles="1" noChangeArrowheads="1" noChangeShapeType="1" noTextEdit="1"/>
+              </p:cNvSpPr>
+              <p:nvPr/>
+            </p:nvSpPr>
+            <p:spPr>
+              <a:xfrm>
+                <a:off x="346411" y="1502236"/>
+                <a:ext cx="4987589" cy="830997"/>
+              </a:xfrm>
+              <a:prstGeom prst="rect">
+                <a:avLst/>
+              </a:prstGeom>
+              <a:blipFill>
+                <a:blip r:embed="rId5"/>
+                <a:stretch>
+                  <a:fillRect l="-2934" b="-15328"/>
+                </a:stretch>
+              </a:blipFill>
+            </p:spPr>
+            <p:txBody>
+              <a:bodyPr/>
+              <a:lstStyle/>
+              <a:p>
+                <a:r>
+                  <a:rPr lang="en-US">
+                    <a:noFill/>
+                  </a:rPr>
+                  <a:t> </a:t>
+                </a:r>
+              </a:p>
+            </p:txBody>
+          </p:sp>
+        </mc:Fallback>
+      </mc:AlternateContent>
+      <p:sp>
+        <p:nvSpPr>
+          <p:cNvPr id="4" name="TextBox 3">
+            <a:extLst>
+              <a:ext uri="{FF2B5EF4-FFF2-40B4-BE49-F238E27FC236}">
+                <a16:creationId xmlns:a16="http://schemas.microsoft.com/office/drawing/2014/main" id="{C85224DF-87E2-476A-825F-9B43518BAA2F}"/>
+              </a:ext>
+            </a:extLst>
+          </p:cNvPr>
+          <p:cNvSpPr txBox="1"/>
+          <p:nvPr/>
+        </p:nvSpPr>
+        <p:spPr>
+          <a:xfrm>
+            <a:off x="5638800" y="2959768"/>
+            <a:ext cx="65" cy="276999"/>
+          </a:xfrm>
+          <a:prstGeom prst="rect">
+            <a:avLst/>
+          </a:prstGeom>
+          <a:noFill/>
+        </p:spPr>
+        <p:txBody>
+          <a:bodyPr wrap="none" lIns="0" tIns="0" rIns="0" bIns="0" rtlCol="0">
+            <a:spAutoFit/>
+          </a:bodyPr>
+          <a:lstStyle/>
+          <a:p>
+            <a:endParaRPr lang="en-US" dirty="0"/>
+          </a:p>
+        </p:txBody>
+      </p:sp>
+      <mc:AlternateContent xmlns:mc="http://schemas.openxmlformats.org/markup-compatibility/2006">
+        <mc:Choice xmlns:a14="http://schemas.microsoft.com/office/drawing/2010/main" Requires="a14">
+          <p:sp>
+            <p:nvSpPr>
+              <p:cNvPr id="12" name="TextBox 11">
+                <a:extLst>
+                  <a:ext uri="{FF2B5EF4-FFF2-40B4-BE49-F238E27FC236}">
+                    <a16:creationId xmlns:a16="http://schemas.microsoft.com/office/drawing/2014/main" id="{B246BA4F-1881-431D-92B9-DF1B861FAB09}"/>
+                  </a:ext>
+                </a:extLst>
+              </p:cNvPr>
+              <p:cNvSpPr txBox="1"/>
+              <p:nvPr/>
+            </p:nvSpPr>
+            <p:spPr>
+              <a:xfrm>
+                <a:off x="346411" y="4794504"/>
+                <a:ext cx="8037094" cy="1102289"/>
+              </a:xfrm>
+              <a:prstGeom prst="rect">
+                <a:avLst/>
+              </a:prstGeom>
+              <a:noFill/>
+            </p:spPr>
+            <p:txBody>
+              <a:bodyPr wrap="square" lIns="0" tIns="0" rIns="0" bIns="0" rtlCol="0">
+                <a:spAutoFit/>
+              </a:bodyPr>
+              <a:lstStyle/>
+              <a:p>
+                <a:pPr/>
+                <a14:m>
+                  <m:oMathPara xmlns:m="http://schemas.openxmlformats.org/officeDocument/2006/math">
+                    <m:oMathParaPr>
+                      <m:jc m:val="left"/>
+                    </m:oMathParaPr>
+                    <m:oMath xmlns:m="http://schemas.openxmlformats.org/officeDocument/2006/math">
+                      <m:r>
+                        <a:rPr lang="en-US" sz="3200" b="0" i="1" smtClean="0">
+                          <a:latin typeface="Cambria Math" panose="02040503050406030204" pitchFamily="18" charset="0"/>
+                        </a:rPr>
+                        <m:t>3. </m:t>
+                      </m:r>
+                      <m:r>
+                        <a:rPr lang="en-US" sz="3200" b="0" i="1" smtClean="0">
+                          <a:latin typeface="Cambria Math" panose="02040503050406030204" pitchFamily="18" charset="0"/>
+                        </a:rPr>
+                        <m:t>𝑊𝑇𝑃</m:t>
+                      </m:r>
+                      <m:r>
+                        <a:rPr lang="en-US" sz="3200" b="0" i="1" smtClean="0">
+                          <a:latin typeface="Cambria Math" panose="02040503050406030204" pitchFamily="18" charset="0"/>
+                        </a:rPr>
+                        <m:t>= </m:t>
+                      </m:r>
+                      <m:f>
+                        <m:fPr>
+                          <m:ctrlPr>
+                            <a:rPr lang="en-US" sz="3200" b="0" i="1" smtClean="0">
+                              <a:latin typeface="Cambria Math" panose="02040503050406030204" pitchFamily="18" charset="0"/>
+                            </a:rPr>
+                          </m:ctrlPr>
+                        </m:fPr>
+                        <m:num>
+                          <m:r>
+                            <a:rPr lang="en-US" sz="3200" b="0" i="1" smtClean="0">
+                              <a:latin typeface="Cambria Math" panose="02040503050406030204" pitchFamily="18" charset="0"/>
+                            </a:rPr>
+                            <m:t>𝐻𝐵</m:t>
+                          </m:r>
+                          <m:r>
+                            <a:rPr lang="en-US" sz="3200" b="0" i="1" smtClean="0">
+                              <a:latin typeface="Cambria Math" panose="02040503050406030204" pitchFamily="18" charset="0"/>
+                            </a:rPr>
+                            <m:t> × </m:t>
+                          </m:r>
+                          <m:sSup>
+                            <m:sSupPr>
+                              <m:ctrlPr>
+                                <a:rPr lang="en-US" sz="3200" b="0" i="1" smtClean="0">
+                                  <a:latin typeface="Cambria Math" panose="02040503050406030204" pitchFamily="18" charset="0"/>
+                                  <a:ea typeface="Cambria Math" panose="02040503050406030204" pitchFamily="18" charset="0"/>
+                                </a:rPr>
+                              </m:ctrlPr>
+                            </m:sSupPr>
+                            <m:e>
+                              <m:r>
+                                <a:rPr lang="en-US" sz="3200" b="0" i="1" smtClean="0">
+                                  <a:latin typeface="Cambria Math" panose="02040503050406030204" pitchFamily="18" charset="0"/>
+                                  <a:ea typeface="Cambria Math" panose="02040503050406030204" pitchFamily="18" charset="0"/>
+                                </a:rPr>
+                                <m:t>𝑈𝑡𝑖𝑙𝑖𝑡𝑦</m:t>
+                              </m:r>
+                            </m:e>
+                            <m:sup>
+                              <m:r>
+                                <a:rPr lang="en-US" sz="3200" b="0" i="1" smtClean="0">
+                                  <a:latin typeface="Cambria Math" panose="02040503050406030204" pitchFamily="18" charset="0"/>
+                                  <a:ea typeface="Cambria Math" panose="02040503050406030204" pitchFamily="18" charset="0"/>
+                                </a:rPr>
+                                <m:t>2</m:t>
+                              </m:r>
+                            </m:sup>
+                          </m:sSup>
+                        </m:num>
+                        <m:den>
+                          <m:sSup>
+                            <m:sSupPr>
+                              <m:ctrlPr>
+                                <a:rPr lang="en-US" sz="3200" b="0" i="1" smtClean="0">
+                                  <a:latin typeface="Cambria Math" panose="02040503050406030204" pitchFamily="18" charset="0"/>
+                                </a:rPr>
+                              </m:ctrlPr>
+                            </m:sSupPr>
+                            <m:e>
+                              <m:r>
+                                <a:rPr lang="en-US" sz="3200" b="0" i="1" smtClean="0">
+                                  <a:latin typeface="Cambria Math" panose="02040503050406030204" pitchFamily="18" charset="0"/>
+                                </a:rPr>
+                                <m:t>𝑏</m:t>
+                              </m:r>
+                            </m:e>
+                            <m:sup>
+                              <m:r>
+                                <a:rPr lang="en-US" sz="3200" b="0" i="1" smtClean="0">
+                                  <a:latin typeface="Cambria Math" panose="02040503050406030204" pitchFamily="18" charset="0"/>
+                                </a:rPr>
+                                <m:t>2</m:t>
+                              </m:r>
+                            </m:sup>
+                          </m:sSup>
+                          <m:r>
+                            <a:rPr lang="en-US" sz="3200" b="0" i="1" smtClean="0">
+                              <a:latin typeface="Cambria Math" panose="02040503050406030204" pitchFamily="18" charset="0"/>
+                              <a:ea typeface="Cambria Math" panose="02040503050406030204" pitchFamily="18" charset="0"/>
+                            </a:rPr>
+                            <m:t>× </m:t>
+                          </m:r>
+                          <m:sSup>
+                            <m:sSupPr>
+                              <m:ctrlPr>
+                                <a:rPr lang="en-US" sz="3200" b="0" i="1" smtClean="0">
+                                  <a:latin typeface="Cambria Math" panose="02040503050406030204" pitchFamily="18" charset="0"/>
+                                  <a:ea typeface="Cambria Math" panose="02040503050406030204" pitchFamily="18" charset="0"/>
+                                </a:rPr>
+                              </m:ctrlPr>
+                            </m:sSupPr>
+                            <m:e>
+                              <m:r>
+                                <a:rPr lang="en-US" sz="3200" b="0" i="1" smtClean="0">
+                                  <a:latin typeface="Cambria Math" panose="02040503050406030204" pitchFamily="18" charset="0"/>
+                                  <a:ea typeface="Cambria Math" panose="02040503050406030204" pitchFamily="18" charset="0"/>
+                                </a:rPr>
+                                <m:t>𝑈𝑡𝑖𝑙𝑖𝑡𝑦</m:t>
+                              </m:r>
+                            </m:e>
+                            <m:sup>
+                              <m:r>
+                                <a:rPr lang="en-US" sz="3200" b="0" i="1" smtClean="0">
+                                  <a:latin typeface="Cambria Math" panose="02040503050406030204" pitchFamily="18" charset="0"/>
+                                  <a:ea typeface="Cambria Math" panose="02040503050406030204" pitchFamily="18" charset="0"/>
+                                </a:rPr>
+                                <m:t>2</m:t>
+                              </m:r>
+                            </m:sup>
+                          </m:sSup>
+                        </m:den>
+                      </m:f>
+                    </m:oMath>
+                  </m:oMathPara>
+                </a14:m>
+                <a:endParaRPr lang="en-US" sz="3200" dirty="0"/>
+              </a:p>
+            </p:txBody>
+          </p:sp>
+        </mc:Choice>
+        <mc:Fallback>
+          <p:sp>
+            <p:nvSpPr>
+              <p:cNvPr id="12" name="TextBox 11">
+                <a:extLst>
+                  <a:ext uri="{FF2B5EF4-FFF2-40B4-BE49-F238E27FC236}">
+                    <a16:creationId xmlns:a16="http://schemas.microsoft.com/office/drawing/2014/main" id="{B246BA4F-1881-431D-92B9-DF1B861FAB09}"/>
+                  </a:ext>
+                </a:extLst>
+              </p:cNvPr>
+              <p:cNvSpPr txBox="1">
+                <a:spLocks noRot="1" noChangeAspect="1" noMove="1" noResize="1" noEditPoints="1" noAdjustHandles="1" noChangeArrowheads="1" noChangeShapeType="1" noTextEdit="1"/>
+              </p:cNvSpPr>
+              <p:nvPr/>
+            </p:nvSpPr>
+            <p:spPr>
+              <a:xfrm>
+                <a:off x="346411" y="4794504"/>
+                <a:ext cx="8037094" cy="1102289"/>
+              </a:xfrm>
+              <a:prstGeom prst="rect">
+                <a:avLst/>
+              </a:prstGeom>
+              <a:blipFill>
+                <a:blip r:embed="rId6"/>
+                <a:stretch>
+                  <a:fillRect/>
+                </a:stretch>
+              </a:blipFill>
+            </p:spPr>
+            <p:txBody>
+              <a:bodyPr/>
+              <a:lstStyle/>
+              <a:p>
+                <a:r>
+                  <a:rPr lang="en-US">
+                    <a:noFill/>
+                  </a:rPr>
+                  <a:t> </a:t>
+                </a:r>
+              </a:p>
+            </p:txBody>
+          </p:sp>
+        </mc:Fallback>
+      </mc:AlternateContent>
+      <mc:AlternateContent xmlns:mc="http://schemas.openxmlformats.org/markup-compatibility/2006">
+        <mc:Choice xmlns:a14="http://schemas.microsoft.com/office/drawing/2010/main" Requires="a14">
+          <p:sp>
+            <p:nvSpPr>
+              <p:cNvPr id="13" name="TextBox 12">
+                <a:extLst>
+                  <a:ext uri="{FF2B5EF4-FFF2-40B4-BE49-F238E27FC236}">
+                    <a16:creationId xmlns:a16="http://schemas.microsoft.com/office/drawing/2014/main" id="{ED1990C1-BD63-4ABC-AEF1-476F53765403}"/>
+                  </a:ext>
+                </a:extLst>
+              </p:cNvPr>
+              <p:cNvSpPr txBox="1"/>
+              <p:nvPr/>
+            </p:nvSpPr>
+            <p:spPr>
+              <a:xfrm>
+                <a:off x="346410" y="5990099"/>
+                <a:ext cx="8470231" cy="553998"/>
+              </a:xfrm>
+              <a:prstGeom prst="rect">
+                <a:avLst/>
+              </a:prstGeom>
+              <a:noFill/>
+            </p:spPr>
+            <p:txBody>
+              <a:bodyPr wrap="square" lIns="0" tIns="0" rIns="0" bIns="0" rtlCol="0">
+                <a:spAutoFit/>
+              </a:bodyPr>
+              <a:lstStyle/>
+              <a:p>
+                <a:pPr/>
+                <a14:m>
+                  <m:oMathPara xmlns:m="http://schemas.openxmlformats.org/officeDocument/2006/math">
+                    <m:oMathParaPr>
+                      <m:jc m:val="left"/>
+                    </m:oMathParaPr>
+                    <m:oMath xmlns:m="http://schemas.openxmlformats.org/officeDocument/2006/math">
+                      <m:r>
+                        <a:rPr lang="en-US" b="0" i="1" smtClean="0">
+                          <a:latin typeface="Cambria Math" panose="02040503050406030204" pitchFamily="18" charset="0"/>
+                          <a:ea typeface="Cambria Math" panose="02040503050406030204" pitchFamily="18" charset="0"/>
+                        </a:rPr>
+                        <m:t>𝑊𝑇𝑃</m:t>
+                      </m:r>
+                      <m:r>
+                        <a:rPr lang="en-US" b="0" i="1" smtClean="0">
+                          <a:latin typeface="Cambria Math" panose="02040503050406030204" pitchFamily="18" charset="0"/>
+                          <a:ea typeface="Cambria Math" panose="02040503050406030204" pitchFamily="18" charset="0"/>
+                        </a:rPr>
+                        <m:t> −</m:t>
+                      </m:r>
+                      <m:r>
+                        <a:rPr lang="en-US" b="0" i="1" smtClean="0">
+                          <a:latin typeface="Cambria Math" panose="02040503050406030204" pitchFamily="18" charset="0"/>
+                          <a:ea typeface="Cambria Math" panose="02040503050406030204" pitchFamily="18" charset="0"/>
+                        </a:rPr>
+                        <m:t>𝑊𝑖𝑙𝑙𝑖𝑛𝑔𝑛𝑒𝑠𝑠</m:t>
+                      </m:r>
+                      <m:r>
+                        <a:rPr lang="en-US" b="0" i="1" smtClean="0">
+                          <a:latin typeface="Cambria Math" panose="02040503050406030204" pitchFamily="18" charset="0"/>
+                          <a:ea typeface="Cambria Math" panose="02040503050406030204" pitchFamily="18" charset="0"/>
+                        </a:rPr>
+                        <m:t> </m:t>
+                      </m:r>
+                      <m:r>
+                        <a:rPr lang="en-US" b="0" i="1" smtClean="0">
+                          <a:latin typeface="Cambria Math" panose="02040503050406030204" pitchFamily="18" charset="0"/>
+                          <a:ea typeface="Cambria Math" panose="02040503050406030204" pitchFamily="18" charset="0"/>
+                        </a:rPr>
+                        <m:t>𝑡𝑜</m:t>
+                      </m:r>
+                      <m:r>
+                        <a:rPr lang="en-US" b="0" i="1" smtClean="0">
+                          <a:latin typeface="Cambria Math" panose="02040503050406030204" pitchFamily="18" charset="0"/>
+                          <a:ea typeface="Cambria Math" panose="02040503050406030204" pitchFamily="18" charset="0"/>
+                        </a:rPr>
+                        <m:t> </m:t>
+                      </m:r>
+                      <m:r>
+                        <a:rPr lang="en-US" b="0" i="1" smtClean="0">
+                          <a:latin typeface="Cambria Math" panose="02040503050406030204" pitchFamily="18" charset="0"/>
+                          <a:ea typeface="Cambria Math" panose="02040503050406030204" pitchFamily="18" charset="0"/>
+                        </a:rPr>
+                        <m:t>𝑃𝑎𝑦</m:t>
+                      </m:r>
+                    </m:oMath>
+                  </m:oMathPara>
+                </a14:m>
+                <a:endParaRPr lang="en-US" b="0" i="1" dirty="0">
+                  <a:latin typeface="Cambria Math" panose="02040503050406030204" pitchFamily="18" charset="0"/>
+                  <a:ea typeface="Cambria Math" panose="02040503050406030204" pitchFamily="18" charset="0"/>
+                </a:endParaRPr>
+              </a:p>
+              <a:p>
+                <a:pPr/>
+                <a:r>
+                  <a:rPr lang="en-US" i="1" dirty="0">
+                    <a:latin typeface="Cambria Math" panose="02040503050406030204" pitchFamily="18" charset="0"/>
+                    <a:ea typeface="Cambria Math" panose="02040503050406030204" pitchFamily="18" charset="0"/>
+                  </a:rPr>
+                  <a:t>b – WTP Coefficient</a:t>
+                </a:r>
+              </a:p>
+            </p:txBody>
+          </p:sp>
+        </mc:Choice>
+        <mc:Fallback>
+          <p:sp>
+            <p:nvSpPr>
+              <p:cNvPr id="13" name="TextBox 12">
+                <a:extLst>
+                  <a:ext uri="{FF2B5EF4-FFF2-40B4-BE49-F238E27FC236}">
+                    <a16:creationId xmlns:a16="http://schemas.microsoft.com/office/drawing/2014/main" id="{ED1990C1-BD63-4ABC-AEF1-476F53765403}"/>
+                  </a:ext>
+                </a:extLst>
+              </p:cNvPr>
+              <p:cNvSpPr txBox="1">
+                <a:spLocks noRot="1" noChangeAspect="1" noMove="1" noResize="1" noEditPoints="1" noAdjustHandles="1" noChangeArrowheads="1" noChangeShapeType="1" noTextEdit="1"/>
+              </p:cNvSpPr>
+              <p:nvPr/>
+            </p:nvSpPr>
+            <p:spPr>
+              <a:xfrm>
+                <a:off x="346410" y="5990099"/>
+                <a:ext cx="8470231" cy="553998"/>
+              </a:xfrm>
+              <a:prstGeom prst="rect">
+                <a:avLst/>
+              </a:prstGeom>
+              <a:blipFill>
+                <a:blip r:embed="rId7"/>
+                <a:stretch>
+                  <a:fillRect l="-1728" t="-1099" b="-23077"/>
+                </a:stretch>
+              </a:blipFill>
+            </p:spPr>
+            <p:txBody>
+              <a:bodyPr/>
+              <a:lstStyle/>
+              <a:p>
+                <a:r>
+                  <a:rPr lang="en-US">
+                    <a:noFill/>
+                  </a:rPr>
+                  <a:t> </a:t>
+                </a:r>
+              </a:p>
+            </p:txBody>
+          </p:sp>
+        </mc:Fallback>
+      </mc:AlternateContent>
+    </p:spTree>
+    <p:extLst>
+      <p:ext uri="{BB962C8B-B14F-4D97-AF65-F5344CB8AC3E}">
+        <p14:creationId xmlns:p14="http://schemas.microsoft.com/office/powerpoint/2010/main" val="3787694969"/>
       </p:ext>
     </p:extLst>
   </p:cSld>
@@ -5839,21 +7306,6 @@
 </file>
 
 <file path=customXml/item1.xml><?xml version="1.0" encoding="utf-8"?>
-<p:properties xmlns:p="http://schemas.microsoft.com/office/2006/metadata/properties" xmlns:xsi="http://www.w3.org/2001/XMLSchema-instance" xmlns:pc="http://schemas.microsoft.com/office/infopath/2007/PartnerControls">
-  <documentManagement/>
-</p:properties>
-</file>
-
-<file path=customXml/item2.xml><?xml version="1.0" encoding="utf-8"?>
-<?mso-contentType ?>
-<FormTemplates xmlns="http://schemas.microsoft.com/sharepoint/v3/contenttype/forms">
-  <Display>DocumentLibraryForm</Display>
-  <Edit>DocumentLibraryForm</Edit>
-  <New>DocumentLibraryForm</New>
-</FormTemplates>
-</file>
-
-<file path=customXml/item3.xml><?xml version="1.0" encoding="utf-8"?>
 <ct:contentTypeSchema xmlns:ct="http://schemas.microsoft.com/office/2006/metadata/contentType" xmlns:ma="http://schemas.microsoft.com/office/2006/metadata/properties/metaAttributes" ct:_="" ma:_="" ma:contentTypeName="Document" ma:contentTypeID="0x010100C88622A3A5FD0342974F50CA8143EF72" ma:contentTypeVersion="11" ma:contentTypeDescription="Create a new document." ma:contentTypeScope="" ma:versionID="ff8f896cdc12061604111396f36d40db">
   <xsd:schema xmlns:xsd="http://www.w3.org/2001/XMLSchema" xmlns:xs="http://www.w3.org/2001/XMLSchema" xmlns:p="http://schemas.microsoft.com/office/2006/metadata/properties" xmlns:ns3="0102aeb2-439c-495d-9d87-5e28d92e9783" xmlns:ns4="fa60371f-4dd5-4e73-9a46-2e4f6ce8ccbf" targetNamespace="http://schemas.microsoft.com/office/2006/metadata/properties" ma:root="true" ma:fieldsID="4d2312ccf770d8e0684ac302a7202f34" ns3:_="" ns4:_="">
     <xsd:import namespace="0102aeb2-439c-495d-9d87-5e28d92e9783"/>
@@ -6062,32 +7514,22 @@
 </ct:contentTypeSchema>
 </file>
 
-<file path=customXml/itemProps1.xml><?xml version="1.0" encoding="utf-8"?>
-<ds:datastoreItem xmlns:ds="http://schemas.openxmlformats.org/officeDocument/2006/customXml" ds:itemID="{817300B6-AD89-490D-950D-6B87373BAE4F}">
-  <ds:schemaRefs>
-    <ds:schemaRef ds:uri="http://schemas.openxmlformats.org/package/2006/metadata/core-properties"/>
-    <ds:schemaRef ds:uri="http://purl.org/dc/dcmitype/"/>
-    <ds:schemaRef ds:uri="http://purl.org/dc/terms/"/>
-    <ds:schemaRef ds:uri="http://schemas.microsoft.com/office/infopath/2007/PartnerControls"/>
-    <ds:schemaRef ds:uri="http://schemas.microsoft.com/office/2006/metadata/properties"/>
-    <ds:schemaRef ds:uri="http://schemas.microsoft.com/office/2006/documentManagement/types"/>
-    <ds:schemaRef ds:uri="fa60371f-4dd5-4e73-9a46-2e4f6ce8ccbf"/>
-    <ds:schemaRef ds:uri="http://purl.org/dc/elements/1.1/"/>
-    <ds:schemaRef ds:uri="0102aeb2-439c-495d-9d87-5e28d92e9783"/>
-    <ds:schemaRef ds:uri="http://www.w3.org/XML/1998/namespace"/>
-  </ds:schemaRefs>
-</ds:datastoreItem>
+<file path=customXml/item2.xml><?xml version="1.0" encoding="utf-8"?>
+<?mso-contentType ?>
+<FormTemplates xmlns="http://schemas.microsoft.com/sharepoint/v3/contenttype/forms">
+  <Display>DocumentLibraryForm</Display>
+  <Edit>DocumentLibraryForm</Edit>
+  <New>DocumentLibraryForm</New>
+</FormTemplates>
 </file>
 
-<file path=customXml/itemProps2.xml><?xml version="1.0" encoding="utf-8"?>
-<ds:datastoreItem xmlns:ds="http://schemas.openxmlformats.org/officeDocument/2006/customXml" ds:itemID="{36259D4B-0048-4B36-B4A5-DBFCFAA29600}">
-  <ds:schemaRefs>
-    <ds:schemaRef ds:uri="http://schemas.microsoft.com/sharepoint/v3/contenttype/forms"/>
-  </ds:schemaRefs>
-</ds:datastoreItem>
+<file path=customXml/item3.xml><?xml version="1.0" encoding="utf-8"?>
+<p:properties xmlns:p="http://schemas.microsoft.com/office/2006/metadata/properties" xmlns:xsi="http://www.w3.org/2001/XMLSchema-instance" xmlns:pc="http://schemas.microsoft.com/office/infopath/2007/PartnerControls">
+  <documentManagement/>
+</p:properties>
 </file>
 
-<file path=customXml/itemProps3.xml><?xml version="1.0" encoding="utf-8"?>
+<file path=customXml/itemProps1.xml><?xml version="1.0" encoding="utf-8"?>
 <ds:datastoreItem xmlns:ds="http://schemas.openxmlformats.org/officeDocument/2006/customXml" ds:itemID="{27D61212-080F-431D-A3CF-AA27C8C294B1}">
   <ds:schemaRefs>
     <ds:schemaRef ds:uri="http://schemas.microsoft.com/office/2006/metadata/contentType"/>
@@ -6104,4 +7546,29 @@
     <ds:schemaRef ds:uri="http://schemas.microsoft.com/internal/obd"/>
   </ds:schemaRefs>
 </ds:datastoreItem>
+</file>
+
+<file path=customXml/itemProps2.xml><?xml version="1.0" encoding="utf-8"?>
+<ds:datastoreItem xmlns:ds="http://schemas.openxmlformats.org/officeDocument/2006/customXml" ds:itemID="{36259D4B-0048-4B36-B4A5-DBFCFAA29600}">
+  <ds:schemaRefs>
+    <ds:schemaRef ds:uri="http://schemas.microsoft.com/sharepoint/v3/contenttype/forms"/>
+  </ds:schemaRefs>
+</ds:datastoreItem>
+</file>
+
+<file path=customXml/itemProps3.xml><?xml version="1.0" encoding="utf-8"?>
+<ds:datastoreItem xmlns:ds="http://schemas.openxmlformats.org/officeDocument/2006/customXml" ds:itemID="{817300B6-AD89-490D-950D-6B87373BAE4F}">
+  <ds:schemaRefs>
+    <ds:schemaRef ds:uri="http://schemas.openxmlformats.org/package/2006/metadata/core-properties"/>
+    <ds:schemaRef ds:uri="http://purl.org/dc/dcmitype/"/>
+    <ds:schemaRef ds:uri="http://purl.org/dc/terms/"/>
+    <ds:schemaRef ds:uri="http://schemas.microsoft.com/office/infopath/2007/PartnerControls"/>
+    <ds:schemaRef ds:uri="http://schemas.microsoft.com/office/2006/metadata/properties"/>
+    <ds:schemaRef ds:uri="http://schemas.microsoft.com/office/2006/documentManagement/types"/>
+    <ds:schemaRef ds:uri="fa60371f-4dd5-4e73-9a46-2e4f6ce8ccbf"/>
+    <ds:schemaRef ds:uri="http://purl.org/dc/elements/1.1/"/>
+    <ds:schemaRef ds:uri="0102aeb2-439c-495d-9d87-5e28d92e9783"/>
+    <ds:schemaRef ds:uri="http://www.w3.org/XML/1998/namespace"/>
+  </ds:schemaRefs>
+</ds:datastoreItem>
 </file>
</xml_diff>

<commit_message>
Additional plotting examples and functionality
</commit_message>
<xml_diff>
--- a/ICoM ABM Guide.pptx
+++ b/ICoM ABM Guide.pptx
@@ -10,6 +10,7 @@
     <p:sldId id="258" r:id="rId7"/>
     <p:sldId id="259" r:id="rId8"/>
     <p:sldId id="260" r:id="rId9"/>
+    <p:sldId id="262" r:id="rId10"/>
   </p:sldIdLst>
   <p:sldSz cx="12192000" cy="6858000"/>
   <p:notesSz cx="6858000" cy="9144000"/>
@@ -119,7 +120,7 @@
 <file path=ppt/revisionInfo.xml><?xml version="1.0" encoding="utf-8"?>
 <p1510:revInfo xmlns:a="http://schemas.openxmlformats.org/drawingml/2006/main" xmlns:r="http://schemas.openxmlformats.org/officeDocument/2006/relationships" xmlns:p1510="http://schemas.microsoft.com/office/powerpoint/2015/10/main">
   <p1510:revLst>
-    <p1510:client id="{05ABE6EC-5FB7-4B8B-A226-73F1B79CA086}" v="527" dt="2021-02-25T20:45:28.640"/>
+    <p1510:client id="{05ABE6EC-5FB7-4B8B-A226-73F1B79CA086}" v="529" dt="2021-03-18T18:14:43.403"/>
   </p1510:revLst>
 </p1510:revInfo>
 </file>
@@ -129,7 +130,7 @@
   <pc:docChgLst>
     <pc:chgData name="Yoon, James (Jim)" userId="8a7a915f-98f1-4b07-8503-3ec4b5ff3eac" providerId="ADAL" clId="{05ABE6EC-5FB7-4B8B-A226-73F1B79CA086}"/>
     <pc:docChg chg="undo custSel addSld delSld modSld">
-      <pc:chgData name="Yoon, James (Jim)" userId="8a7a915f-98f1-4b07-8503-3ec4b5ff3eac" providerId="ADAL" clId="{05ABE6EC-5FB7-4B8B-A226-73F1B79CA086}" dt="2021-02-25T20:45:28.640" v="2004" actId="20577"/>
+      <pc:chgData name="Yoon, James (Jim)" userId="8a7a915f-98f1-4b07-8503-3ec4b5ff3eac" providerId="ADAL" clId="{05ABE6EC-5FB7-4B8B-A226-73F1B79CA086}" dt="2021-03-18T18:14:43.403" v="2009"/>
       <pc:docMkLst>
         <pc:docMk/>
       </pc:docMkLst>
@@ -392,6 +393,84 @@
           </ac:spMkLst>
         </pc:spChg>
       </pc:sldChg>
+      <pc:sldChg chg="new del">
+        <pc:chgData name="Yoon, James (Jim)" userId="8a7a915f-98f1-4b07-8503-3ec4b5ff3eac" providerId="ADAL" clId="{05ABE6EC-5FB7-4B8B-A226-73F1B79CA086}" dt="2021-03-18T18:14:32.524" v="2007" actId="2696"/>
+        <pc:sldMkLst>
+          <pc:docMk/>
+          <pc:sldMk cId="493415289" sldId="261"/>
+        </pc:sldMkLst>
+      </pc:sldChg>
+      <pc:sldChg chg="addSp delSp add mod">
+        <pc:chgData name="Yoon, James (Jim)" userId="8a7a915f-98f1-4b07-8503-3ec4b5ff3eac" providerId="ADAL" clId="{05ABE6EC-5FB7-4B8B-A226-73F1B79CA086}" dt="2021-03-18T18:14:43.403" v="2009"/>
+        <pc:sldMkLst>
+          <pc:docMk/>
+          <pc:sldMk cId="1117044441" sldId="262"/>
+        </pc:sldMkLst>
+        <pc:spChg chg="del">
+          <ac:chgData name="Yoon, James (Jim)" userId="8a7a915f-98f1-4b07-8503-3ec4b5ff3eac" providerId="ADAL" clId="{05ABE6EC-5FB7-4B8B-A226-73F1B79CA086}" dt="2021-03-18T18:14:42.004" v="2008" actId="478"/>
+          <ac:spMkLst>
+            <pc:docMk/>
+            <pc:sldMk cId="1117044441" sldId="262"/>
+            <ac:spMk id="2" creationId="{83996858-15F0-4CD5-B4CE-BE3E1B42898B}"/>
+          </ac:spMkLst>
+        </pc:spChg>
+        <pc:spChg chg="del">
+          <ac:chgData name="Yoon, James (Jim)" userId="8a7a915f-98f1-4b07-8503-3ec4b5ff3eac" providerId="ADAL" clId="{05ABE6EC-5FB7-4B8B-A226-73F1B79CA086}" dt="2021-03-18T18:14:42.004" v="2008" actId="478"/>
+          <ac:spMkLst>
+            <pc:docMk/>
+            <pc:sldMk cId="1117044441" sldId="262"/>
+            <ac:spMk id="4" creationId="{C85224DF-87E2-476A-825F-9B43518BAA2F}"/>
+          </ac:spMkLst>
+        </pc:spChg>
+        <pc:spChg chg="del">
+          <ac:chgData name="Yoon, James (Jim)" userId="8a7a915f-98f1-4b07-8503-3ec4b5ff3eac" providerId="ADAL" clId="{05ABE6EC-5FB7-4B8B-A226-73F1B79CA086}" dt="2021-03-18T18:14:42.004" v="2008" actId="478"/>
+          <ac:spMkLst>
+            <pc:docMk/>
+            <pc:sldMk cId="1117044441" sldId="262"/>
+            <ac:spMk id="7" creationId="{1190D5C9-B32B-4934-9A6B-5B460EFFE5DC}"/>
+          </ac:spMkLst>
+        </pc:spChg>
+        <pc:spChg chg="del">
+          <ac:chgData name="Yoon, James (Jim)" userId="8a7a915f-98f1-4b07-8503-3ec4b5ff3eac" providerId="ADAL" clId="{05ABE6EC-5FB7-4B8B-A226-73F1B79CA086}" dt="2021-03-18T18:14:42.004" v="2008" actId="478"/>
+          <ac:spMkLst>
+            <pc:docMk/>
+            <pc:sldMk cId="1117044441" sldId="262"/>
+            <ac:spMk id="8" creationId="{72812B12-14FF-460D-808A-A9C1DF793EE0}"/>
+          </ac:spMkLst>
+        </pc:spChg>
+        <pc:spChg chg="del">
+          <ac:chgData name="Yoon, James (Jim)" userId="8a7a915f-98f1-4b07-8503-3ec4b5ff3eac" providerId="ADAL" clId="{05ABE6EC-5FB7-4B8B-A226-73F1B79CA086}" dt="2021-03-18T18:14:42.004" v="2008" actId="478"/>
+          <ac:spMkLst>
+            <pc:docMk/>
+            <pc:sldMk cId="1117044441" sldId="262"/>
+            <ac:spMk id="10" creationId="{7A439AB9-2C1C-4794-96B8-CF06FC0A3699}"/>
+          </ac:spMkLst>
+        </pc:spChg>
+        <pc:spChg chg="del">
+          <ac:chgData name="Yoon, James (Jim)" userId="8a7a915f-98f1-4b07-8503-3ec4b5ff3eac" providerId="ADAL" clId="{05ABE6EC-5FB7-4B8B-A226-73F1B79CA086}" dt="2021-03-18T18:14:42.004" v="2008" actId="478"/>
+          <ac:spMkLst>
+            <pc:docMk/>
+            <pc:sldMk cId="1117044441" sldId="262"/>
+            <ac:spMk id="12" creationId="{B246BA4F-1881-431D-92B9-DF1B861FAB09}"/>
+          </ac:spMkLst>
+        </pc:spChg>
+        <pc:spChg chg="del">
+          <ac:chgData name="Yoon, James (Jim)" userId="8a7a915f-98f1-4b07-8503-3ec4b5ff3eac" providerId="ADAL" clId="{05ABE6EC-5FB7-4B8B-A226-73F1B79CA086}" dt="2021-03-18T18:14:42.004" v="2008" actId="478"/>
+          <ac:spMkLst>
+            <pc:docMk/>
+            <pc:sldMk cId="1117044441" sldId="262"/>
+            <ac:spMk id="13" creationId="{ED1990C1-BD63-4ABC-AEF1-476F53765403}"/>
+          </ac:spMkLst>
+        </pc:spChg>
+        <pc:picChg chg="add">
+          <ac:chgData name="Yoon, James (Jim)" userId="8a7a915f-98f1-4b07-8503-3ec4b5ff3eac" providerId="ADAL" clId="{05ABE6EC-5FB7-4B8B-A226-73F1B79CA086}" dt="2021-03-18T18:14:43.403" v="2009"/>
+          <ac:picMkLst>
+            <pc:docMk/>
+            <pc:sldMk cId="1117044441" sldId="262"/>
+            <ac:picMk id="3" creationId="{CB2DCA93-291F-4461-8069-3F6E81F6CBE7}"/>
+          </ac:picMkLst>
+        </pc:picChg>
+      </pc:sldChg>
     </pc:docChg>
   </pc:docChgLst>
 </pc:chgInfo>
@@ -544,7 +623,7 @@
           <a:p>
             <a:fld id="{7AC65AA3-70EE-4AAE-82B6-823552EBCD17}" type="datetimeFigureOut">
               <a:rPr lang="en-US" smtClean="0"/>
-              <a:t>2/25/2021</a:t>
+              <a:t>3/18/2021</a:t>
             </a:fld>
             <a:endParaRPr lang="en-US"/>
           </a:p>
@@ -742,7 +821,7 @@
           <a:p>
             <a:fld id="{7AC65AA3-70EE-4AAE-82B6-823552EBCD17}" type="datetimeFigureOut">
               <a:rPr lang="en-US" smtClean="0"/>
-              <a:t>2/25/2021</a:t>
+              <a:t>3/18/2021</a:t>
             </a:fld>
             <a:endParaRPr lang="en-US"/>
           </a:p>
@@ -950,7 +1029,7 @@
           <a:p>
             <a:fld id="{7AC65AA3-70EE-4AAE-82B6-823552EBCD17}" type="datetimeFigureOut">
               <a:rPr lang="en-US" smtClean="0"/>
-              <a:t>2/25/2021</a:t>
+              <a:t>3/18/2021</a:t>
             </a:fld>
             <a:endParaRPr lang="en-US"/>
           </a:p>
@@ -1148,7 +1227,7 @@
           <a:p>
             <a:fld id="{7AC65AA3-70EE-4AAE-82B6-823552EBCD17}" type="datetimeFigureOut">
               <a:rPr lang="en-US" smtClean="0"/>
-              <a:t>2/25/2021</a:t>
+              <a:t>3/18/2021</a:t>
             </a:fld>
             <a:endParaRPr lang="en-US"/>
           </a:p>
@@ -1423,7 +1502,7 @@
           <a:p>
             <a:fld id="{7AC65AA3-70EE-4AAE-82B6-823552EBCD17}" type="datetimeFigureOut">
               <a:rPr lang="en-US" smtClean="0"/>
-              <a:t>2/25/2021</a:t>
+              <a:t>3/18/2021</a:t>
             </a:fld>
             <a:endParaRPr lang="en-US"/>
           </a:p>
@@ -1688,7 +1767,7 @@
           <a:p>
             <a:fld id="{7AC65AA3-70EE-4AAE-82B6-823552EBCD17}" type="datetimeFigureOut">
               <a:rPr lang="en-US" smtClean="0"/>
-              <a:t>2/25/2021</a:t>
+              <a:t>3/18/2021</a:t>
             </a:fld>
             <a:endParaRPr lang="en-US"/>
           </a:p>
@@ -2100,7 +2179,7 @@
           <a:p>
             <a:fld id="{7AC65AA3-70EE-4AAE-82B6-823552EBCD17}" type="datetimeFigureOut">
               <a:rPr lang="en-US" smtClean="0"/>
-              <a:t>2/25/2021</a:t>
+              <a:t>3/18/2021</a:t>
             </a:fld>
             <a:endParaRPr lang="en-US"/>
           </a:p>
@@ -2241,7 +2320,7 @@
           <a:p>
             <a:fld id="{7AC65AA3-70EE-4AAE-82B6-823552EBCD17}" type="datetimeFigureOut">
               <a:rPr lang="en-US" smtClean="0"/>
-              <a:t>2/25/2021</a:t>
+              <a:t>3/18/2021</a:t>
             </a:fld>
             <a:endParaRPr lang="en-US"/>
           </a:p>
@@ -2354,7 +2433,7 @@
           <a:p>
             <a:fld id="{7AC65AA3-70EE-4AAE-82B6-823552EBCD17}" type="datetimeFigureOut">
               <a:rPr lang="en-US" smtClean="0"/>
-              <a:t>2/25/2021</a:t>
+              <a:t>3/18/2021</a:t>
             </a:fld>
             <a:endParaRPr lang="en-US"/>
           </a:p>
@@ -2665,7 +2744,7 @@
           <a:p>
             <a:fld id="{7AC65AA3-70EE-4AAE-82B6-823552EBCD17}" type="datetimeFigureOut">
               <a:rPr lang="en-US" smtClean="0"/>
-              <a:t>2/25/2021</a:t>
+              <a:t>3/18/2021</a:t>
             </a:fld>
             <a:endParaRPr lang="en-US"/>
           </a:p>
@@ -2953,7 +3032,7 @@
           <a:p>
             <a:fld id="{7AC65AA3-70EE-4AAE-82B6-823552EBCD17}" type="datetimeFigureOut">
               <a:rPr lang="en-US" smtClean="0"/>
-              <a:t>2/25/2021</a:t>
+              <a:t>3/18/2021</a:t>
             </a:fld>
             <a:endParaRPr lang="en-US"/>
           </a:p>
@@ -3194,7 +3273,7 @@
           <a:p>
             <a:fld id="{7AC65AA3-70EE-4AAE-82B6-823552EBCD17}" type="datetimeFigureOut">
               <a:rPr lang="en-US" smtClean="0"/>
-              <a:t>2/25/2021</a:t>
+              <a:t>3/18/2021</a:t>
             </a:fld>
             <a:endParaRPr lang="en-US"/>
           </a:p>
@@ -5681,8 +5760,8 @@
           </a:p>
         </p:txBody>
       </p:sp>
-      <mc:AlternateContent xmlns:mc="http://schemas.openxmlformats.org/markup-compatibility/2006">
-        <mc:Choice xmlns:a14="http://schemas.microsoft.com/office/drawing/2010/main" Requires="a14">
+      <mc:AlternateContent xmlns:mc="http://schemas.openxmlformats.org/markup-compatibility/2006" xmlns:a14="http://schemas.microsoft.com/office/drawing/2010/main">
+        <mc:Choice Requires="a14">
           <p:sp>
             <p:nvSpPr>
               <p:cNvPr id="2" name="TextBox 1">
@@ -5871,7 +5950,7 @@
             </p:txBody>
           </p:sp>
         </mc:Choice>
-        <mc:Fallback>
+        <mc:Fallback xmlns="">
           <p:sp>
             <p:nvSpPr>
               <p:cNvPr id="2" name="TextBox 1">
@@ -5916,8 +5995,8 @@
           </p:sp>
         </mc:Fallback>
       </mc:AlternateContent>
-      <mc:AlternateContent xmlns:mc="http://schemas.openxmlformats.org/markup-compatibility/2006">
-        <mc:Choice xmlns:a14="http://schemas.microsoft.com/office/drawing/2010/main" Requires="a14">
+      <mc:AlternateContent xmlns:mc="http://schemas.openxmlformats.org/markup-compatibility/2006" xmlns:a14="http://schemas.microsoft.com/office/drawing/2010/main">
+        <mc:Choice Requires="a14">
           <p:sp>
             <p:nvSpPr>
               <p:cNvPr id="7" name="TextBox 6">
@@ -6011,7 +6090,6 @@
                 </a:endParaRPr>
               </a:p>
               <a:p>
-                <a:pPr/>
                 <a:r>
                   <a:rPr lang="en-US" i="1" dirty="0">
                     <a:latin typeface="Cambria Math" panose="02040503050406030204" pitchFamily="18" charset="0"/>
@@ -6026,14 +6104,7 @@
                         <a:latin typeface="Cambria Math" panose="02040503050406030204" pitchFamily="18" charset="0"/>
                         <a:ea typeface="Cambria Math" panose="02040503050406030204" pitchFamily="18" charset="0"/>
                       </a:rPr>
-                      <m:t> −</m:t>
-                    </m:r>
-                    <m:r>
-                      <a:rPr lang="en-US" i="1">
-                        <a:latin typeface="Cambria Math" panose="02040503050406030204" pitchFamily="18" charset="0"/>
-                        <a:ea typeface="Cambria Math" panose="02040503050406030204" pitchFamily="18" charset="0"/>
-                      </a:rPr>
-                      <m:t> </m:t>
+                      <m:t> − </m:t>
                     </m:r>
                     <m:r>
                       <a:rPr lang="en-US" i="1">
@@ -6078,7 +6149,6 @@
                 </a:endParaRPr>
               </a:p>
               <a:p>
-                <a:pPr/>
                 <a:r>
                   <a:rPr lang="en-US" i="1" dirty="0">
                     <a:latin typeface="Cambria Math" panose="02040503050406030204" pitchFamily="18" charset="0"/>
@@ -6093,14 +6163,7 @@
                         <a:latin typeface="Cambria Math" panose="02040503050406030204" pitchFamily="18" charset="0"/>
                         <a:ea typeface="Cambria Math" panose="02040503050406030204" pitchFamily="18" charset="0"/>
                       </a:rPr>
-                      <m:t> −</m:t>
-                    </m:r>
-                    <m:r>
-                      <a:rPr lang="en-US" i="1">
-                        <a:latin typeface="Cambria Math" panose="02040503050406030204" pitchFamily="18" charset="0"/>
-                        <a:ea typeface="Cambria Math" panose="02040503050406030204" pitchFamily="18" charset="0"/>
-                      </a:rPr>
-                      <m:t>% </m:t>
+                      <m:t> −% </m:t>
                     </m:r>
                     <m:r>
                       <a:rPr lang="en-US" i="1">
@@ -6229,7 +6292,6 @@
                 </a:endParaRPr>
               </a:p>
               <a:p>
-                <a:pPr/>
                 <a:r>
                   <a:rPr lang="en-US" i="1" dirty="0">
                     <a:latin typeface="Cambria Math" panose="02040503050406030204" pitchFamily="18" charset="0"/>
@@ -6273,7 +6335,7 @@
             </p:txBody>
           </p:sp>
         </mc:Choice>
-        <mc:Fallback>
+        <mc:Fallback xmlns="">
           <p:sp>
             <p:nvSpPr>
               <p:cNvPr id="7" name="TextBox 6">
@@ -6318,8 +6380,8 @@
           </p:sp>
         </mc:Fallback>
       </mc:AlternateContent>
-      <mc:AlternateContent xmlns:mc="http://schemas.openxmlformats.org/markup-compatibility/2006">
-        <mc:Choice xmlns:a14="http://schemas.microsoft.com/office/drawing/2010/main" Requires="a14">
+      <mc:AlternateContent xmlns:mc="http://schemas.openxmlformats.org/markup-compatibility/2006" xmlns:a14="http://schemas.microsoft.com/office/drawing/2010/main">
+        <mc:Choice Requires="a14">
           <p:sp>
             <p:nvSpPr>
               <p:cNvPr id="8" name="TextBox 7">
@@ -6399,7 +6461,7 @@
             </p:txBody>
           </p:sp>
         </mc:Choice>
-        <mc:Fallback>
+        <mc:Fallback xmlns="">
           <p:sp>
             <p:nvSpPr>
               <p:cNvPr id="8" name="TextBox 7">
@@ -6444,8 +6506,8 @@
           </p:sp>
         </mc:Fallback>
       </mc:AlternateContent>
-      <mc:AlternateContent xmlns:mc="http://schemas.openxmlformats.org/markup-compatibility/2006">
-        <mc:Choice xmlns:a14="http://schemas.microsoft.com/office/drawing/2010/main" Requires="a14">
+      <mc:AlternateContent xmlns:mc="http://schemas.openxmlformats.org/markup-compatibility/2006" xmlns:a14="http://schemas.microsoft.com/office/drawing/2010/main">
+        <mc:Choice Requires="a14">
           <p:sp>
             <p:nvSpPr>
               <p:cNvPr id="10" name="TextBox 9">
@@ -6525,7 +6587,6 @@
                 </a:endParaRPr>
               </a:p>
               <a:p>
-                <a:pPr/>
                 <a:r>
                   <a:rPr lang="en-US" i="1" dirty="0">
                     <a:latin typeface="Cambria Math" panose="02040503050406030204" pitchFamily="18" charset="0"/>
@@ -6535,7 +6596,6 @@
                 </a:r>
               </a:p>
               <a:p>
-                <a:pPr/>
                 <a:r>
                   <a:rPr lang="en-US" i="1" dirty="0">
                     <a:latin typeface="Cambria Math" panose="02040503050406030204" pitchFamily="18" charset="0"/>
@@ -6547,7 +6607,7 @@
             </p:txBody>
           </p:sp>
         </mc:Choice>
-        <mc:Fallback>
+        <mc:Fallback xmlns="">
           <p:sp>
             <p:nvSpPr>
               <p:cNvPr id="10" name="TextBox 9">
@@ -6624,8 +6684,8 @@
           </a:p>
         </p:txBody>
       </p:sp>
-      <mc:AlternateContent xmlns:mc="http://schemas.openxmlformats.org/markup-compatibility/2006">
-        <mc:Choice xmlns:a14="http://schemas.microsoft.com/office/drawing/2010/main" Requires="a14">
+      <mc:AlternateContent xmlns:mc="http://schemas.openxmlformats.org/markup-compatibility/2006" xmlns:a14="http://schemas.microsoft.com/office/drawing/2010/main">
+        <mc:Choice Requires="a14">
           <p:sp>
             <p:nvSpPr>
               <p:cNvPr id="12" name="TextBox 11">
@@ -6800,7 +6860,7 @@
             </p:txBody>
           </p:sp>
         </mc:Choice>
-        <mc:Fallback>
+        <mc:Fallback xmlns="">
           <p:sp>
             <p:nvSpPr>
               <p:cNvPr id="12" name="TextBox 11">
@@ -6845,8 +6905,8 @@
           </p:sp>
         </mc:Fallback>
       </mc:AlternateContent>
-      <mc:AlternateContent xmlns:mc="http://schemas.openxmlformats.org/markup-compatibility/2006">
-        <mc:Choice xmlns:a14="http://schemas.microsoft.com/office/drawing/2010/main" Requires="a14">
+      <mc:AlternateContent xmlns:mc="http://schemas.openxmlformats.org/markup-compatibility/2006" xmlns:a14="http://schemas.microsoft.com/office/drawing/2010/main">
+        <mc:Choice Requires="a14">
           <p:sp>
             <p:nvSpPr>
               <p:cNvPr id="13" name="TextBox 12">
@@ -6940,7 +7000,6 @@
                 </a:endParaRPr>
               </a:p>
               <a:p>
-                <a:pPr/>
                 <a:r>
                   <a:rPr lang="en-US" i="1" dirty="0">
                     <a:latin typeface="Cambria Math" panose="02040503050406030204" pitchFamily="18" charset="0"/>
@@ -6952,7 +7011,7 @@
             </p:txBody>
           </p:sp>
         </mc:Choice>
-        <mc:Fallback>
+        <mc:Fallback xmlns="">
           <p:sp>
             <p:nvSpPr>
               <p:cNvPr id="13" name="TextBox 12">
@@ -7001,6 +7060,101 @@
     <p:extLst>
       <p:ext uri="{BB962C8B-B14F-4D97-AF65-F5344CB8AC3E}">
         <p14:creationId xmlns:p14="http://schemas.microsoft.com/office/powerpoint/2010/main" val="3787694969"/>
+      </p:ext>
+    </p:extLst>
+  </p:cSld>
+  <p:clrMapOvr>
+    <a:masterClrMapping/>
+  </p:clrMapOvr>
+</p:sld>
+</file>
+
+<file path=ppt/slides/slide6.xml><?xml version="1.0" encoding="utf-8"?>
+<p:sld xmlns:a="http://schemas.openxmlformats.org/drawingml/2006/main" xmlns:r="http://schemas.openxmlformats.org/officeDocument/2006/relationships" xmlns:p="http://schemas.openxmlformats.org/presentationml/2006/main">
+  <p:cSld>
+    <p:spTree>
+      <p:nvGrpSpPr>
+        <p:cNvPr id="1" name=""/>
+        <p:cNvGrpSpPr/>
+        <p:nvPr/>
+      </p:nvGrpSpPr>
+      <p:grpSpPr>
+        <a:xfrm>
+          <a:off x="0" y="0"/>
+          <a:ext cx="0" cy="0"/>
+          <a:chOff x="0" y="0"/>
+          <a:chExt cx="0" cy="0"/>
+        </a:xfrm>
+      </p:grpSpPr>
+      <p:sp>
+        <p:nvSpPr>
+          <p:cNvPr id="9" name="TextBox 8">
+            <a:extLst>
+              <a:ext uri="{FF2B5EF4-FFF2-40B4-BE49-F238E27FC236}">
+                <a16:creationId xmlns:a16="http://schemas.microsoft.com/office/drawing/2014/main" id="{56F25AF1-1195-475E-BB00-45536AF81C68}"/>
+              </a:ext>
+            </a:extLst>
+          </p:cNvPr>
+          <p:cNvSpPr txBox="1"/>
+          <p:nvPr/>
+        </p:nvSpPr>
+        <p:spPr>
+          <a:xfrm>
+            <a:off x="346411" y="0"/>
+            <a:ext cx="4879862" cy="369332"/>
+          </a:xfrm>
+          <a:prstGeom prst="rect">
+            <a:avLst/>
+          </a:prstGeom>
+          <a:noFill/>
+        </p:spPr>
+        <p:txBody>
+          <a:bodyPr wrap="none" rtlCol="0">
+            <a:spAutoFit/>
+          </a:bodyPr>
+          <a:lstStyle/>
+          <a:p>
+            <a:r>
+              <a:rPr lang="en-US" b="1" dirty="0"/>
+              <a:t>Simple Household Cobb-Douglas Utility Function:</a:t>
+            </a:r>
+          </a:p>
+        </p:txBody>
+      </p:sp>
+      <p:pic>
+        <p:nvPicPr>
+          <p:cNvPr id="3" name="Picture 2">
+            <a:extLst>
+              <a:ext uri="{FF2B5EF4-FFF2-40B4-BE49-F238E27FC236}">
+                <a16:creationId xmlns:a16="http://schemas.microsoft.com/office/drawing/2014/main" id="{CB2DCA93-291F-4461-8069-3F6E81F6CBE7}"/>
+              </a:ext>
+            </a:extLst>
+          </p:cNvPr>
+          <p:cNvPicPr>
+            <a:picLocks noChangeAspect="1"/>
+          </p:cNvPicPr>
+          <p:nvPr/>
+        </p:nvPicPr>
+        <p:blipFill>
+          <a:blip r:embed="rId2"/>
+          <a:stretch>
+            <a:fillRect/>
+          </a:stretch>
+        </p:blipFill>
+        <p:spPr>
+          <a:xfrm>
+            <a:off x="2038350" y="628650"/>
+            <a:ext cx="8115300" cy="5600700"/>
+          </a:xfrm>
+          <a:prstGeom prst="rect">
+            <a:avLst/>
+          </a:prstGeom>
+        </p:spPr>
+      </p:pic>
+    </p:spTree>
+    <p:extLst>
+      <p:ext uri="{BB962C8B-B14F-4D97-AF65-F5344CB8AC3E}">
+        <p14:creationId xmlns:p14="http://schemas.microsoft.com/office/powerpoint/2010/main" val="1117044441"/>
       </p:ext>
     </p:extLst>
   </p:cSld>
@@ -7306,6 +7460,21 @@
 </file>
 
 <file path=customXml/item1.xml><?xml version="1.0" encoding="utf-8"?>
+<p:properties xmlns:p="http://schemas.microsoft.com/office/2006/metadata/properties" xmlns:xsi="http://www.w3.org/2001/XMLSchema-instance" xmlns:pc="http://schemas.microsoft.com/office/infopath/2007/PartnerControls">
+  <documentManagement/>
+</p:properties>
+</file>
+
+<file path=customXml/item2.xml><?xml version="1.0" encoding="utf-8"?>
+<?mso-contentType ?>
+<FormTemplates xmlns="http://schemas.microsoft.com/sharepoint/v3/contenttype/forms">
+  <Display>DocumentLibraryForm</Display>
+  <Edit>DocumentLibraryForm</Edit>
+  <New>DocumentLibraryForm</New>
+</FormTemplates>
+</file>
+
+<file path=customXml/item3.xml><?xml version="1.0" encoding="utf-8"?>
 <ct:contentTypeSchema xmlns:ct="http://schemas.microsoft.com/office/2006/metadata/contentType" xmlns:ma="http://schemas.microsoft.com/office/2006/metadata/properties/metaAttributes" ct:_="" ma:_="" ma:contentTypeName="Document" ma:contentTypeID="0x010100C88622A3A5FD0342974F50CA8143EF72" ma:contentTypeVersion="11" ma:contentTypeDescription="Create a new document." ma:contentTypeScope="" ma:versionID="ff8f896cdc12061604111396f36d40db">
   <xsd:schema xmlns:xsd="http://www.w3.org/2001/XMLSchema" xmlns:xs="http://www.w3.org/2001/XMLSchema" xmlns:p="http://schemas.microsoft.com/office/2006/metadata/properties" xmlns:ns3="0102aeb2-439c-495d-9d87-5e28d92e9783" xmlns:ns4="fa60371f-4dd5-4e73-9a46-2e4f6ce8ccbf" targetNamespace="http://schemas.microsoft.com/office/2006/metadata/properties" ma:root="true" ma:fieldsID="4d2312ccf770d8e0684ac302a7202f34" ns3:_="" ns4:_="">
     <xsd:import namespace="0102aeb2-439c-495d-9d87-5e28d92e9783"/>
@@ -7514,22 +7683,32 @@
 </ct:contentTypeSchema>
 </file>
 
-<file path=customXml/item2.xml><?xml version="1.0" encoding="utf-8"?>
-<?mso-contentType ?>
-<FormTemplates xmlns="http://schemas.microsoft.com/sharepoint/v3/contenttype/forms">
-  <Display>DocumentLibraryForm</Display>
-  <Edit>DocumentLibraryForm</Edit>
-  <New>DocumentLibraryForm</New>
-</FormTemplates>
+<file path=customXml/itemProps1.xml><?xml version="1.0" encoding="utf-8"?>
+<ds:datastoreItem xmlns:ds="http://schemas.openxmlformats.org/officeDocument/2006/customXml" ds:itemID="{817300B6-AD89-490D-950D-6B87373BAE4F}">
+  <ds:schemaRefs>
+    <ds:schemaRef ds:uri="http://schemas.openxmlformats.org/package/2006/metadata/core-properties"/>
+    <ds:schemaRef ds:uri="http://purl.org/dc/dcmitype/"/>
+    <ds:schemaRef ds:uri="http://purl.org/dc/terms/"/>
+    <ds:schemaRef ds:uri="http://schemas.microsoft.com/office/infopath/2007/PartnerControls"/>
+    <ds:schemaRef ds:uri="http://schemas.microsoft.com/office/2006/metadata/properties"/>
+    <ds:schemaRef ds:uri="http://schemas.microsoft.com/office/2006/documentManagement/types"/>
+    <ds:schemaRef ds:uri="fa60371f-4dd5-4e73-9a46-2e4f6ce8ccbf"/>
+    <ds:schemaRef ds:uri="http://purl.org/dc/elements/1.1/"/>
+    <ds:schemaRef ds:uri="0102aeb2-439c-495d-9d87-5e28d92e9783"/>
+    <ds:schemaRef ds:uri="http://www.w3.org/XML/1998/namespace"/>
+  </ds:schemaRefs>
+</ds:datastoreItem>
 </file>
 
-<file path=customXml/item3.xml><?xml version="1.0" encoding="utf-8"?>
-<p:properties xmlns:p="http://schemas.microsoft.com/office/2006/metadata/properties" xmlns:xsi="http://www.w3.org/2001/XMLSchema-instance" xmlns:pc="http://schemas.microsoft.com/office/infopath/2007/PartnerControls">
-  <documentManagement/>
-</p:properties>
+<file path=customXml/itemProps2.xml><?xml version="1.0" encoding="utf-8"?>
+<ds:datastoreItem xmlns:ds="http://schemas.openxmlformats.org/officeDocument/2006/customXml" ds:itemID="{36259D4B-0048-4B36-B4A5-DBFCFAA29600}">
+  <ds:schemaRefs>
+    <ds:schemaRef ds:uri="http://schemas.microsoft.com/sharepoint/v3/contenttype/forms"/>
+  </ds:schemaRefs>
+</ds:datastoreItem>
 </file>
 
-<file path=customXml/itemProps1.xml><?xml version="1.0" encoding="utf-8"?>
+<file path=customXml/itemProps3.xml><?xml version="1.0" encoding="utf-8"?>
 <ds:datastoreItem xmlns:ds="http://schemas.openxmlformats.org/officeDocument/2006/customXml" ds:itemID="{27D61212-080F-431D-A3CF-AA27C8C294B1}">
   <ds:schemaRefs>
     <ds:schemaRef ds:uri="http://schemas.microsoft.com/office/2006/metadata/contentType"/>
@@ -7546,29 +7725,4 @@
     <ds:schemaRef ds:uri="http://schemas.microsoft.com/internal/obd"/>
   </ds:schemaRefs>
 </ds:datastoreItem>
-</file>
-
-<file path=customXml/itemProps2.xml><?xml version="1.0" encoding="utf-8"?>
-<ds:datastoreItem xmlns:ds="http://schemas.openxmlformats.org/officeDocument/2006/customXml" ds:itemID="{36259D4B-0048-4B36-B4A5-DBFCFAA29600}">
-  <ds:schemaRefs>
-    <ds:schemaRef ds:uri="http://schemas.microsoft.com/sharepoint/v3/contenttype/forms"/>
-  </ds:schemaRefs>
-</ds:datastoreItem>
-</file>
-
-<file path=customXml/itemProps3.xml><?xml version="1.0" encoding="utf-8"?>
-<ds:datastoreItem xmlns:ds="http://schemas.openxmlformats.org/officeDocument/2006/customXml" ds:itemID="{817300B6-AD89-490D-950D-6B87373BAE4F}">
-  <ds:schemaRefs>
-    <ds:schemaRef ds:uri="http://schemas.openxmlformats.org/package/2006/metadata/core-properties"/>
-    <ds:schemaRef ds:uri="http://purl.org/dc/dcmitype/"/>
-    <ds:schemaRef ds:uri="http://purl.org/dc/terms/"/>
-    <ds:schemaRef ds:uri="http://schemas.microsoft.com/office/infopath/2007/PartnerControls"/>
-    <ds:schemaRef ds:uri="http://schemas.microsoft.com/office/2006/metadata/properties"/>
-    <ds:schemaRef ds:uri="http://schemas.microsoft.com/office/2006/documentManagement/types"/>
-    <ds:schemaRef ds:uri="fa60371f-4dd5-4e73-9a46-2e4f6ce8ccbf"/>
-    <ds:schemaRef ds:uri="http://purl.org/dc/elements/1.1/"/>
-    <ds:schemaRef ds:uri="0102aeb2-439c-495d-9d87-5e28d92e9783"/>
-    <ds:schemaRef ds:uri="http://www.w3.org/XML/1998/namespace"/>
-  </ds:schemaRefs>
-</ds:datastoreItem>
 </file>
</xml_diff>